<commit_message>
integrate feedback in slides & add feedback notes file
</commit_message>
<xml_diff>
--- a/presentation/final_presentation.pptx
+++ b/presentation/final_presentation.pptx
@@ -17,6 +17,9 @@
     <p:sldId id="262" r:id="rId14"/>
     <p:sldId id="263" r:id="rId15"/>
     <p:sldId id="264" r:id="rId16"/>
+    <p:sldId id="265" r:id="rId17"/>
+    <p:sldId id="266" r:id="rId18"/>
+    <p:sldId id="267" r:id="rId19"/>
   </p:sldIdLst>
   <p:sldSz cx="24384000" cy="13716000"/>
   <p:notesSz cx="6858000" cy="9144000"/>
@@ -658,6 +661,10 @@
           </p:nvPr>
         </p:nvSpPr>
         <p:spPr>
+          <a:xfrm>
+            <a:off x="12001320" y="13074441"/>
+            <a:ext cx="368494" cy="380921"/>
+          </a:xfrm>
           <a:prstGeom prst="rect">
             <a:avLst/>
           </a:prstGeom>
@@ -889,8 +896,8 @@
         </p:nvSpPr>
         <p:spPr>
           <a:xfrm>
-            <a:off x="1206360" y="7060678"/>
-            <a:ext cx="9778680" cy="5385244"/>
+            <a:off x="1206360" y="7060679"/>
+            <a:ext cx="9778680" cy="5385243"/>
           </a:xfrm>
           <a:prstGeom prst="rect">
             <a:avLst/>
@@ -1125,6 +1132,10 @@
           </p:nvPr>
         </p:nvSpPr>
         <p:spPr>
+          <a:xfrm>
+            <a:off x="12001320" y="13074441"/>
+            <a:ext cx="368494" cy="380921"/>
+          </a:xfrm>
           <a:prstGeom prst="rect">
             <a:avLst/>
           </a:prstGeom>
@@ -1907,8 +1918,8 @@
         </p:nvSpPr>
         <p:spPr>
           <a:xfrm>
-            <a:off x="1206359" y="8262359"/>
-            <a:ext cx="21970802" cy="934564"/>
+            <a:off x="1206359" y="8262360"/>
+            <a:ext cx="21970802" cy="934563"/>
           </a:xfrm>
           <a:prstGeom prst="rect">
             <a:avLst/>
@@ -2754,6 +2765,10 @@
           </p:nvPr>
         </p:nvSpPr>
         <p:spPr>
+          <a:xfrm>
+            <a:off x="12001320" y="13074441"/>
+            <a:ext cx="368494" cy="380921"/>
+          </a:xfrm>
           <a:prstGeom prst="rect">
             <a:avLst/>
           </a:prstGeom>
@@ -3981,8 +3996,8 @@
         </p:nvSpPr>
         <p:spPr>
           <a:xfrm>
-            <a:off x="1206359" y="2575078"/>
-            <a:ext cx="21970802" cy="4647965"/>
+            <a:off x="1206359" y="2575079"/>
+            <a:ext cx="21970802" cy="4647964"/>
           </a:xfrm>
           <a:prstGeom prst="rect">
             <a:avLst/>
@@ -4051,6 +4066,1847 @@
           </a:p>
         </p:txBody>
       </p:sp>
+    </p:spTree>
+  </p:cSld>
+  <p:clrMapOvr>
+    <a:masterClrMapping/>
+  </p:clrMapOvr>
+  <p:transition xmlns:p14="http://schemas.microsoft.com/office/powerpoint/2010/main" spd="med" advClick="1"/>
+</p:sld>
+</file>
+
+<file path=ppt/slides/slide10.xml><?xml version="1.0" encoding="utf-8"?>
+<p:sld xmlns:a="http://schemas.openxmlformats.org/drawingml/2006/main" xmlns:r="http://schemas.openxmlformats.org/officeDocument/2006/relationships" xmlns:p="http://schemas.openxmlformats.org/presentationml/2006/main" xmlns:m="http://schemas.openxmlformats.org/officeDocument/2006/math" xmlns:a14="http://schemas.microsoft.com/office/drawing/2010/main" show="0" showMasterSp="1" showMasterPhAnim="1">
+  <p:cSld>
+    <p:spTree>
+      <p:nvGrpSpPr>
+        <p:cNvPr id="1" name=""/>
+        <p:cNvGrpSpPr/>
+        <p:nvPr/>
+      </p:nvGrpSpPr>
+      <p:grpSpPr>
+        <a:xfrm>
+          <a:off x="0" y="0"/>
+          <a:ext cx="0" cy="0"/>
+          <a:chOff x="0" y="0"/>
+          <a:chExt cx="0" cy="0"/>
+        </a:xfrm>
+      </p:grpSpPr>
+      <p:sp>
+        <p:nvSpPr>
+          <p:cNvPr id="191" name="PlaceHolder 1"/>
+          <p:cNvSpPr txBox="1"/>
+          <p:nvPr>
+            <p:ph type="title"/>
+          </p:nvPr>
+        </p:nvSpPr>
+        <p:spPr>
+          <a:xfrm>
+            <a:off x="1206359" y="1079639"/>
+            <a:ext cx="21970802" cy="1432804"/>
+          </a:xfrm>
+          <a:prstGeom prst="rect">
+            <a:avLst/>
+          </a:prstGeom>
+        </p:spPr>
+        <p:txBody>
+          <a:bodyPr/>
+          <a:lstStyle>
+            <a:lvl1pPr>
+              <a:defRPr spc="-200"/>
+            </a:lvl1pPr>
+          </a:lstStyle>
+          <a:p>
+            <a:pPr/>
+            <a:r>
+              <a:t>Inference</a:t>
+            </a:r>
+          </a:p>
+        </p:txBody>
+      </p:sp>
+      <p:sp>
+        <p:nvSpPr>
+          <p:cNvPr id="192" name="PlaceHolder 2"/>
+          <p:cNvSpPr txBox="1"/>
+          <p:nvPr>
+            <p:ph type="body" sz="quarter" idx="1"/>
+          </p:nvPr>
+        </p:nvSpPr>
+        <p:spPr>
+          <a:xfrm>
+            <a:off x="1206359" y="2373120"/>
+            <a:ext cx="21970802" cy="934563"/>
+          </a:xfrm>
+          <a:prstGeom prst="rect">
+            <a:avLst/>
+          </a:prstGeom>
+        </p:spPr>
+        <p:txBody>
+          <a:bodyPr/>
+          <a:lstStyle>
+            <a:lvl1pPr defTabSz="1609200">
+              <a:lnSpc>
+                <a:spcPct val="80000"/>
+              </a:lnSpc>
+              <a:defRPr spc="-200" sz="5600"/>
+            </a:lvl1pPr>
+          </a:lstStyle>
+          <a:p>
+            <a:pPr/>
+            <a:r>
+              <a:t>Function Pools 2</a:t>
+            </a:r>
+          </a:p>
+        </p:txBody>
+      </p:sp>
+      <p:sp>
+        <p:nvSpPr>
+          <p:cNvPr id="193" name="PlaceHolder 3"/>
+          <p:cNvSpPr txBox="1"/>
+          <p:nvPr/>
+        </p:nvSpPr>
+        <p:spPr>
+          <a:xfrm>
+            <a:off x="1206359" y="4248360"/>
+            <a:ext cx="21970802" cy="8255521"/>
+          </a:xfrm>
+          <a:prstGeom prst="rect">
+            <a:avLst/>
+          </a:prstGeom>
+          <a:ln w="12700">
+            <a:miter lim="400000"/>
+          </a:ln>
+          <a:extLst>
+            <a:ext uri="{C572A759-6A51-4108-AA02-DFA0A04FC94B}">
+              <ma14:wrappingTextBoxFlag xmlns:ma14="http://schemas.microsoft.com/office/mac/drawingml/2011/main" val="1"/>
+            </a:ext>
+          </a:extLst>
+        </p:spPr>
+        <p:txBody>
+          <a:bodyPr lIns="50760" tIns="50760" rIns="50760" bIns="50760">
+            <a:normAutofit fontScale="100000" lnSpcReduction="0"/>
+          </a:bodyPr>
+          <a:lstStyle/>
+          <a:p>
+            <a:pPr marL="609478" indent="-609478" defTabSz="2438280">
+              <a:lnSpc>
+                <a:spcPct val="90000"/>
+              </a:lnSpc>
+              <a:spcBef>
+                <a:spcPts val="4500"/>
+              </a:spcBef>
+              <a:buClr>
+                <a:srgbClr val="000000"/>
+              </a:buClr>
+              <a:buSzPct val="123000"/>
+              <a:buFont typeface="Symbol"/>
+              <a:buChar char="·"/>
+              <a:defRPr sz="4800">
+                <a:solidFill>
+                  <a:srgbClr val="000000"/>
+                </a:solidFill>
+                <a:latin typeface="+mj-lt"/>
+                <a:ea typeface="+mj-ea"/>
+                <a:cs typeface="+mj-cs"/>
+                <a:sym typeface="Helvetica Neue"/>
+              </a:defRPr>
+            </a:pPr>
+            <a:r>
+              <a:t>200 Negative Samples: </a:t>
+            </a:r>
+          </a:p>
+          <a:p>
+            <a:pPr lvl="2" marL="1828800" indent="-609480" defTabSz="2438280">
+              <a:lnSpc>
+                <a:spcPct val="90000"/>
+              </a:lnSpc>
+              <a:spcBef>
+                <a:spcPts val="4500"/>
+              </a:spcBef>
+              <a:buClr>
+                <a:srgbClr val="000000"/>
+              </a:buClr>
+              <a:buSzPct val="123000"/>
+              <a:buFont typeface="Symbol"/>
+              <a:buChar char="·"/>
+              <a:defRPr sz="4800">
+                <a:solidFill>
+                  <a:srgbClr val="000000"/>
+                </a:solidFill>
+                <a:latin typeface="+mj-lt"/>
+                <a:ea typeface="+mj-ea"/>
+                <a:cs typeface="+mj-cs"/>
+                <a:sym typeface="Helvetica Neue"/>
+              </a:defRPr>
+            </a:pPr>
+            <a:r>
+              <a:t>Randomly pick 100 samples from each of the two test projects</a:t>
+            </a:r>
+          </a:p>
+          <a:p>
+            <a:pPr lvl="2" marL="1828800" indent="-609480" defTabSz="2438280">
+              <a:lnSpc>
+                <a:spcPct val="90000"/>
+              </a:lnSpc>
+              <a:spcBef>
+                <a:spcPts val="4500"/>
+              </a:spcBef>
+              <a:buClr>
+                <a:srgbClr val="000000"/>
+              </a:buClr>
+              <a:buSzPct val="123000"/>
+              <a:buFont typeface="Symbol"/>
+              <a:buChar char="·"/>
+              <a:defRPr sz="4800">
+                <a:solidFill>
+                  <a:srgbClr val="000000"/>
+                </a:solidFill>
+                <a:latin typeface="+mj-lt"/>
+                <a:ea typeface="+mj-ea"/>
+                <a:cs typeface="+mj-cs"/>
+                <a:sym typeface="Helvetica Neue"/>
+              </a:defRPr>
+            </a:pPr>
+            <a:r>
+              <a:t>Ensure each sample has a different name than the anchor</a:t>
+            </a:r>
+          </a:p>
+          <a:p>
+            <a:pPr marL="609478" indent="-609478" defTabSz="2438280">
+              <a:lnSpc>
+                <a:spcPct val="90000"/>
+              </a:lnSpc>
+              <a:spcBef>
+                <a:spcPts val="4500"/>
+              </a:spcBef>
+              <a:buClr>
+                <a:srgbClr val="000000"/>
+              </a:buClr>
+              <a:buSzPct val="123000"/>
+              <a:buFont typeface="Symbol"/>
+              <a:buChar char="·"/>
+              <a:defRPr sz="4800">
+                <a:solidFill>
+                  <a:srgbClr val="000000"/>
+                </a:solidFill>
+                <a:latin typeface="+mj-lt"/>
+                <a:ea typeface="+mj-ea"/>
+                <a:cs typeface="+mj-cs"/>
+                <a:sym typeface="Helvetica Neue"/>
+              </a:defRPr>
+            </a:pPr>
+            <a:r>
+              <a:t>Anchor Function:</a:t>
+            </a:r>
+          </a:p>
+          <a:p>
+            <a:pPr lvl="3" marL="2438280" indent="-609480" defTabSz="2438280">
+              <a:lnSpc>
+                <a:spcPct val="90000"/>
+              </a:lnSpc>
+              <a:spcBef>
+                <a:spcPts val="4500"/>
+              </a:spcBef>
+              <a:buClr>
+                <a:srgbClr val="000000"/>
+              </a:buClr>
+              <a:buSzPct val="123000"/>
+              <a:buFont typeface="Symbol"/>
+              <a:buChar char="·"/>
+              <a:defRPr sz="4800">
+                <a:solidFill>
+                  <a:srgbClr val="000000"/>
+                </a:solidFill>
+                <a:latin typeface="+mj-lt"/>
+                <a:ea typeface="+mj-ea"/>
+                <a:cs typeface="+mj-cs"/>
+                <a:sym typeface="Helvetica Neue"/>
+              </a:defRPr>
+            </a:pPr>
+            <a:r>
+              <a:t>pick an arbitrary variant of similar named functions</a:t>
+            </a:r>
+          </a:p>
+        </p:txBody>
+      </p:sp>
+    </p:spTree>
+  </p:cSld>
+  <p:clrMapOvr>
+    <a:masterClrMapping/>
+  </p:clrMapOvr>
+  <p:transition xmlns:p14="http://schemas.microsoft.com/office/powerpoint/2010/main" spd="med" advClick="1"/>
+</p:sld>
+</file>
+
+<file path=ppt/slides/slide11.xml><?xml version="1.0" encoding="utf-8"?>
+<p:sld xmlns:a="http://schemas.openxmlformats.org/drawingml/2006/main" xmlns:r="http://schemas.openxmlformats.org/officeDocument/2006/relationships" xmlns:p="http://schemas.openxmlformats.org/presentationml/2006/main" xmlns:m="http://schemas.openxmlformats.org/officeDocument/2006/math" xmlns:a14="http://schemas.microsoft.com/office/drawing/2010/main" showMasterSp="1" showMasterPhAnim="1">
+  <p:cSld>
+    <p:spTree>
+      <p:nvGrpSpPr>
+        <p:cNvPr id="1" name=""/>
+        <p:cNvGrpSpPr/>
+        <p:nvPr/>
+      </p:nvGrpSpPr>
+      <p:grpSpPr>
+        <a:xfrm>
+          <a:off x="0" y="0"/>
+          <a:ext cx="0" cy="0"/>
+          <a:chOff x="0" y="0"/>
+          <a:chExt cx="0" cy="0"/>
+        </a:xfrm>
+      </p:grpSpPr>
+      <p:sp>
+        <p:nvSpPr>
+          <p:cNvPr id="195" name="PlaceHolder 1"/>
+          <p:cNvSpPr txBox="1"/>
+          <p:nvPr>
+            <p:ph type="title"/>
+          </p:nvPr>
+        </p:nvSpPr>
+        <p:spPr>
+          <a:xfrm>
+            <a:off x="1206359" y="1079639"/>
+            <a:ext cx="21970802" cy="1432804"/>
+          </a:xfrm>
+          <a:prstGeom prst="rect">
+            <a:avLst/>
+          </a:prstGeom>
+        </p:spPr>
+        <p:txBody>
+          <a:bodyPr/>
+          <a:lstStyle>
+            <a:lvl1pPr>
+              <a:defRPr spc="-200"/>
+            </a:lvl1pPr>
+          </a:lstStyle>
+          <a:p>
+            <a:pPr/>
+            <a:r>
+              <a:t>Training Hyperparameters</a:t>
+            </a:r>
+          </a:p>
+        </p:txBody>
+      </p:sp>
+      <p:graphicFrame>
+        <p:nvGraphicFramePr>
+          <p:cNvPr id="196" name="Tabelle"/>
+          <p:cNvGraphicFramePr/>
+          <p:nvPr/>
+        </p:nvGraphicFramePr>
+        <p:xfrm>
+          <a:off x="2877117" y="3518279"/>
+          <a:ext cx="18629285" cy="8150402"/>
+        </p:xfrm>
+        <a:graphic xmlns:a="http://schemas.openxmlformats.org/drawingml/2006/main">
+          <a:graphicData uri="http://schemas.openxmlformats.org/drawingml/2006/table">
+            <a:tbl>
+              <a:tblPr firstCol="0" firstRow="0" lastCol="0" lastRow="0" bandCol="0" bandRow="0" rtl="0">
+                <a:tableStyleId>{4C3C2611-4C71-4FC5-86AE-919BDF0F9419}</a:tableStyleId>
+              </a:tblPr>
+              <a:tblGrid>
+                <a:gridCol w="9314640"/>
+                <a:gridCol w="9314640"/>
+              </a:tblGrid>
+              <a:tr h="1018800">
+                <a:tc>
+                  <a:txBody>
+                    <a:bodyPr/>
+                    <a:lstStyle/>
+                    <a:p>
+                      <a:pPr algn="ctr">
+                        <a:defRPr>
+                          <a:solidFill>
+                            <a:srgbClr val="000000"/>
+                          </a:solidFill>
+                        </a:defRPr>
+                      </a:pPr>
+                      <a:r>
+                        <a:rPr b="1" sz="3200">
+                          <a:sym typeface="Helvetica Neue"/>
+                        </a:rPr>
+                        <a:t>Batch Size</a:t>
+                      </a:r>
+                    </a:p>
+                  </a:txBody>
+                  <a:tcPr marL="50760" marR="50760" marT="50760" marB="50760" anchor="ctr" anchorCtr="0" horzOverflow="overflow">
+                    <a:lnL w="12240">
+                      <a:solidFill>
+                        <a:srgbClr val="000000"/>
+                      </a:solidFill>
+                    </a:lnL>
+                    <a:lnR w="12240">
+                      <a:solidFill>
+                        <a:srgbClr val="000000"/>
+                      </a:solidFill>
+                    </a:lnR>
+                    <a:lnT w="12240">
+                      <a:solidFill>
+                        <a:srgbClr val="000000"/>
+                      </a:solidFill>
+                    </a:lnT>
+                    <a:lnB w="12240">
+                      <a:solidFill>
+                        <a:srgbClr val="000000"/>
+                      </a:solidFill>
+                    </a:lnB>
+                    <a:noFill/>
+                  </a:tcPr>
+                </a:tc>
+                <a:tc>
+                  <a:txBody>
+                    <a:bodyPr/>
+                    <a:lstStyle/>
+                    <a:p>
+                      <a:pPr algn="ctr">
+                        <a:defRPr>
+                          <a:solidFill>
+                            <a:srgbClr val="000000"/>
+                          </a:solidFill>
+                        </a:defRPr>
+                      </a:pPr>
+                      <a:r>
+                        <a:rPr sz="3200">
+                          <a:sym typeface="Helvetica Neue"/>
+                        </a:rPr>
+                        <a:t>12</a:t>
+                      </a:r>
+                    </a:p>
+                  </a:txBody>
+                  <a:tcPr marL="50760" marR="50760" marT="50760" marB="50760" anchor="ctr" anchorCtr="0" horzOverflow="overflow">
+                    <a:lnL w="12240">
+                      <a:solidFill>
+                        <a:srgbClr val="000000"/>
+                      </a:solidFill>
+                    </a:lnL>
+                    <a:lnR w="12240">
+                      <a:solidFill>
+                        <a:srgbClr val="000000"/>
+                      </a:solidFill>
+                    </a:lnR>
+                    <a:lnT w="12240">
+                      <a:solidFill>
+                        <a:srgbClr val="000000"/>
+                      </a:solidFill>
+                    </a:lnT>
+                    <a:lnB w="12240">
+                      <a:solidFill>
+                        <a:srgbClr val="000000"/>
+                      </a:solidFill>
+                    </a:lnB>
+                    <a:noFill/>
+                  </a:tcPr>
+                </a:tc>
+              </a:tr>
+              <a:tr h="1018800">
+                <a:tc>
+                  <a:txBody>
+                    <a:bodyPr/>
+                    <a:lstStyle/>
+                    <a:p>
+                      <a:pPr algn="ctr">
+                        <a:defRPr>
+                          <a:solidFill>
+                            <a:srgbClr val="000000"/>
+                          </a:solidFill>
+                        </a:defRPr>
+                      </a:pPr>
+                      <a:r>
+                        <a:rPr b="1" sz="3200">
+                          <a:sym typeface="Helvetica Neue"/>
+                        </a:rPr>
+                        <a:t>Learning Rate</a:t>
+                      </a:r>
+                    </a:p>
+                  </a:txBody>
+                  <a:tcPr marL="50760" marR="50760" marT="50760" marB="50760" anchor="ctr" anchorCtr="0" horzOverflow="overflow">
+                    <a:lnL w="12240">
+                      <a:solidFill>
+                        <a:srgbClr val="000000"/>
+                      </a:solidFill>
+                    </a:lnL>
+                    <a:lnR w="12240">
+                      <a:solidFill>
+                        <a:srgbClr val="000000"/>
+                      </a:solidFill>
+                    </a:lnR>
+                    <a:lnT w="12240">
+                      <a:solidFill>
+                        <a:srgbClr val="000000"/>
+                      </a:solidFill>
+                    </a:lnT>
+                    <a:lnB w="12240">
+                      <a:solidFill>
+                        <a:srgbClr val="000000"/>
+                      </a:solidFill>
+                    </a:lnB>
+                    <a:noFill/>
+                  </a:tcPr>
+                </a:tc>
+                <a:tc>
+                  <a:txBody>
+                    <a:bodyPr/>
+                    <a:lstStyle/>
+                    <a:p>
+                      <a:pPr algn="ctr">
+                        <a:defRPr>
+                          <a:solidFill>
+                            <a:srgbClr val="000000"/>
+                          </a:solidFill>
+                        </a:defRPr>
+                      </a:pPr>
+                      <a:r>
+                        <a:rPr sz="3200">
+                          <a:sym typeface="Helvetica Neue"/>
+                        </a:rPr>
+                        <a:t>0,001</a:t>
+                      </a:r>
+                    </a:p>
+                  </a:txBody>
+                  <a:tcPr marL="50760" marR="50760" marT="50760" marB="50760" anchor="ctr" anchorCtr="0" horzOverflow="overflow">
+                    <a:lnL w="12240">
+                      <a:solidFill>
+                        <a:srgbClr val="000000"/>
+                      </a:solidFill>
+                    </a:lnL>
+                    <a:lnR w="12240">
+                      <a:solidFill>
+                        <a:srgbClr val="000000"/>
+                      </a:solidFill>
+                    </a:lnR>
+                    <a:lnT w="12240">
+                      <a:solidFill>
+                        <a:srgbClr val="000000"/>
+                      </a:solidFill>
+                    </a:lnT>
+                    <a:lnB w="12240">
+                      <a:solidFill>
+                        <a:srgbClr val="000000"/>
+                      </a:solidFill>
+                    </a:lnB>
+                    <a:noFill/>
+                  </a:tcPr>
+                </a:tc>
+              </a:tr>
+              <a:tr h="1018800">
+                <a:tc>
+                  <a:txBody>
+                    <a:bodyPr/>
+                    <a:lstStyle/>
+                    <a:p>
+                      <a:pPr algn="ctr">
+                        <a:defRPr>
+                          <a:solidFill>
+                            <a:srgbClr val="000000"/>
+                          </a:solidFill>
+                        </a:defRPr>
+                      </a:pPr>
+                      <a:r>
+                        <a:rPr b="1" sz="3200">
+                          <a:sym typeface="Helvetica Neue"/>
+                        </a:rPr>
+                        <a:t>Epochs</a:t>
+                      </a:r>
+                    </a:p>
+                  </a:txBody>
+                  <a:tcPr marL="50760" marR="50760" marT="50760" marB="50760" anchor="ctr" anchorCtr="0" horzOverflow="overflow">
+                    <a:lnL w="12240">
+                      <a:solidFill>
+                        <a:srgbClr val="000000"/>
+                      </a:solidFill>
+                    </a:lnL>
+                    <a:lnR w="12240">
+                      <a:solidFill>
+                        <a:srgbClr val="000000"/>
+                      </a:solidFill>
+                    </a:lnR>
+                    <a:lnT w="12240">
+                      <a:solidFill>
+                        <a:srgbClr val="000000"/>
+                      </a:solidFill>
+                    </a:lnT>
+                    <a:lnB w="12240">
+                      <a:solidFill>
+                        <a:srgbClr val="000000"/>
+                      </a:solidFill>
+                    </a:lnB>
+                    <a:noFill/>
+                  </a:tcPr>
+                </a:tc>
+                <a:tc>
+                  <a:txBody>
+                    <a:bodyPr/>
+                    <a:lstStyle/>
+                    <a:p>
+                      <a:pPr algn="ctr">
+                        <a:defRPr>
+                          <a:solidFill>
+                            <a:srgbClr val="000000"/>
+                          </a:solidFill>
+                        </a:defRPr>
+                      </a:pPr>
+                      <a:r>
+                        <a:rPr sz="3200">
+                          <a:sym typeface="Helvetica Neue"/>
+                        </a:rPr>
+                        <a:t>2</a:t>
+                      </a:r>
+                    </a:p>
+                  </a:txBody>
+                  <a:tcPr marL="50760" marR="50760" marT="50760" marB="50760" anchor="ctr" anchorCtr="0" horzOverflow="overflow">
+                    <a:lnL w="12240">
+                      <a:solidFill>
+                        <a:srgbClr val="000000"/>
+                      </a:solidFill>
+                    </a:lnL>
+                    <a:lnR w="12240">
+                      <a:solidFill>
+                        <a:srgbClr val="000000"/>
+                      </a:solidFill>
+                    </a:lnR>
+                    <a:lnT w="12240">
+                      <a:solidFill>
+                        <a:srgbClr val="000000"/>
+                      </a:solidFill>
+                    </a:lnT>
+                    <a:lnB w="12240">
+                      <a:solidFill>
+                        <a:srgbClr val="000000"/>
+                      </a:solidFill>
+                    </a:lnB>
+                    <a:noFill/>
+                  </a:tcPr>
+                </a:tc>
+              </a:tr>
+              <a:tr h="1018800">
+                <a:tc>
+                  <a:txBody>
+                    <a:bodyPr/>
+                    <a:lstStyle/>
+                    <a:p>
+                      <a:pPr algn="ctr">
+                        <a:defRPr>
+                          <a:solidFill>
+                            <a:srgbClr val="000000"/>
+                          </a:solidFill>
+                        </a:defRPr>
+                      </a:pPr>
+                      <a:r>
+                        <a:rPr b="1" sz="3200">
+                          <a:sym typeface="Helvetica Neue"/>
+                        </a:rPr>
+                        <a:t>Number of Attention Heads</a:t>
+                      </a:r>
+                    </a:p>
+                  </a:txBody>
+                  <a:tcPr marL="50760" marR="50760" marT="50760" marB="50760" anchor="ctr" anchorCtr="0" horzOverflow="overflow">
+                    <a:lnL w="12240">
+                      <a:solidFill>
+                        <a:srgbClr val="000000"/>
+                      </a:solidFill>
+                    </a:lnL>
+                    <a:lnR w="12240">
+                      <a:solidFill>
+                        <a:srgbClr val="000000"/>
+                      </a:solidFill>
+                    </a:lnR>
+                    <a:lnT w="12240">
+                      <a:solidFill>
+                        <a:srgbClr val="000000"/>
+                      </a:solidFill>
+                    </a:lnT>
+                    <a:lnB w="12240">
+                      <a:solidFill>
+                        <a:srgbClr val="000000"/>
+                      </a:solidFill>
+                    </a:lnB>
+                    <a:noFill/>
+                  </a:tcPr>
+                </a:tc>
+                <a:tc>
+                  <a:txBody>
+                    <a:bodyPr/>
+                    <a:lstStyle/>
+                    <a:p>
+                      <a:pPr algn="ctr">
+                        <a:defRPr>
+                          <a:solidFill>
+                            <a:srgbClr val="000000"/>
+                          </a:solidFill>
+                        </a:defRPr>
+                      </a:pPr>
+                      <a:r>
+                        <a:rPr sz="3200">
+                          <a:sym typeface="Helvetica Neue"/>
+                        </a:rPr>
+                        <a:t>8</a:t>
+                      </a:r>
+                    </a:p>
+                  </a:txBody>
+                  <a:tcPr marL="50760" marR="50760" marT="50760" marB="50760" anchor="ctr" anchorCtr="0" horzOverflow="overflow">
+                    <a:lnL w="12240">
+                      <a:solidFill>
+                        <a:srgbClr val="000000"/>
+                      </a:solidFill>
+                    </a:lnL>
+                    <a:lnR w="12240">
+                      <a:solidFill>
+                        <a:srgbClr val="000000"/>
+                      </a:solidFill>
+                    </a:lnR>
+                    <a:lnT w="12240">
+                      <a:solidFill>
+                        <a:srgbClr val="000000"/>
+                      </a:solidFill>
+                    </a:lnT>
+                    <a:lnB w="12240">
+                      <a:solidFill>
+                        <a:srgbClr val="000000"/>
+                      </a:solidFill>
+                    </a:lnB>
+                    <a:noFill/>
+                  </a:tcPr>
+                </a:tc>
+              </a:tr>
+              <a:tr h="1018800">
+                <a:tc>
+                  <a:txBody>
+                    <a:bodyPr/>
+                    <a:lstStyle/>
+                    <a:p>
+                      <a:pPr algn="ctr">
+                        <a:defRPr>
+                          <a:solidFill>
+                            <a:srgbClr val="000000"/>
+                          </a:solidFill>
+                        </a:defRPr>
+                      </a:pPr>
+                      <a:r>
+                        <a:rPr b="1" sz="3200">
+                          <a:sym typeface="Helvetica Neue"/>
+                        </a:rPr>
+                        <a:t>Number of Hidden Layers</a:t>
+                      </a:r>
+                    </a:p>
+                  </a:txBody>
+                  <a:tcPr marL="50760" marR="50760" marT="50760" marB="50760" anchor="ctr" anchorCtr="0" horzOverflow="overflow">
+                    <a:lnL w="12240">
+                      <a:solidFill>
+                        <a:srgbClr val="000000"/>
+                      </a:solidFill>
+                    </a:lnL>
+                    <a:lnR w="12240">
+                      <a:solidFill>
+                        <a:srgbClr val="000000"/>
+                      </a:solidFill>
+                    </a:lnR>
+                    <a:lnT w="12240">
+                      <a:solidFill>
+                        <a:srgbClr val="000000"/>
+                      </a:solidFill>
+                    </a:lnT>
+                    <a:lnB w="12240">
+                      <a:solidFill>
+                        <a:srgbClr val="000000"/>
+                      </a:solidFill>
+                    </a:lnB>
+                    <a:noFill/>
+                  </a:tcPr>
+                </a:tc>
+                <a:tc>
+                  <a:txBody>
+                    <a:bodyPr/>
+                    <a:lstStyle/>
+                    <a:p>
+                      <a:pPr algn="ctr">
+                        <a:defRPr>
+                          <a:solidFill>
+                            <a:srgbClr val="000000"/>
+                          </a:solidFill>
+                        </a:defRPr>
+                      </a:pPr>
+                      <a:r>
+                        <a:rPr sz="3200">
+                          <a:sym typeface="Helvetica Neue"/>
+                        </a:rPr>
+                        <a:t>4</a:t>
+                      </a:r>
+                    </a:p>
+                  </a:txBody>
+                  <a:tcPr marL="50760" marR="50760" marT="50760" marB="50760" anchor="ctr" anchorCtr="0" horzOverflow="overflow">
+                    <a:lnL w="12240">
+                      <a:solidFill>
+                        <a:srgbClr val="000000"/>
+                      </a:solidFill>
+                    </a:lnL>
+                    <a:lnR w="12240">
+                      <a:solidFill>
+                        <a:srgbClr val="000000"/>
+                      </a:solidFill>
+                    </a:lnR>
+                    <a:lnT w="12240">
+                      <a:solidFill>
+                        <a:srgbClr val="000000"/>
+                      </a:solidFill>
+                    </a:lnT>
+                    <a:lnB w="12240">
+                      <a:solidFill>
+                        <a:srgbClr val="000000"/>
+                      </a:solidFill>
+                    </a:lnB>
+                    <a:noFill/>
+                  </a:tcPr>
+                </a:tc>
+              </a:tr>
+              <a:tr h="1018800">
+                <a:tc>
+                  <a:txBody>
+                    <a:bodyPr/>
+                    <a:lstStyle/>
+                    <a:p>
+                      <a:pPr algn="ctr">
+                        <a:defRPr>
+                          <a:solidFill>
+                            <a:srgbClr val="000000"/>
+                          </a:solidFill>
+                        </a:defRPr>
+                      </a:pPr>
+                      <a:r>
+                        <a:rPr b="1" sz="3200">
+                          <a:sym typeface="Helvetica Neue"/>
+                        </a:rPr>
+                        <a:t>Train Data</a:t>
+                      </a:r>
+                    </a:p>
+                  </a:txBody>
+                  <a:tcPr marL="50760" marR="50760" marT="50760" marB="50760" anchor="ctr" anchorCtr="0" horzOverflow="overflow">
+                    <a:lnL w="12240">
+                      <a:solidFill>
+                        <a:srgbClr val="000000"/>
+                      </a:solidFill>
+                    </a:lnL>
+                    <a:lnR w="12240">
+                      <a:solidFill>
+                        <a:srgbClr val="000000"/>
+                      </a:solidFill>
+                    </a:lnR>
+                    <a:lnT w="12240">
+                      <a:solidFill>
+                        <a:srgbClr val="000000"/>
+                      </a:solidFill>
+                    </a:lnT>
+                    <a:lnB w="12240">
+                      <a:solidFill>
+                        <a:srgbClr val="000000"/>
+                      </a:solidFill>
+                    </a:lnB>
+                    <a:noFill/>
+                  </a:tcPr>
+                </a:tc>
+                <a:tc>
+                  <a:txBody>
+                    <a:bodyPr/>
+                    <a:lstStyle/>
+                    <a:p>
+                      <a:pPr algn="ctr">
+                        <a:defRPr>
+                          <a:solidFill>
+                            <a:srgbClr val="000000"/>
+                          </a:solidFill>
+                        </a:defRPr>
+                      </a:pPr>
+                      <a:r>
+                        <a:rPr sz="3200">
+                          <a:sym typeface="Helvetica Neue"/>
+                        </a:rPr>
+                        <a:t>clamav, nmap, openssl ( ~ 1GB )</a:t>
+                      </a:r>
+                    </a:p>
+                  </a:txBody>
+                  <a:tcPr marL="50760" marR="50760" marT="50760" marB="50760" anchor="ctr" anchorCtr="0" horzOverflow="overflow">
+                    <a:lnL w="12240">
+                      <a:solidFill>
+                        <a:srgbClr val="000000"/>
+                      </a:solidFill>
+                    </a:lnL>
+                    <a:lnR w="12240">
+                      <a:solidFill>
+                        <a:srgbClr val="000000"/>
+                      </a:solidFill>
+                    </a:lnR>
+                    <a:lnT w="12240">
+                      <a:solidFill>
+                        <a:srgbClr val="000000"/>
+                      </a:solidFill>
+                    </a:lnT>
+                    <a:lnB w="12240">
+                      <a:solidFill>
+                        <a:srgbClr val="000000"/>
+                      </a:solidFill>
+                    </a:lnB>
+                    <a:noFill/>
+                  </a:tcPr>
+                </a:tc>
+              </a:tr>
+              <a:tr h="1018800">
+                <a:tc>
+                  <a:txBody>
+                    <a:bodyPr/>
+                    <a:lstStyle/>
+                    <a:p>
+                      <a:pPr algn="ctr">
+                        <a:defRPr>
+                          <a:solidFill>
+                            <a:srgbClr val="000000"/>
+                          </a:solidFill>
+                        </a:defRPr>
+                      </a:pPr>
+                      <a:r>
+                        <a:rPr b="1" sz="3200">
+                          <a:sym typeface="Helvetica Neue"/>
+                        </a:rPr>
+                        <a:t>Validation Data</a:t>
+                      </a:r>
+                    </a:p>
+                  </a:txBody>
+                  <a:tcPr marL="50760" marR="50760" marT="50760" marB="50760" anchor="ctr" anchorCtr="0" horzOverflow="overflow">
+                    <a:lnL w="12240">
+                      <a:solidFill>
+                        <a:srgbClr val="000000"/>
+                      </a:solidFill>
+                    </a:lnL>
+                    <a:lnR w="12240">
+                      <a:solidFill>
+                        <a:srgbClr val="000000"/>
+                      </a:solidFill>
+                    </a:lnR>
+                    <a:lnT w="12240">
+                      <a:solidFill>
+                        <a:srgbClr val="000000"/>
+                      </a:solidFill>
+                    </a:lnT>
+                    <a:lnB w="12240">
+                      <a:solidFill>
+                        <a:srgbClr val="000000"/>
+                      </a:solidFill>
+                    </a:lnB>
+                    <a:noFill/>
+                  </a:tcPr>
+                </a:tc>
+                <a:tc>
+                  <a:txBody>
+                    <a:bodyPr/>
+                    <a:lstStyle/>
+                    <a:p>
+                      <a:pPr algn="ctr">
+                        <a:defRPr>
+                          <a:solidFill>
+                            <a:srgbClr val="000000"/>
+                          </a:solidFill>
+                        </a:defRPr>
+                      </a:pPr>
+                      <a:r>
+                        <a:rPr sz="3200">
+                          <a:sym typeface="Helvetica Neue"/>
+                        </a:rPr>
+                        <a:t>curl ( ~ 40MB )</a:t>
+                      </a:r>
+                    </a:p>
+                  </a:txBody>
+                  <a:tcPr marL="50760" marR="50760" marT="50760" marB="50760" anchor="ctr" anchorCtr="0" horzOverflow="overflow">
+                    <a:lnL w="12240">
+                      <a:solidFill>
+                        <a:srgbClr val="000000"/>
+                      </a:solidFill>
+                    </a:lnL>
+                    <a:lnR w="12240">
+                      <a:solidFill>
+                        <a:srgbClr val="000000"/>
+                      </a:solidFill>
+                    </a:lnR>
+                    <a:lnT w="12240">
+                      <a:solidFill>
+                        <a:srgbClr val="000000"/>
+                      </a:solidFill>
+                    </a:lnT>
+                    <a:lnB w="12240">
+                      <a:solidFill>
+                        <a:srgbClr val="000000"/>
+                      </a:solidFill>
+                    </a:lnB>
+                    <a:noFill/>
+                  </a:tcPr>
+                </a:tc>
+              </a:tr>
+              <a:tr h="1018800">
+                <a:tc>
+                  <a:txBody>
+                    <a:bodyPr/>
+                    <a:lstStyle/>
+                    <a:p>
+                      <a:pPr algn="ctr">
+                        <a:defRPr>
+                          <a:solidFill>
+                            <a:srgbClr val="000000"/>
+                          </a:solidFill>
+                        </a:defRPr>
+                      </a:pPr>
+                      <a:r>
+                        <a:rPr b="1" sz="3200">
+                          <a:sym typeface="Helvetica Neue"/>
+                        </a:rPr>
+                        <a:t>Test Data</a:t>
+                      </a:r>
+                    </a:p>
+                  </a:txBody>
+                  <a:tcPr marL="50760" marR="50760" marT="50760" marB="50760" anchor="ctr" anchorCtr="0" horzOverflow="overflow">
+                    <a:lnL w="12240">
+                      <a:solidFill>
+                        <a:srgbClr val="000000"/>
+                      </a:solidFill>
+                    </a:lnL>
+                    <a:lnR w="12240">
+                      <a:solidFill>
+                        <a:srgbClr val="000000"/>
+                      </a:solidFill>
+                    </a:lnR>
+                    <a:lnT w="12240">
+                      <a:solidFill>
+                        <a:srgbClr val="000000"/>
+                      </a:solidFill>
+                    </a:lnT>
+                    <a:lnB w="12240">
+                      <a:solidFill>
+                        <a:srgbClr val="000000"/>
+                      </a:solidFill>
+                    </a:lnB>
+                    <a:noFill/>
+                  </a:tcPr>
+                </a:tc>
+                <a:tc>
+                  <a:txBody>
+                    <a:bodyPr/>
+                    <a:lstStyle/>
+                    <a:p>
+                      <a:pPr algn="ctr">
+                        <a:defRPr>
+                          <a:solidFill>
+                            <a:srgbClr val="000000"/>
+                          </a:solidFill>
+                        </a:defRPr>
+                      </a:pPr>
+                      <a:r>
+                        <a:rPr sz="3200">
+                          <a:sym typeface="Helvetica Neue"/>
+                        </a:rPr>
+                        <a:t>zlib, unrar ( ~ 400MB )</a:t>
+                      </a:r>
+                    </a:p>
+                  </a:txBody>
+                  <a:tcPr marL="50760" marR="50760" marT="50760" marB="50760" anchor="ctr" anchorCtr="0" horzOverflow="overflow">
+                    <a:lnL w="12240">
+                      <a:solidFill>
+                        <a:srgbClr val="000000"/>
+                      </a:solidFill>
+                    </a:lnL>
+                    <a:lnR w="12240">
+                      <a:solidFill>
+                        <a:srgbClr val="000000"/>
+                      </a:solidFill>
+                    </a:lnR>
+                    <a:lnT w="12240">
+                      <a:solidFill>
+                        <a:srgbClr val="000000"/>
+                      </a:solidFill>
+                    </a:lnT>
+                    <a:lnB w="12240">
+                      <a:solidFill>
+                        <a:srgbClr val="000000"/>
+                      </a:solidFill>
+                    </a:lnB>
+                    <a:noFill/>
+                  </a:tcPr>
+                </a:tc>
+              </a:tr>
+            </a:tbl>
+          </a:graphicData>
+        </a:graphic>
+      </p:graphicFrame>
+    </p:spTree>
+  </p:cSld>
+  <p:clrMapOvr>
+    <a:masterClrMapping/>
+  </p:clrMapOvr>
+  <p:transition xmlns:p14="http://schemas.microsoft.com/office/powerpoint/2010/main" spd="med" advClick="1"/>
+</p:sld>
+</file>
+
+<file path=ppt/slides/slide12.xml><?xml version="1.0" encoding="utf-8"?>
+<p:sld xmlns:a="http://schemas.openxmlformats.org/drawingml/2006/main" xmlns:r="http://schemas.openxmlformats.org/officeDocument/2006/relationships" xmlns:p="http://schemas.openxmlformats.org/presentationml/2006/main" xmlns:m="http://schemas.openxmlformats.org/officeDocument/2006/math" xmlns:a14="http://schemas.microsoft.com/office/drawing/2010/main" showMasterSp="1" showMasterPhAnim="1">
+  <p:cSld>
+    <p:spTree>
+      <p:nvGrpSpPr>
+        <p:cNvPr id="1" name=""/>
+        <p:cNvGrpSpPr/>
+        <p:nvPr/>
+      </p:nvGrpSpPr>
+      <p:grpSpPr>
+        <a:xfrm>
+          <a:off x="0" y="0"/>
+          <a:ext cx="0" cy="0"/>
+          <a:chOff x="0" y="0"/>
+          <a:chExt cx="0" cy="0"/>
+        </a:xfrm>
+      </p:grpSpPr>
+      <p:sp>
+        <p:nvSpPr>
+          <p:cNvPr id="198" name="PlaceHolder 1"/>
+          <p:cNvSpPr txBox="1"/>
+          <p:nvPr>
+            <p:ph type="title"/>
+          </p:nvPr>
+        </p:nvSpPr>
+        <p:spPr>
+          <a:xfrm>
+            <a:off x="1206359" y="1079639"/>
+            <a:ext cx="21970802" cy="1432804"/>
+          </a:xfrm>
+          <a:prstGeom prst="rect">
+            <a:avLst/>
+          </a:prstGeom>
+        </p:spPr>
+        <p:txBody>
+          <a:bodyPr/>
+          <a:lstStyle>
+            <a:lvl1pPr>
+              <a:defRPr spc="-200"/>
+            </a:lvl1pPr>
+          </a:lstStyle>
+          <a:p>
+            <a:pPr/>
+            <a:r>
+              <a:t>Results</a:t>
+            </a:r>
+          </a:p>
+        </p:txBody>
+      </p:sp>
+      <p:graphicFrame>
+        <p:nvGraphicFramePr>
+          <p:cNvPr id="199" name="Tabelle"/>
+          <p:cNvGraphicFramePr/>
+          <p:nvPr/>
+        </p:nvGraphicFramePr>
+        <p:xfrm>
+          <a:off x="1670760" y="3283198"/>
+          <a:ext cx="21042480" cy="8242558"/>
+        </p:xfrm>
+        <a:graphic xmlns:a="http://schemas.openxmlformats.org/drawingml/2006/main">
+          <a:graphicData uri="http://schemas.openxmlformats.org/drawingml/2006/table">
+            <a:tbl>
+              <a:tblPr firstCol="0" firstRow="0" lastCol="0" lastRow="0" bandCol="0" bandRow="0" rtl="0">
+                <a:tableStyleId>{4C3C2611-4C71-4FC5-86AE-919BDF0F9419}</a:tableStyleId>
+              </a:tblPr>
+              <a:tblGrid>
+                <a:gridCol w="5260620"/>
+                <a:gridCol w="5260620"/>
+                <a:gridCol w="5260620"/>
+                <a:gridCol w="5260620"/>
+              </a:tblGrid>
+              <a:tr h="2060639">
+                <a:tc>
+                  <a:txBody>
+                    <a:bodyPr/>
+                    <a:lstStyle/>
+                    <a:p>
+                      <a:pPr>
+                        <a:defRPr sz="3200">
+                          <a:solidFill>
+                            <a:srgbClr val="000000"/>
+                          </a:solidFill>
+                          <a:sym typeface="Helvetica Neue"/>
+                        </a:defRPr>
+                      </a:pPr>
+                    </a:p>
+                  </a:txBody>
+                  <a:tcPr marL="50760" marR="50760" marT="50760" marB="50760" anchor="ctr" anchorCtr="0" horzOverflow="overflow">
+                    <a:lnL w="12240">
+                      <a:solidFill>
+                        <a:srgbClr val="000000"/>
+                      </a:solidFill>
+                    </a:lnL>
+                    <a:lnR w="12240">
+                      <a:solidFill>
+                        <a:srgbClr val="000000"/>
+                      </a:solidFill>
+                    </a:lnR>
+                    <a:lnT w="12240">
+                      <a:solidFill>
+                        <a:srgbClr val="000000"/>
+                      </a:solidFill>
+                    </a:lnT>
+                    <a:lnB w="12240">
+                      <a:solidFill>
+                        <a:srgbClr val="000000"/>
+                      </a:solidFill>
+                    </a:lnB>
+                    <a:noFill/>
+                  </a:tcPr>
+                </a:tc>
+                <a:tc>
+                  <a:txBody>
+                    <a:bodyPr/>
+                    <a:lstStyle/>
+                    <a:p>
+                      <a:pPr algn="ctr">
+                        <a:defRPr>
+                          <a:solidFill>
+                            <a:srgbClr val="000000"/>
+                          </a:solidFill>
+                        </a:defRPr>
+                      </a:pPr>
+                      <a:r>
+                        <a:rPr sz="3200">
+                          <a:sym typeface="Helvetica Neue"/>
+                        </a:rPr>
+                        <a:t>MRR</a:t>
+                      </a:r>
+                    </a:p>
+                  </a:txBody>
+                  <a:tcPr marL="50760" marR="50760" marT="50760" marB="50760" anchor="ctr" anchorCtr="0" horzOverflow="overflow">
+                    <a:lnL w="12240">
+                      <a:solidFill>
+                        <a:srgbClr val="000000"/>
+                      </a:solidFill>
+                    </a:lnL>
+                    <a:lnR w="12240">
+                      <a:solidFill>
+                        <a:srgbClr val="000000"/>
+                      </a:solidFill>
+                    </a:lnR>
+                    <a:lnT w="12240">
+                      <a:solidFill>
+                        <a:srgbClr val="000000"/>
+                      </a:solidFill>
+                    </a:lnT>
+                    <a:lnB w="12240">
+                      <a:solidFill>
+                        <a:srgbClr val="000000"/>
+                      </a:solidFill>
+                    </a:lnB>
+                    <a:noFill/>
+                  </a:tcPr>
+                </a:tc>
+                <a:tc>
+                  <a:txBody>
+                    <a:bodyPr/>
+                    <a:lstStyle/>
+                    <a:p>
+                      <a:pPr algn="ctr">
+                        <a:defRPr>
+                          <a:solidFill>
+                            <a:srgbClr val="000000"/>
+                          </a:solidFill>
+                        </a:defRPr>
+                      </a:pPr>
+                      <a:r>
+                        <a:rPr sz="3200">
+                          <a:sym typeface="Helvetica Neue"/>
+                        </a:rPr>
+                        <a:t>nDCG</a:t>
+                      </a:r>
+                    </a:p>
+                  </a:txBody>
+                  <a:tcPr marL="50760" marR="50760" marT="50760" marB="50760" anchor="ctr" anchorCtr="0" horzOverflow="overflow">
+                    <a:lnL w="12240">
+                      <a:solidFill>
+                        <a:srgbClr val="000000"/>
+                      </a:solidFill>
+                    </a:lnL>
+                    <a:lnR w="12240">
+                      <a:solidFill>
+                        <a:srgbClr val="000000"/>
+                      </a:solidFill>
+                    </a:lnR>
+                    <a:lnT w="12240">
+                      <a:solidFill>
+                        <a:srgbClr val="000000"/>
+                      </a:solidFill>
+                    </a:lnT>
+                    <a:lnB w="12240">
+                      <a:solidFill>
+                        <a:srgbClr val="000000"/>
+                      </a:solidFill>
+                    </a:lnB>
+                    <a:noFill/>
+                  </a:tcPr>
+                </a:tc>
+                <a:tc>
+                  <a:txBody>
+                    <a:bodyPr/>
+                    <a:lstStyle/>
+                    <a:p>
+                      <a:pPr algn="ctr">
+                        <a:defRPr>
+                          <a:solidFill>
+                            <a:srgbClr val="000000"/>
+                          </a:solidFill>
+                        </a:defRPr>
+                      </a:pPr>
+                      <a:r>
+                        <a:rPr sz="3200">
+                          <a:sym typeface="Helvetica Neue"/>
+                        </a:rPr>
+                        <a:t>Prec@10 (top_K)</a:t>
+                      </a:r>
+                    </a:p>
+                  </a:txBody>
+                  <a:tcPr marL="50760" marR="50760" marT="50760" marB="50760" anchor="ctr" anchorCtr="0" horzOverflow="overflow">
+                    <a:lnL w="12240">
+                      <a:solidFill>
+                        <a:srgbClr val="000000"/>
+                      </a:solidFill>
+                    </a:lnL>
+                    <a:lnR w="12240">
+                      <a:solidFill>
+                        <a:srgbClr val="000000"/>
+                      </a:solidFill>
+                    </a:lnR>
+                    <a:lnT w="12240">
+                      <a:solidFill>
+                        <a:srgbClr val="000000"/>
+                      </a:solidFill>
+                    </a:lnT>
+                    <a:lnB w="12240">
+                      <a:solidFill>
+                        <a:srgbClr val="000000"/>
+                      </a:solidFill>
+                    </a:lnB>
+                    <a:noFill/>
+                  </a:tcPr>
+                </a:tc>
+              </a:tr>
+              <a:tr h="2060639">
+                <a:tc>
+                  <a:txBody>
+                    <a:bodyPr/>
+                    <a:lstStyle/>
+                    <a:p>
+                      <a:pPr algn="ctr">
+                        <a:defRPr>
+                          <a:solidFill>
+                            <a:srgbClr val="000000"/>
+                          </a:solidFill>
+                        </a:defRPr>
+                      </a:pPr>
+                      <a:r>
+                        <a:rPr sz="3200">
+                          <a:sym typeface="Helvetica Neue"/>
+                        </a:rPr>
+                        <a:t>Traditional MLM</a:t>
+                      </a:r>
+                    </a:p>
+                  </a:txBody>
+                  <a:tcPr marL="50760" marR="50760" marT="50760" marB="50760" anchor="ctr" anchorCtr="0" horzOverflow="overflow">
+                    <a:lnL w="12240">
+                      <a:solidFill>
+                        <a:srgbClr val="000000"/>
+                      </a:solidFill>
+                    </a:lnL>
+                    <a:lnR w="12240">
+                      <a:solidFill>
+                        <a:srgbClr val="000000"/>
+                      </a:solidFill>
+                    </a:lnR>
+                    <a:lnT w="12240">
+                      <a:solidFill>
+                        <a:srgbClr val="000000"/>
+                      </a:solidFill>
+                    </a:lnT>
+                    <a:lnB w="12240">
+                      <a:solidFill>
+                        <a:srgbClr val="000000"/>
+                      </a:solidFill>
+                    </a:lnB>
+                    <a:noFill/>
+                  </a:tcPr>
+                </a:tc>
+                <a:tc>
+                  <a:txBody>
+                    <a:bodyPr/>
+                    <a:lstStyle/>
+                    <a:p>
+                      <a:pPr algn="ctr">
+                        <a:defRPr>
+                          <a:solidFill>
+                            <a:srgbClr val="000000"/>
+                          </a:solidFill>
+                        </a:defRPr>
+                      </a:pPr>
+                      <a:r>
+                        <a:rPr sz="3200">
+                          <a:sym typeface="Helvetica Neue"/>
+                        </a:rPr>
+                        <a:t>0.108</a:t>
+                      </a:r>
+                    </a:p>
+                  </a:txBody>
+                  <a:tcPr marL="50760" marR="50760" marT="50760" marB="50760" anchor="ctr" anchorCtr="0" horzOverflow="overflow">
+                    <a:lnL w="12240">
+                      <a:solidFill>
+                        <a:srgbClr val="000000"/>
+                      </a:solidFill>
+                    </a:lnL>
+                    <a:lnR w="12240">
+                      <a:solidFill>
+                        <a:srgbClr val="000000"/>
+                      </a:solidFill>
+                    </a:lnR>
+                    <a:lnT w="12240">
+                      <a:solidFill>
+                        <a:srgbClr val="000000"/>
+                      </a:solidFill>
+                    </a:lnT>
+                    <a:lnB w="12240">
+                      <a:solidFill>
+                        <a:srgbClr val="000000"/>
+                      </a:solidFill>
+                    </a:lnB>
+                    <a:noFill/>
+                  </a:tcPr>
+                </a:tc>
+                <a:tc>
+                  <a:txBody>
+                    <a:bodyPr/>
+                    <a:lstStyle/>
+                    <a:p>
+                      <a:pPr algn="ctr">
+                        <a:defRPr>
+                          <a:solidFill>
+                            <a:srgbClr val="000000"/>
+                          </a:solidFill>
+                        </a:defRPr>
+                      </a:pPr>
+                      <a:r>
+                        <a:rPr sz="3200">
+                          <a:sym typeface="Helvetica Neue"/>
+                        </a:rPr>
+                        <a:t>0.855</a:t>
+                      </a:r>
+                    </a:p>
+                  </a:txBody>
+                  <a:tcPr marL="50760" marR="50760" marT="50760" marB="50760" anchor="ctr" anchorCtr="0" horzOverflow="overflow">
+                    <a:lnL w="12240">
+                      <a:solidFill>
+                        <a:srgbClr val="000000"/>
+                      </a:solidFill>
+                    </a:lnL>
+                    <a:lnR w="12240">
+                      <a:solidFill>
+                        <a:srgbClr val="000000"/>
+                      </a:solidFill>
+                    </a:lnR>
+                    <a:lnT w="12240">
+                      <a:solidFill>
+                        <a:srgbClr val="000000"/>
+                      </a:solidFill>
+                    </a:lnT>
+                    <a:lnB w="12240">
+                      <a:solidFill>
+                        <a:srgbClr val="000000"/>
+                      </a:solidFill>
+                    </a:lnB>
+                    <a:noFill/>
+                  </a:tcPr>
+                </a:tc>
+                <a:tc>
+                  <a:txBody>
+                    <a:bodyPr/>
+                    <a:lstStyle/>
+                    <a:p>
+                      <a:pPr algn="ctr">
+                        <a:defRPr>
+                          <a:solidFill>
+                            <a:srgbClr val="000000"/>
+                          </a:solidFill>
+                        </a:defRPr>
+                      </a:pPr>
+                      <a:r>
+                        <a:rPr sz="3200">
+                          <a:sym typeface="Helvetica Neue"/>
+                        </a:rPr>
+                        <a:t>0.870</a:t>
+                      </a:r>
+                    </a:p>
+                  </a:txBody>
+                  <a:tcPr marL="50760" marR="50760" marT="50760" marB="50760" anchor="ctr" anchorCtr="0" horzOverflow="overflow">
+                    <a:lnL w="12240">
+                      <a:solidFill>
+                        <a:srgbClr val="000000"/>
+                      </a:solidFill>
+                    </a:lnL>
+                    <a:lnR w="12240">
+                      <a:solidFill>
+                        <a:srgbClr val="000000"/>
+                      </a:solidFill>
+                    </a:lnR>
+                    <a:lnT w="12240">
+                      <a:solidFill>
+                        <a:srgbClr val="000000"/>
+                      </a:solidFill>
+                    </a:lnT>
+                    <a:lnB w="12240">
+                      <a:solidFill>
+                        <a:srgbClr val="000000"/>
+                      </a:solidFill>
+                    </a:lnB>
+                    <a:noFill/>
+                  </a:tcPr>
+                </a:tc>
+              </a:tr>
+              <a:tr h="2060639">
+                <a:tc>
+                  <a:txBody>
+                    <a:bodyPr/>
+                    <a:lstStyle/>
+                    <a:p>
+                      <a:pPr algn="ctr">
+                        <a:defRPr>
+                          <a:solidFill>
+                            <a:srgbClr val="000000"/>
+                          </a:solidFill>
+                        </a:defRPr>
+                      </a:pPr>
+                      <a:r>
+                        <a:rPr sz="3200">
+                          <a:sym typeface="Helvetica Neue"/>
+                        </a:rPr>
+                        <a:t>MLM -&gt; Opcodes</a:t>
+                      </a:r>
+                    </a:p>
+                  </a:txBody>
+                  <a:tcPr marL="50760" marR="50760" marT="50760" marB="50760" anchor="ctr" anchorCtr="0" horzOverflow="overflow">
+                    <a:lnL w="12240">
+                      <a:solidFill>
+                        <a:srgbClr val="000000"/>
+                      </a:solidFill>
+                    </a:lnL>
+                    <a:lnR w="12240">
+                      <a:solidFill>
+                        <a:srgbClr val="000000"/>
+                      </a:solidFill>
+                    </a:lnR>
+                    <a:lnT w="12240">
+                      <a:solidFill>
+                        <a:srgbClr val="000000"/>
+                      </a:solidFill>
+                    </a:lnT>
+                    <a:lnB w="12240">
+                      <a:solidFill>
+                        <a:srgbClr val="000000"/>
+                      </a:solidFill>
+                    </a:lnB>
+                    <a:noFill/>
+                  </a:tcPr>
+                </a:tc>
+                <a:tc>
+                  <a:txBody>
+                    <a:bodyPr/>
+                    <a:lstStyle/>
+                    <a:p>
+                      <a:pPr algn="ctr">
+                        <a:defRPr>
+                          <a:solidFill>
+                            <a:srgbClr val="000000"/>
+                          </a:solidFill>
+                        </a:defRPr>
+                      </a:pPr>
+                      <a:r>
+                        <a:rPr sz="3200">
+                          <a:sym typeface="Helvetica Neue"/>
+                        </a:rPr>
+                        <a:t>0.108</a:t>
+                      </a:r>
+                    </a:p>
+                  </a:txBody>
+                  <a:tcPr marL="50760" marR="50760" marT="50760" marB="50760" anchor="ctr" anchorCtr="0" horzOverflow="overflow">
+                    <a:lnL w="12240">
+                      <a:solidFill>
+                        <a:srgbClr val="000000"/>
+                      </a:solidFill>
+                    </a:lnL>
+                    <a:lnR w="12240">
+                      <a:solidFill>
+                        <a:srgbClr val="000000"/>
+                      </a:solidFill>
+                    </a:lnR>
+                    <a:lnT w="12240">
+                      <a:solidFill>
+                        <a:srgbClr val="000000"/>
+                      </a:solidFill>
+                    </a:lnT>
+                    <a:lnB w="12240">
+                      <a:solidFill>
+                        <a:srgbClr val="000000"/>
+                      </a:solidFill>
+                    </a:lnB>
+                    <a:noFill/>
+                  </a:tcPr>
+                </a:tc>
+                <a:tc>
+                  <a:txBody>
+                    <a:bodyPr/>
+                    <a:lstStyle/>
+                    <a:p>
+                      <a:pPr algn="ctr">
+                        <a:defRPr>
+                          <a:solidFill>
+                            <a:srgbClr val="000000"/>
+                          </a:solidFill>
+                        </a:defRPr>
+                      </a:pPr>
+                      <a:r>
+                        <a:rPr sz="3200">
+                          <a:sym typeface="Helvetica Neue"/>
+                        </a:rPr>
+                        <a:t>0.840</a:t>
+                      </a:r>
+                    </a:p>
+                  </a:txBody>
+                  <a:tcPr marL="50760" marR="50760" marT="50760" marB="50760" anchor="ctr" anchorCtr="0" horzOverflow="overflow">
+                    <a:lnL w="12240">
+                      <a:solidFill>
+                        <a:srgbClr val="000000"/>
+                      </a:solidFill>
+                    </a:lnL>
+                    <a:lnR w="12240">
+                      <a:solidFill>
+                        <a:srgbClr val="000000"/>
+                      </a:solidFill>
+                    </a:lnR>
+                    <a:lnT w="12240">
+                      <a:solidFill>
+                        <a:srgbClr val="000000"/>
+                      </a:solidFill>
+                    </a:lnT>
+                    <a:lnB w="12240">
+                      <a:solidFill>
+                        <a:srgbClr val="000000"/>
+                      </a:solidFill>
+                    </a:lnB>
+                    <a:noFill/>
+                  </a:tcPr>
+                </a:tc>
+                <a:tc>
+                  <a:txBody>
+                    <a:bodyPr/>
+                    <a:lstStyle/>
+                    <a:p>
+                      <a:pPr algn="ctr">
+                        <a:defRPr>
+                          <a:solidFill>
+                            <a:srgbClr val="000000"/>
+                          </a:solidFill>
+                        </a:defRPr>
+                      </a:pPr>
+                      <a:r>
+                        <a:rPr sz="3200">
+                          <a:sym typeface="Helvetica Neue"/>
+                        </a:rPr>
+                        <a:t>0.867</a:t>
+                      </a:r>
+                    </a:p>
+                  </a:txBody>
+                  <a:tcPr marL="50760" marR="50760" marT="50760" marB="50760" anchor="ctr" anchorCtr="0" horzOverflow="overflow">
+                    <a:lnL w="12240">
+                      <a:solidFill>
+                        <a:srgbClr val="000000"/>
+                      </a:solidFill>
+                    </a:lnL>
+                    <a:lnR w="12240">
+                      <a:solidFill>
+                        <a:srgbClr val="000000"/>
+                      </a:solidFill>
+                    </a:lnR>
+                    <a:lnT w="12240">
+                      <a:solidFill>
+                        <a:srgbClr val="000000"/>
+                      </a:solidFill>
+                    </a:lnT>
+                    <a:lnB w="12240">
+                      <a:solidFill>
+                        <a:srgbClr val="000000"/>
+                      </a:solidFill>
+                    </a:lnB>
+                    <a:noFill/>
+                  </a:tcPr>
+                </a:tc>
+              </a:tr>
+              <a:tr h="2060639">
+                <a:tc>
+                  <a:txBody>
+                    <a:bodyPr/>
+                    <a:lstStyle/>
+                    <a:p>
+                      <a:pPr algn="ctr">
+                        <a:defRPr>
+                          <a:solidFill>
+                            <a:srgbClr val="000000"/>
+                          </a:solidFill>
+                        </a:defRPr>
+                      </a:pPr>
+                      <a:r>
+                        <a:rPr sz="3200">
+                          <a:sym typeface="Helvetica Neue"/>
+                        </a:rPr>
+                        <a:t>MLM -&gt; Operands</a:t>
+                      </a:r>
+                    </a:p>
+                  </a:txBody>
+                  <a:tcPr marL="50760" marR="50760" marT="50760" marB="50760" anchor="ctr" anchorCtr="0" horzOverflow="overflow">
+                    <a:lnL w="12240">
+                      <a:solidFill>
+                        <a:srgbClr val="000000"/>
+                      </a:solidFill>
+                    </a:lnL>
+                    <a:lnR w="12240">
+                      <a:solidFill>
+                        <a:srgbClr val="000000"/>
+                      </a:solidFill>
+                    </a:lnR>
+                    <a:lnT w="12240">
+                      <a:solidFill>
+                        <a:srgbClr val="000000"/>
+                      </a:solidFill>
+                    </a:lnT>
+                    <a:lnB w="12240">
+                      <a:solidFill>
+                        <a:srgbClr val="000000"/>
+                      </a:solidFill>
+                    </a:lnB>
+                    <a:noFill/>
+                  </a:tcPr>
+                </a:tc>
+                <a:tc>
+                  <a:txBody>
+                    <a:bodyPr/>
+                    <a:lstStyle/>
+                    <a:p>
+                      <a:pPr algn="ctr">
+                        <a:defRPr sz="3200">
+                          <a:solidFill>
+                            <a:srgbClr val="000000"/>
+                          </a:solidFill>
+                          <a:sym typeface="Helvetica Neue"/>
+                        </a:defRPr>
+                      </a:pPr>
+                    </a:p>
+                  </a:txBody>
+                  <a:tcPr marL="50760" marR="50760" marT="50760" marB="50760" anchor="ctr" anchorCtr="0" horzOverflow="overflow">
+                    <a:lnL w="12240">
+                      <a:solidFill>
+                        <a:srgbClr val="000000"/>
+                      </a:solidFill>
+                    </a:lnL>
+                    <a:lnR w="12240">
+                      <a:solidFill>
+                        <a:srgbClr val="000000"/>
+                      </a:solidFill>
+                    </a:lnR>
+                    <a:lnT w="12240">
+                      <a:solidFill>
+                        <a:srgbClr val="000000"/>
+                      </a:solidFill>
+                    </a:lnT>
+                    <a:lnB w="12240">
+                      <a:solidFill>
+                        <a:srgbClr val="000000"/>
+                      </a:solidFill>
+                    </a:lnB>
+                    <a:noFill/>
+                  </a:tcPr>
+                </a:tc>
+                <a:tc>
+                  <a:txBody>
+                    <a:bodyPr/>
+                    <a:lstStyle/>
+                    <a:p>
+                      <a:pPr algn="ctr">
+                        <a:defRPr sz="3200">
+                          <a:solidFill>
+                            <a:srgbClr val="000000"/>
+                          </a:solidFill>
+                          <a:sym typeface="Helvetica Neue"/>
+                        </a:defRPr>
+                      </a:pPr>
+                    </a:p>
+                  </a:txBody>
+                  <a:tcPr marL="50760" marR="50760" marT="50760" marB="50760" anchor="ctr" anchorCtr="0" horzOverflow="overflow">
+                    <a:lnL w="12240">
+                      <a:solidFill>
+                        <a:srgbClr val="000000"/>
+                      </a:solidFill>
+                    </a:lnL>
+                    <a:lnR w="12240">
+                      <a:solidFill>
+                        <a:srgbClr val="000000"/>
+                      </a:solidFill>
+                    </a:lnR>
+                    <a:lnT w="12240">
+                      <a:solidFill>
+                        <a:srgbClr val="000000"/>
+                      </a:solidFill>
+                    </a:lnT>
+                    <a:lnB w="12240">
+                      <a:solidFill>
+                        <a:srgbClr val="000000"/>
+                      </a:solidFill>
+                    </a:lnB>
+                    <a:noFill/>
+                  </a:tcPr>
+                </a:tc>
+                <a:tc>
+                  <a:txBody>
+                    <a:bodyPr/>
+                    <a:lstStyle/>
+                    <a:p>
+                      <a:pPr algn="ctr">
+                        <a:defRPr sz="3200">
+                          <a:solidFill>
+                            <a:srgbClr val="000000"/>
+                          </a:solidFill>
+                          <a:sym typeface="Helvetica Neue"/>
+                        </a:defRPr>
+                      </a:pPr>
+                    </a:p>
+                  </a:txBody>
+                  <a:tcPr marL="50760" marR="50760" marT="50760" marB="50760" anchor="ctr" anchorCtr="0" horzOverflow="overflow">
+                    <a:lnL w="12240">
+                      <a:solidFill>
+                        <a:srgbClr val="000000"/>
+                      </a:solidFill>
+                    </a:lnL>
+                    <a:lnR w="12240">
+                      <a:solidFill>
+                        <a:srgbClr val="000000"/>
+                      </a:solidFill>
+                    </a:lnR>
+                    <a:lnT w="12240">
+                      <a:solidFill>
+                        <a:srgbClr val="000000"/>
+                      </a:solidFill>
+                    </a:lnT>
+                    <a:lnB w="12240">
+                      <a:solidFill>
+                        <a:srgbClr val="000000"/>
+                      </a:solidFill>
+                    </a:lnB>
+                    <a:noFill/>
+                  </a:tcPr>
+                </a:tc>
+              </a:tr>
+            </a:tbl>
+          </a:graphicData>
+        </a:graphic>
+      </p:graphicFrame>
     </p:spTree>
   </p:cSld>
   <p:clrMapOvr>
@@ -4119,8 +5975,8 @@
         </p:nvSpPr>
         <p:spPr>
           <a:xfrm>
-            <a:off x="1206359" y="2992679"/>
-            <a:ext cx="21970802" cy="8255521"/>
+            <a:off x="1206359" y="2992678"/>
+            <a:ext cx="21970802" cy="8255522"/>
           </a:xfrm>
           <a:prstGeom prst="rect">
             <a:avLst/>
@@ -4676,7 +6532,7 @@
         <p:spPr>
           <a:xfrm>
             <a:off x="1206359" y="4248360"/>
-            <a:ext cx="21970802" cy="8255522"/>
+            <a:ext cx="21970802" cy="8255521"/>
           </a:xfrm>
           <a:prstGeom prst="rect">
             <a:avLst/>
@@ -4913,7 +6769,7 @@
         <p:spPr>
           <a:xfrm>
             <a:off x="1206359" y="4248360"/>
-            <a:ext cx="21970802" cy="8255522"/>
+            <a:ext cx="21970802" cy="8255521"/>
           </a:xfrm>
           <a:prstGeom prst="rect">
             <a:avLst/>
@@ -5028,7 +6884,7 @@
 </file>
 
 <file path=ppt/slides/slide6.xml><?xml version="1.0" encoding="utf-8"?>
-<p:sld xmlns:a="http://schemas.openxmlformats.org/drawingml/2006/main" xmlns:r="http://schemas.openxmlformats.org/officeDocument/2006/relationships" xmlns:p="http://schemas.openxmlformats.org/presentationml/2006/main" xmlns:m="http://schemas.openxmlformats.org/officeDocument/2006/math" xmlns:a14="http://schemas.microsoft.com/office/drawing/2010/main" showMasterSp="1" showMasterPhAnim="1">
+<p:sld xmlns:a="http://schemas.openxmlformats.org/drawingml/2006/main" xmlns:r="http://schemas.openxmlformats.org/officeDocument/2006/relationships" xmlns:p="http://schemas.openxmlformats.org/presentationml/2006/main" xmlns:m="http://schemas.openxmlformats.org/officeDocument/2006/math" xmlns:a14="http://schemas.microsoft.com/office/drawing/2010/main" show="0" showMasterSp="1" showMasterPhAnim="1">
   <p:cSld>
     <p:spTree>
       <p:nvGrpSpPr>
@@ -5330,28 +7186,20 @@
       </p:grpSpPr>
       <p:sp>
         <p:nvSpPr>
-          <p:cNvPr id="173" name="PlaceHolder 1"/>
+          <p:cNvPr id="173" name="Inference"/>
           <p:cNvSpPr txBox="1"/>
           <p:nvPr>
             <p:ph type="title"/>
           </p:nvPr>
         </p:nvSpPr>
         <p:spPr>
-          <a:xfrm>
-            <a:off x="1206359" y="1079639"/>
-            <a:ext cx="21970802" cy="1432804"/>
-          </a:xfrm>
           <a:prstGeom prst="rect">
             <a:avLst/>
           </a:prstGeom>
         </p:spPr>
         <p:txBody>
           <a:bodyPr/>
-          <a:lstStyle>
-            <a:lvl1pPr>
-              <a:defRPr spc="-200"/>
-            </a:lvl1pPr>
-          </a:lstStyle>
+          <a:lstStyle/>
           <a:p>
             <a:pPr/>
             <a:r>
@@ -5362,35 +7210,24 @@
       </p:sp>
       <p:sp>
         <p:nvSpPr>
-          <p:cNvPr id="174" name="PlaceHolder 2"/>
+          <p:cNvPr id="174" name="Function Pool Setup"/>
           <p:cNvSpPr txBox="1"/>
           <p:nvPr>
             <p:ph type="body" sz="quarter" idx="1"/>
           </p:nvPr>
         </p:nvSpPr>
         <p:spPr>
-          <a:xfrm>
-            <a:off x="1206359" y="2373120"/>
-            <a:ext cx="21970802" cy="934563"/>
-          </a:xfrm>
           <a:prstGeom prst="rect">
             <a:avLst/>
           </a:prstGeom>
         </p:spPr>
         <p:txBody>
           <a:bodyPr/>
-          <a:lstStyle>
-            <a:lvl1pPr defTabSz="1609200">
-              <a:lnSpc>
-                <a:spcPct val="80000"/>
-              </a:lnSpc>
-              <a:defRPr spc="-200" sz="5600"/>
-            </a:lvl1pPr>
-          </a:lstStyle>
+          <a:lstStyle/>
           <a:p>
             <a:pPr/>
             <a:r>
-              <a:t>Function Pools 2</a:t>
+              <a:t>Function Pool Setup</a:t>
             </a:r>
           </a:p>
         </p:txBody>
@@ -5403,8 +7240,8 @@
         </p:nvSpPr>
         <p:spPr>
           <a:xfrm>
-            <a:off x="1206359" y="4248360"/>
-            <a:ext cx="21970802" cy="8255522"/>
+            <a:off x="1206359" y="4035308"/>
+            <a:ext cx="8157053" cy="8255522"/>
           </a:xfrm>
           <a:prstGeom prst="rect">
             <a:avLst/>
@@ -5424,12 +7261,12 @@
           </a:bodyPr>
           <a:lstStyle/>
           <a:p>
-            <a:pPr marL="609478" indent="-609478" defTabSz="2438280">
+            <a:pPr lvl="2" marL="560880" indent="-560880" defTabSz="2243159">
               <a:lnSpc>
                 <a:spcPct val="90000"/>
               </a:lnSpc>
               <a:spcBef>
-                <a:spcPts val="4500"/>
+                <a:spcPts val="4000"/>
               </a:spcBef>
               <a:buClr>
                 <a:srgbClr val="000000"/>
@@ -5437,7 +7274,7 @@
               <a:buSzPct val="123000"/>
               <a:buFont typeface="Symbol"/>
               <a:buChar char="·"/>
-              <a:defRPr sz="4800">
+              <a:defRPr sz="4400">
                 <a:solidFill>
                   <a:srgbClr val="000000"/>
                 </a:solidFill>
@@ -5448,16 +7285,16 @@
               </a:defRPr>
             </a:pPr>
             <a:r>
-              <a:t>200 Negative Samples: </a:t>
-            </a:r>
-          </a:p>
-          <a:p>
-            <a:pPr lvl="2" marL="1828800" indent="-609480" defTabSz="2438280">
+              <a:t>Anchor = arbitrary function variant</a:t>
+            </a:r>
+          </a:p>
+          <a:p>
+            <a:pPr lvl="2" marL="560880" indent="-560880" defTabSz="2243159">
               <a:lnSpc>
                 <a:spcPct val="90000"/>
               </a:lnSpc>
               <a:spcBef>
-                <a:spcPts val="4500"/>
+                <a:spcPts val="4000"/>
               </a:spcBef>
               <a:buClr>
                 <a:srgbClr val="000000"/>
@@ -5465,7 +7302,7 @@
               <a:buSzPct val="123000"/>
               <a:buFont typeface="Symbol"/>
               <a:buChar char="·"/>
-              <a:defRPr sz="4800">
+              <a:defRPr sz="4400">
                 <a:solidFill>
                   <a:srgbClr val="000000"/>
                 </a:solidFill>
@@ -5476,16 +7313,16 @@
               </a:defRPr>
             </a:pPr>
             <a:r>
-              <a:t>Randomly pick 100 samples from each of the two test projects</a:t>
-            </a:r>
-          </a:p>
-          <a:p>
-            <a:pPr lvl="2" marL="1828800" indent="-609480" defTabSz="2438280">
+              <a:t>N = number of all positive samples across the anchors’ project (mininum 7)</a:t>
+            </a:r>
+          </a:p>
+          <a:p>
+            <a:pPr marL="560880" indent="-560880" defTabSz="2243159">
               <a:lnSpc>
                 <a:spcPct val="90000"/>
               </a:lnSpc>
               <a:spcBef>
-                <a:spcPts val="4500"/>
+                <a:spcPts val="4000"/>
               </a:spcBef>
               <a:buClr>
                 <a:srgbClr val="000000"/>
@@ -5493,7 +7330,7 @@
               <a:buSzPct val="123000"/>
               <a:buFont typeface="Symbol"/>
               <a:buChar char="·"/>
-              <a:defRPr sz="4800">
+              <a:defRPr sz="4400">
                 <a:solidFill>
                   <a:srgbClr val="000000"/>
                 </a:solidFill>
@@ -5504,67 +7341,40 @@
               </a:defRPr>
             </a:pPr>
             <a:r>
-              <a:t>Ensure each sample has a different name than the anchor</a:t>
-            </a:r>
-          </a:p>
-          <a:p>
-            <a:pPr marL="609478" indent="-609478" defTabSz="2438280">
-              <a:lnSpc>
-                <a:spcPct val="90000"/>
-              </a:lnSpc>
-              <a:spcBef>
-                <a:spcPts val="4500"/>
-              </a:spcBef>
-              <a:buClr>
-                <a:srgbClr val="000000"/>
-              </a:buClr>
-              <a:buSzPct val="123000"/>
-              <a:buFont typeface="Symbol"/>
-              <a:buChar char="·"/>
-              <a:defRPr sz="4800">
-                <a:solidFill>
-                  <a:srgbClr val="000000"/>
-                </a:solidFill>
-                <a:latin typeface="+mj-lt"/>
-                <a:ea typeface="+mj-ea"/>
-                <a:cs typeface="+mj-cs"/>
-                <a:sym typeface="Helvetica Neue"/>
-              </a:defRPr>
-            </a:pPr>
-            <a:r>
-              <a:t>Anchor Function:</a:t>
-            </a:r>
-          </a:p>
-          <a:p>
-            <a:pPr lvl="3" marL="2438280" indent="-609480" defTabSz="2438280">
-              <a:lnSpc>
-                <a:spcPct val="90000"/>
-              </a:lnSpc>
-              <a:spcBef>
-                <a:spcPts val="4500"/>
-              </a:spcBef>
-              <a:buClr>
-                <a:srgbClr val="000000"/>
-              </a:buClr>
-              <a:buSzPct val="123000"/>
-              <a:buFont typeface="Symbol"/>
-              <a:buChar char="·"/>
-              <a:defRPr sz="4800">
-                <a:solidFill>
-                  <a:srgbClr val="000000"/>
-                </a:solidFill>
-                <a:latin typeface="+mj-lt"/>
-                <a:ea typeface="+mj-ea"/>
-                <a:cs typeface="+mj-cs"/>
-                <a:sym typeface="Helvetica Neue"/>
-              </a:defRPr>
-            </a:pPr>
-            <a:r>
-              <a:t>pick an arbitrary variant of similar named functions</a:t>
+              <a:t>K = number of negative samples per test project</a:t>
             </a:r>
           </a:p>
         </p:txBody>
       </p:sp>
+      <p:pic>
+        <p:nvPicPr>
+          <p:cNvPr id="176" name="Bild" descr="Bild"/>
+          <p:cNvPicPr>
+            <a:picLocks noChangeAspect="1"/>
+          </p:cNvPicPr>
+          <p:nvPr/>
+        </p:nvPicPr>
+        <p:blipFill>
+          <a:blip r:embed="rId2">
+            <a:extLst/>
+          </a:blip>
+          <a:stretch>
+            <a:fillRect/>
+          </a:stretch>
+        </p:blipFill>
+        <p:spPr>
+          <a:xfrm>
+            <a:off x="9729506" y="2657123"/>
+            <a:ext cx="13191643" cy="8401754"/>
+          </a:xfrm>
+          <a:prstGeom prst="rect">
+            <a:avLst/>
+          </a:prstGeom>
+          <a:ln w="12700">
+            <a:miter lim="400000"/>
+          </a:ln>
+        </p:spPr>
+      </p:pic>
     </p:spTree>
   </p:cSld>
   <p:clrMapOvr>
@@ -5593,786 +7403,236 @@
       </p:grpSpPr>
       <p:sp>
         <p:nvSpPr>
-          <p:cNvPr id="177" name="PlaceHolder 1"/>
+          <p:cNvPr id="178" name="Positive Samples Filtering"/>
           <p:cNvSpPr txBox="1"/>
           <p:nvPr>
-            <p:ph type="title"/>
+            <p:ph type="ctrTitle"/>
           </p:nvPr>
         </p:nvSpPr>
         <p:spPr>
-          <a:xfrm>
-            <a:off x="1206359" y="1079639"/>
-            <a:ext cx="21970802" cy="1432804"/>
-          </a:xfrm>
           <a:prstGeom prst="rect">
             <a:avLst/>
           </a:prstGeom>
         </p:spPr>
         <p:txBody>
           <a:bodyPr/>
-          <a:lstStyle>
-            <a:lvl1pPr>
-              <a:defRPr spc="-200"/>
-            </a:lvl1pPr>
-          </a:lstStyle>
+          <a:lstStyle/>
           <a:p>
             <a:pPr/>
             <a:r>
-              <a:t>Training Hyperparameters</a:t>
+              <a:t>Positive Samples Filtering</a:t>
             </a:r>
           </a:p>
         </p:txBody>
       </p:sp>
-      <p:graphicFrame>
-        <p:nvGraphicFramePr>
-          <p:cNvPr id="178" name="Tabelle"/>
-          <p:cNvGraphicFramePr/>
+      <p:sp>
+        <p:nvSpPr>
+          <p:cNvPr id="179" name="Duplicated Assembly"/>
+          <p:cNvSpPr txBox="1"/>
+          <p:nvPr>
+            <p:ph type="subTitle" sz="quarter" idx="1"/>
+          </p:nvPr>
+        </p:nvSpPr>
+        <p:spPr>
+          <a:prstGeom prst="rect">
+            <a:avLst/>
+          </a:prstGeom>
+        </p:spPr>
+        <p:txBody>
+          <a:bodyPr/>
+          <a:lstStyle/>
+          <a:p>
+            <a:pPr lvl="1"/>
+            <a:r>
+              <a:t>Duplicated Assembly</a:t>
+            </a:r>
+          </a:p>
+        </p:txBody>
+      </p:sp>
+      <p:sp>
+        <p:nvSpPr>
+          <p:cNvPr id="180" name="PlaceHolder 3"/>
+          <p:cNvSpPr/>
+          <p:nvPr>
+            <p:ph type="body" idx="21"/>
+          </p:nvPr>
+        </p:nvSpPr>
+        <p:spPr>
+          <a:prstGeom prst="rect">
+            <a:avLst/>
+          </a:prstGeom>
+        </p:spPr>
+        <p:txBody>
+          <a:bodyPr/>
+          <a:lstStyle/>
+          <a:p>
+            <a:pPr/>
+          </a:p>
+        </p:txBody>
+      </p:sp>
+      <p:pic>
+        <p:nvPicPr>
+          <p:cNvPr id="181" name="Bild" descr="Bild"/>
+          <p:cNvPicPr>
+            <a:picLocks noChangeAspect="1"/>
+          </p:cNvPicPr>
           <p:nvPr/>
-        </p:nvGraphicFramePr>
-        <p:xfrm>
-          <a:off x="2877117" y="3518279"/>
-          <a:ext cx="18629285" cy="8150402"/>
-        </p:xfrm>
-        <a:graphic xmlns:a="http://schemas.openxmlformats.org/drawingml/2006/main">
-          <a:graphicData uri="http://schemas.openxmlformats.org/drawingml/2006/table">
-            <a:tbl>
-              <a:tblPr firstCol="0" firstRow="0" lastCol="0" lastRow="0" bandCol="0" bandRow="0" rtl="0">
-                <a:tableStyleId>{4C3C2611-4C71-4FC5-86AE-919BDF0F9419}</a:tableStyleId>
-              </a:tblPr>
-              <a:tblGrid>
-                <a:gridCol w="9314640"/>
-                <a:gridCol w="9314640"/>
-              </a:tblGrid>
-              <a:tr h="1018800">
-                <a:tc>
-                  <a:txBody>
-                    <a:bodyPr/>
-                    <a:lstStyle/>
-                    <a:p>
-                      <a:pPr algn="ctr">
-                        <a:defRPr>
-                          <a:solidFill>
-                            <a:srgbClr val="000000"/>
-                          </a:solidFill>
-                        </a:defRPr>
-                      </a:pPr>
-                      <a:r>
-                        <a:rPr b="1" sz="3200">
-                          <a:sym typeface="Helvetica Neue"/>
-                        </a:rPr>
-                        <a:t>Batch Size</a:t>
-                      </a:r>
-                    </a:p>
-                  </a:txBody>
-                  <a:tcPr marL="50760" marR="50760" marT="50760" marB="50760" anchor="ctr" anchorCtr="0" horzOverflow="overflow">
-                    <a:lnL w="12240">
-                      <a:solidFill>
-                        <a:srgbClr val="000000"/>
-                      </a:solidFill>
-                    </a:lnL>
-                    <a:lnR w="12240">
-                      <a:solidFill>
-                        <a:srgbClr val="000000"/>
-                      </a:solidFill>
-                    </a:lnR>
-                    <a:lnT w="12240">
-                      <a:solidFill>
-                        <a:srgbClr val="000000"/>
-                      </a:solidFill>
-                    </a:lnT>
-                    <a:lnB w="12240">
-                      <a:solidFill>
-                        <a:srgbClr val="000000"/>
-                      </a:solidFill>
-                    </a:lnB>
-                    <a:noFill/>
-                  </a:tcPr>
-                </a:tc>
-                <a:tc>
-                  <a:txBody>
-                    <a:bodyPr/>
-                    <a:lstStyle/>
-                    <a:p>
-                      <a:pPr algn="ctr">
-                        <a:defRPr>
-                          <a:solidFill>
-                            <a:srgbClr val="000000"/>
-                          </a:solidFill>
-                        </a:defRPr>
-                      </a:pPr>
-                      <a:r>
-                        <a:rPr sz="3200">
-                          <a:sym typeface="Helvetica Neue"/>
-                        </a:rPr>
-                        <a:t>12</a:t>
-                      </a:r>
-                    </a:p>
-                  </a:txBody>
-                  <a:tcPr marL="50760" marR="50760" marT="50760" marB="50760" anchor="ctr" anchorCtr="0" horzOverflow="overflow">
-                    <a:lnL w="12240">
-                      <a:solidFill>
-                        <a:srgbClr val="000000"/>
-                      </a:solidFill>
-                    </a:lnL>
-                    <a:lnR w="12240">
-                      <a:solidFill>
-                        <a:srgbClr val="000000"/>
-                      </a:solidFill>
-                    </a:lnR>
-                    <a:lnT w="12240">
-                      <a:solidFill>
-                        <a:srgbClr val="000000"/>
-                      </a:solidFill>
-                    </a:lnT>
-                    <a:lnB w="12240">
-                      <a:solidFill>
-                        <a:srgbClr val="000000"/>
-                      </a:solidFill>
-                    </a:lnB>
-                    <a:noFill/>
-                  </a:tcPr>
-                </a:tc>
-              </a:tr>
-              <a:tr h="1018800">
-                <a:tc>
-                  <a:txBody>
-                    <a:bodyPr/>
-                    <a:lstStyle/>
-                    <a:p>
-                      <a:pPr algn="ctr">
-                        <a:defRPr>
-                          <a:solidFill>
-                            <a:srgbClr val="000000"/>
-                          </a:solidFill>
-                        </a:defRPr>
-                      </a:pPr>
-                      <a:r>
-                        <a:rPr b="1" sz="3200">
-                          <a:sym typeface="Helvetica Neue"/>
-                        </a:rPr>
-                        <a:t>Learning Rate</a:t>
-                      </a:r>
-                    </a:p>
-                  </a:txBody>
-                  <a:tcPr marL="50760" marR="50760" marT="50760" marB="50760" anchor="ctr" anchorCtr="0" horzOverflow="overflow">
-                    <a:lnL w="12240">
-                      <a:solidFill>
-                        <a:srgbClr val="000000"/>
-                      </a:solidFill>
-                    </a:lnL>
-                    <a:lnR w="12240">
-                      <a:solidFill>
-                        <a:srgbClr val="000000"/>
-                      </a:solidFill>
-                    </a:lnR>
-                    <a:lnT w="12240">
-                      <a:solidFill>
-                        <a:srgbClr val="000000"/>
-                      </a:solidFill>
-                    </a:lnT>
-                    <a:lnB w="12240">
-                      <a:solidFill>
-                        <a:srgbClr val="000000"/>
-                      </a:solidFill>
-                    </a:lnB>
-                    <a:noFill/>
-                  </a:tcPr>
-                </a:tc>
-                <a:tc>
-                  <a:txBody>
-                    <a:bodyPr/>
-                    <a:lstStyle/>
-                    <a:p>
-                      <a:pPr algn="ctr">
-                        <a:defRPr>
-                          <a:solidFill>
-                            <a:srgbClr val="000000"/>
-                          </a:solidFill>
-                        </a:defRPr>
-                      </a:pPr>
-                      <a:r>
-                        <a:rPr sz="3200">
-                          <a:sym typeface="Helvetica Neue"/>
-                        </a:rPr>
-                        <a:t>0,001</a:t>
-                      </a:r>
-                    </a:p>
-                  </a:txBody>
-                  <a:tcPr marL="50760" marR="50760" marT="50760" marB="50760" anchor="ctr" anchorCtr="0" horzOverflow="overflow">
-                    <a:lnL w="12240">
-                      <a:solidFill>
-                        <a:srgbClr val="000000"/>
-                      </a:solidFill>
-                    </a:lnL>
-                    <a:lnR w="12240">
-                      <a:solidFill>
-                        <a:srgbClr val="000000"/>
-                      </a:solidFill>
-                    </a:lnR>
-                    <a:lnT w="12240">
-                      <a:solidFill>
-                        <a:srgbClr val="000000"/>
-                      </a:solidFill>
-                    </a:lnT>
-                    <a:lnB w="12240">
-                      <a:solidFill>
-                        <a:srgbClr val="000000"/>
-                      </a:solidFill>
-                    </a:lnB>
-                    <a:noFill/>
-                  </a:tcPr>
-                </a:tc>
-              </a:tr>
-              <a:tr h="1018800">
-                <a:tc>
-                  <a:txBody>
-                    <a:bodyPr/>
-                    <a:lstStyle/>
-                    <a:p>
-                      <a:pPr algn="ctr">
-                        <a:defRPr>
-                          <a:solidFill>
-                            <a:srgbClr val="000000"/>
-                          </a:solidFill>
-                        </a:defRPr>
-                      </a:pPr>
-                      <a:r>
-                        <a:rPr b="1" sz="3200">
-                          <a:sym typeface="Helvetica Neue"/>
-                        </a:rPr>
-                        <a:t>Epochs</a:t>
-                      </a:r>
-                    </a:p>
-                  </a:txBody>
-                  <a:tcPr marL="50760" marR="50760" marT="50760" marB="50760" anchor="ctr" anchorCtr="0" horzOverflow="overflow">
-                    <a:lnL w="12240">
-                      <a:solidFill>
-                        <a:srgbClr val="000000"/>
-                      </a:solidFill>
-                    </a:lnL>
-                    <a:lnR w="12240">
-                      <a:solidFill>
-                        <a:srgbClr val="000000"/>
-                      </a:solidFill>
-                    </a:lnR>
-                    <a:lnT w="12240">
-                      <a:solidFill>
-                        <a:srgbClr val="000000"/>
-                      </a:solidFill>
-                    </a:lnT>
-                    <a:lnB w="12240">
-                      <a:solidFill>
-                        <a:srgbClr val="000000"/>
-                      </a:solidFill>
-                    </a:lnB>
-                    <a:noFill/>
-                  </a:tcPr>
-                </a:tc>
-                <a:tc>
-                  <a:txBody>
-                    <a:bodyPr/>
-                    <a:lstStyle/>
-                    <a:p>
-                      <a:pPr algn="ctr">
-                        <a:defRPr>
-                          <a:solidFill>
-                            <a:srgbClr val="000000"/>
-                          </a:solidFill>
-                        </a:defRPr>
-                      </a:pPr>
-                      <a:r>
-                        <a:rPr sz="3200">
-                          <a:sym typeface="Helvetica Neue"/>
-                        </a:rPr>
-                        <a:t>2</a:t>
-                      </a:r>
-                    </a:p>
-                  </a:txBody>
-                  <a:tcPr marL="50760" marR="50760" marT="50760" marB="50760" anchor="ctr" anchorCtr="0" horzOverflow="overflow">
-                    <a:lnL w="12240">
-                      <a:solidFill>
-                        <a:srgbClr val="000000"/>
-                      </a:solidFill>
-                    </a:lnL>
-                    <a:lnR w="12240">
-                      <a:solidFill>
-                        <a:srgbClr val="000000"/>
-                      </a:solidFill>
-                    </a:lnR>
-                    <a:lnT w="12240">
-                      <a:solidFill>
-                        <a:srgbClr val="000000"/>
-                      </a:solidFill>
-                    </a:lnT>
-                    <a:lnB w="12240">
-                      <a:solidFill>
-                        <a:srgbClr val="000000"/>
-                      </a:solidFill>
-                    </a:lnB>
-                    <a:noFill/>
-                  </a:tcPr>
-                </a:tc>
-              </a:tr>
-              <a:tr h="1018800">
-                <a:tc>
-                  <a:txBody>
-                    <a:bodyPr/>
-                    <a:lstStyle/>
-                    <a:p>
-                      <a:pPr algn="ctr">
-                        <a:defRPr>
-                          <a:solidFill>
-                            <a:srgbClr val="000000"/>
-                          </a:solidFill>
-                        </a:defRPr>
-                      </a:pPr>
-                      <a:r>
-                        <a:rPr b="1" sz="3200">
-                          <a:sym typeface="Helvetica Neue"/>
-                        </a:rPr>
-                        <a:t>Number of Attention Heads</a:t>
-                      </a:r>
-                    </a:p>
-                  </a:txBody>
-                  <a:tcPr marL="50760" marR="50760" marT="50760" marB="50760" anchor="ctr" anchorCtr="0" horzOverflow="overflow">
-                    <a:lnL w="12240">
-                      <a:solidFill>
-                        <a:srgbClr val="000000"/>
-                      </a:solidFill>
-                    </a:lnL>
-                    <a:lnR w="12240">
-                      <a:solidFill>
-                        <a:srgbClr val="000000"/>
-                      </a:solidFill>
-                    </a:lnR>
-                    <a:lnT w="12240">
-                      <a:solidFill>
-                        <a:srgbClr val="000000"/>
-                      </a:solidFill>
-                    </a:lnT>
-                    <a:lnB w="12240">
-                      <a:solidFill>
-                        <a:srgbClr val="000000"/>
-                      </a:solidFill>
-                    </a:lnB>
-                    <a:noFill/>
-                  </a:tcPr>
-                </a:tc>
-                <a:tc>
-                  <a:txBody>
-                    <a:bodyPr/>
-                    <a:lstStyle/>
-                    <a:p>
-                      <a:pPr algn="ctr">
-                        <a:defRPr>
-                          <a:solidFill>
-                            <a:srgbClr val="000000"/>
-                          </a:solidFill>
-                        </a:defRPr>
-                      </a:pPr>
-                      <a:r>
-                        <a:rPr sz="3200">
-                          <a:sym typeface="Helvetica Neue"/>
-                        </a:rPr>
-                        <a:t>8</a:t>
-                      </a:r>
-                    </a:p>
-                  </a:txBody>
-                  <a:tcPr marL="50760" marR="50760" marT="50760" marB="50760" anchor="ctr" anchorCtr="0" horzOverflow="overflow">
-                    <a:lnL w="12240">
-                      <a:solidFill>
-                        <a:srgbClr val="000000"/>
-                      </a:solidFill>
-                    </a:lnL>
-                    <a:lnR w="12240">
-                      <a:solidFill>
-                        <a:srgbClr val="000000"/>
-                      </a:solidFill>
-                    </a:lnR>
-                    <a:lnT w="12240">
-                      <a:solidFill>
-                        <a:srgbClr val="000000"/>
-                      </a:solidFill>
-                    </a:lnT>
-                    <a:lnB w="12240">
-                      <a:solidFill>
-                        <a:srgbClr val="000000"/>
-                      </a:solidFill>
-                    </a:lnB>
-                    <a:noFill/>
-                  </a:tcPr>
-                </a:tc>
-              </a:tr>
-              <a:tr h="1018800">
-                <a:tc>
-                  <a:txBody>
-                    <a:bodyPr/>
-                    <a:lstStyle/>
-                    <a:p>
-                      <a:pPr algn="ctr">
-                        <a:defRPr>
-                          <a:solidFill>
-                            <a:srgbClr val="000000"/>
-                          </a:solidFill>
-                        </a:defRPr>
-                      </a:pPr>
-                      <a:r>
-                        <a:rPr b="1" sz="3200">
-                          <a:sym typeface="Helvetica Neue"/>
-                        </a:rPr>
-                        <a:t>Number of Hidden Layers</a:t>
-                      </a:r>
-                    </a:p>
-                  </a:txBody>
-                  <a:tcPr marL="50760" marR="50760" marT="50760" marB="50760" anchor="ctr" anchorCtr="0" horzOverflow="overflow">
-                    <a:lnL w="12240">
-                      <a:solidFill>
-                        <a:srgbClr val="000000"/>
-                      </a:solidFill>
-                    </a:lnL>
-                    <a:lnR w="12240">
-                      <a:solidFill>
-                        <a:srgbClr val="000000"/>
-                      </a:solidFill>
-                    </a:lnR>
-                    <a:lnT w="12240">
-                      <a:solidFill>
-                        <a:srgbClr val="000000"/>
-                      </a:solidFill>
-                    </a:lnT>
-                    <a:lnB w="12240">
-                      <a:solidFill>
-                        <a:srgbClr val="000000"/>
-                      </a:solidFill>
-                    </a:lnB>
-                    <a:noFill/>
-                  </a:tcPr>
-                </a:tc>
-                <a:tc>
-                  <a:txBody>
-                    <a:bodyPr/>
-                    <a:lstStyle/>
-                    <a:p>
-                      <a:pPr algn="ctr">
-                        <a:defRPr>
-                          <a:solidFill>
-                            <a:srgbClr val="000000"/>
-                          </a:solidFill>
-                        </a:defRPr>
-                      </a:pPr>
-                      <a:r>
-                        <a:rPr sz="3200">
-                          <a:sym typeface="Helvetica Neue"/>
-                        </a:rPr>
-                        <a:t>4</a:t>
-                      </a:r>
-                    </a:p>
-                  </a:txBody>
-                  <a:tcPr marL="50760" marR="50760" marT="50760" marB="50760" anchor="ctr" anchorCtr="0" horzOverflow="overflow">
-                    <a:lnL w="12240">
-                      <a:solidFill>
-                        <a:srgbClr val="000000"/>
-                      </a:solidFill>
-                    </a:lnL>
-                    <a:lnR w="12240">
-                      <a:solidFill>
-                        <a:srgbClr val="000000"/>
-                      </a:solidFill>
-                    </a:lnR>
-                    <a:lnT w="12240">
-                      <a:solidFill>
-                        <a:srgbClr val="000000"/>
-                      </a:solidFill>
-                    </a:lnT>
-                    <a:lnB w="12240">
-                      <a:solidFill>
-                        <a:srgbClr val="000000"/>
-                      </a:solidFill>
-                    </a:lnB>
-                    <a:noFill/>
-                  </a:tcPr>
-                </a:tc>
-              </a:tr>
-              <a:tr h="1018800">
-                <a:tc>
-                  <a:txBody>
-                    <a:bodyPr/>
-                    <a:lstStyle/>
-                    <a:p>
-                      <a:pPr algn="ctr">
-                        <a:defRPr>
-                          <a:solidFill>
-                            <a:srgbClr val="000000"/>
-                          </a:solidFill>
-                        </a:defRPr>
-                      </a:pPr>
-                      <a:r>
-                        <a:rPr b="1" sz="3200">
-                          <a:sym typeface="Helvetica Neue"/>
-                        </a:rPr>
-                        <a:t>Train Data</a:t>
-                      </a:r>
-                    </a:p>
-                  </a:txBody>
-                  <a:tcPr marL="50760" marR="50760" marT="50760" marB="50760" anchor="ctr" anchorCtr="0" horzOverflow="overflow">
-                    <a:lnL w="12240">
-                      <a:solidFill>
-                        <a:srgbClr val="000000"/>
-                      </a:solidFill>
-                    </a:lnL>
-                    <a:lnR w="12240">
-                      <a:solidFill>
-                        <a:srgbClr val="000000"/>
-                      </a:solidFill>
-                    </a:lnR>
-                    <a:lnT w="12240">
-                      <a:solidFill>
-                        <a:srgbClr val="000000"/>
-                      </a:solidFill>
-                    </a:lnT>
-                    <a:lnB w="12240">
-                      <a:solidFill>
-                        <a:srgbClr val="000000"/>
-                      </a:solidFill>
-                    </a:lnB>
-                    <a:noFill/>
-                  </a:tcPr>
-                </a:tc>
-                <a:tc>
-                  <a:txBody>
-                    <a:bodyPr/>
-                    <a:lstStyle/>
-                    <a:p>
-                      <a:pPr algn="ctr">
-                        <a:defRPr>
-                          <a:solidFill>
-                            <a:srgbClr val="000000"/>
-                          </a:solidFill>
-                        </a:defRPr>
-                      </a:pPr>
-                      <a:r>
-                        <a:rPr sz="3200">
-                          <a:sym typeface="Helvetica Neue"/>
-                        </a:rPr>
-                        <a:t>clamav, nmap, openssl ( ~ 1GB )</a:t>
-                      </a:r>
-                    </a:p>
-                  </a:txBody>
-                  <a:tcPr marL="50760" marR="50760" marT="50760" marB="50760" anchor="ctr" anchorCtr="0" horzOverflow="overflow">
-                    <a:lnL w="12240">
-                      <a:solidFill>
-                        <a:srgbClr val="000000"/>
-                      </a:solidFill>
-                    </a:lnL>
-                    <a:lnR w="12240">
-                      <a:solidFill>
-                        <a:srgbClr val="000000"/>
-                      </a:solidFill>
-                    </a:lnR>
-                    <a:lnT w="12240">
-                      <a:solidFill>
-                        <a:srgbClr val="000000"/>
-                      </a:solidFill>
-                    </a:lnT>
-                    <a:lnB w="12240">
-                      <a:solidFill>
-                        <a:srgbClr val="000000"/>
-                      </a:solidFill>
-                    </a:lnB>
-                    <a:noFill/>
-                  </a:tcPr>
-                </a:tc>
-              </a:tr>
-              <a:tr h="1018800">
-                <a:tc>
-                  <a:txBody>
-                    <a:bodyPr/>
-                    <a:lstStyle/>
-                    <a:p>
-                      <a:pPr algn="ctr">
-                        <a:defRPr>
-                          <a:solidFill>
-                            <a:srgbClr val="000000"/>
-                          </a:solidFill>
-                        </a:defRPr>
-                      </a:pPr>
-                      <a:r>
-                        <a:rPr b="1" sz="3200">
-                          <a:sym typeface="Helvetica Neue"/>
-                        </a:rPr>
-                        <a:t>Validation Data</a:t>
-                      </a:r>
-                    </a:p>
-                  </a:txBody>
-                  <a:tcPr marL="50760" marR="50760" marT="50760" marB="50760" anchor="ctr" anchorCtr="0" horzOverflow="overflow">
-                    <a:lnL w="12240">
-                      <a:solidFill>
-                        <a:srgbClr val="000000"/>
-                      </a:solidFill>
-                    </a:lnL>
-                    <a:lnR w="12240">
-                      <a:solidFill>
-                        <a:srgbClr val="000000"/>
-                      </a:solidFill>
-                    </a:lnR>
-                    <a:lnT w="12240">
-                      <a:solidFill>
-                        <a:srgbClr val="000000"/>
-                      </a:solidFill>
-                    </a:lnT>
-                    <a:lnB w="12240">
-                      <a:solidFill>
-                        <a:srgbClr val="000000"/>
-                      </a:solidFill>
-                    </a:lnB>
-                    <a:noFill/>
-                  </a:tcPr>
-                </a:tc>
-                <a:tc>
-                  <a:txBody>
-                    <a:bodyPr/>
-                    <a:lstStyle/>
-                    <a:p>
-                      <a:pPr algn="ctr">
-                        <a:defRPr>
-                          <a:solidFill>
-                            <a:srgbClr val="000000"/>
-                          </a:solidFill>
-                        </a:defRPr>
-                      </a:pPr>
-                      <a:r>
-                        <a:rPr sz="3200">
-                          <a:sym typeface="Helvetica Neue"/>
-                        </a:rPr>
-                        <a:t>curl ( ~ 40MB )</a:t>
-                      </a:r>
-                    </a:p>
-                  </a:txBody>
-                  <a:tcPr marL="50760" marR="50760" marT="50760" marB="50760" anchor="ctr" anchorCtr="0" horzOverflow="overflow">
-                    <a:lnL w="12240">
-                      <a:solidFill>
-                        <a:srgbClr val="000000"/>
-                      </a:solidFill>
-                    </a:lnL>
-                    <a:lnR w="12240">
-                      <a:solidFill>
-                        <a:srgbClr val="000000"/>
-                      </a:solidFill>
-                    </a:lnR>
-                    <a:lnT w="12240">
-                      <a:solidFill>
-                        <a:srgbClr val="000000"/>
-                      </a:solidFill>
-                    </a:lnT>
-                    <a:lnB w="12240">
-                      <a:solidFill>
-                        <a:srgbClr val="000000"/>
-                      </a:solidFill>
-                    </a:lnB>
-                    <a:noFill/>
-                  </a:tcPr>
-                </a:tc>
-              </a:tr>
-              <a:tr h="1018800">
-                <a:tc>
-                  <a:txBody>
-                    <a:bodyPr/>
-                    <a:lstStyle/>
-                    <a:p>
-                      <a:pPr algn="ctr">
-                        <a:defRPr>
-                          <a:solidFill>
-                            <a:srgbClr val="000000"/>
-                          </a:solidFill>
-                        </a:defRPr>
-                      </a:pPr>
-                      <a:r>
-                        <a:rPr b="1" sz="3200">
-                          <a:sym typeface="Helvetica Neue"/>
-                        </a:rPr>
-                        <a:t>Test Data</a:t>
-                      </a:r>
-                    </a:p>
-                  </a:txBody>
-                  <a:tcPr marL="50760" marR="50760" marT="50760" marB="50760" anchor="ctr" anchorCtr="0" horzOverflow="overflow">
-                    <a:lnL w="12240">
-                      <a:solidFill>
-                        <a:srgbClr val="000000"/>
-                      </a:solidFill>
-                    </a:lnL>
-                    <a:lnR w="12240">
-                      <a:solidFill>
-                        <a:srgbClr val="000000"/>
-                      </a:solidFill>
-                    </a:lnR>
-                    <a:lnT w="12240">
-                      <a:solidFill>
-                        <a:srgbClr val="000000"/>
-                      </a:solidFill>
-                    </a:lnT>
-                    <a:lnB w="12240">
-                      <a:solidFill>
-                        <a:srgbClr val="000000"/>
-                      </a:solidFill>
-                    </a:lnB>
-                    <a:noFill/>
-                  </a:tcPr>
-                </a:tc>
-                <a:tc>
-                  <a:txBody>
-                    <a:bodyPr/>
-                    <a:lstStyle/>
-                    <a:p>
-                      <a:pPr algn="ctr">
-                        <a:defRPr>
-                          <a:solidFill>
-                            <a:srgbClr val="000000"/>
-                          </a:solidFill>
-                        </a:defRPr>
-                      </a:pPr>
-                      <a:r>
-                        <a:rPr sz="3200">
-                          <a:sym typeface="Helvetica Neue"/>
-                        </a:rPr>
-                        <a:t>zlib, unrar ( ~ 400MB )</a:t>
-                      </a:r>
-                    </a:p>
-                  </a:txBody>
-                  <a:tcPr marL="50760" marR="50760" marT="50760" marB="50760" anchor="ctr" anchorCtr="0" horzOverflow="overflow">
-                    <a:lnL w="12240">
-                      <a:solidFill>
-                        <a:srgbClr val="000000"/>
-                      </a:solidFill>
-                    </a:lnL>
-                    <a:lnR w="12240">
-                      <a:solidFill>
-                        <a:srgbClr val="000000"/>
-                      </a:solidFill>
-                    </a:lnR>
-                    <a:lnT w="12240">
-                      <a:solidFill>
-                        <a:srgbClr val="000000"/>
-                      </a:solidFill>
-                    </a:lnT>
-                    <a:lnB w="12240">
-                      <a:solidFill>
-                        <a:srgbClr val="000000"/>
-                      </a:solidFill>
-                    </a:lnB>
-                    <a:noFill/>
-                  </a:tcPr>
-                </a:tc>
-              </a:tr>
-            </a:tbl>
-          </a:graphicData>
-        </a:graphic>
-      </p:graphicFrame>
+        </p:nvPicPr>
+        <p:blipFill>
+          <a:blip r:embed="rId2">
+            <a:extLst/>
+          </a:blip>
+          <a:stretch>
+            <a:fillRect/>
+          </a:stretch>
+        </p:blipFill>
+        <p:spPr>
+          <a:xfrm>
+            <a:off x="2628332" y="4348773"/>
+            <a:ext cx="19127336" cy="7247107"/>
+          </a:xfrm>
+          <a:prstGeom prst="rect">
+            <a:avLst/>
+          </a:prstGeom>
+          <a:ln w="12700">
+            <a:miter lim="400000"/>
+          </a:ln>
+        </p:spPr>
+      </p:pic>
+      <p:sp>
+        <p:nvSpPr>
+          <p:cNvPr id="182" name="Very Similar Embedding:…"/>
+          <p:cNvSpPr/>
+          <p:nvPr/>
+        </p:nvSpPr>
+        <p:spPr>
+          <a:xfrm>
+            <a:off x="12481174" y="4445740"/>
+            <a:ext cx="9213333" cy="7053173"/>
+          </a:xfrm>
+          <a:prstGeom prst="rect">
+            <a:avLst/>
+          </a:prstGeom>
+          <a:solidFill>
+            <a:srgbClr val="FFFFFF"/>
+          </a:solidFill>
+          <a:ln w="63500">
+            <a:solidFill>
+              <a:schemeClr val="accent4">
+                <a:lumOff val="10049"/>
+              </a:schemeClr>
+            </a:solidFill>
+          </a:ln>
+          <a:extLst>
+            <a:ext uri="{C572A759-6A51-4108-AA02-DFA0A04FC94B}">
+              <ma14:wrappingTextBoxFlag xmlns:ma14="http://schemas.microsoft.com/office/mac/drawingml/2011/main" val="1"/>
+            </a:ext>
+          </a:extLst>
+        </p:spPr>
+        <p:txBody>
+          <a:bodyPr lIns="0" tIns="0" rIns="0" bIns="0" anchor="ctr"/>
+          <a:lstStyle/>
+          <a:p>
+            <a:pPr algn="ctr">
+              <a:defRPr sz="3800"/>
+            </a:pPr>
+            <a:r>
+              <a:t>Very Similar Embedding:</a:t>
+            </a:r>
+          </a:p>
+          <a:p>
+            <a:pPr algn="ctr">
+              <a:defRPr sz="3800"/>
+            </a:pPr>
+            <a:r>
+              <a:t>—&gt; spoiled measurements</a:t>
+            </a:r>
+          </a:p>
+        </p:txBody>
+      </p:sp>
     </p:spTree>
   </p:cSld>
   <p:clrMapOvr>
     <a:masterClrMapping/>
   </p:clrMapOvr>
   <p:transition xmlns:p14="http://schemas.microsoft.com/office/powerpoint/2010/main" spd="med" advClick="1"/>
+  <p:timing>
+    <p:tnLst>
+      <p:par>
+        <p:cTn id="1" nodeType="tmRoot" restart="never" dur="indefinite" fill="hold">
+          <p:childTnLst>
+            <p:seq concurrent="1" prevAc="none" nextAc="seek">
+              <p:cTn id="2" nodeType="mainSeq" dur="indefinite" fill="hold">
+                <p:childTnLst>
+                  <p:par>
+                    <p:cTn id="3" fill="hold">
+                      <p:stCondLst>
+                        <p:cond delay="indefinite"/>
+                      </p:stCondLst>
+                      <p:childTnLst>
+                        <p:par>
+                          <p:cTn id="4" fill="hold">
+                            <p:stCondLst>
+                              <p:cond delay="0"/>
+                            </p:stCondLst>
+                            <p:childTnLst>
+                              <p:par>
+                                <p:cTn id="5" presetClass="entr" nodeType="clickEffect" presetSubtype="0" presetID="1" grpId="1" fill="hold">
+                                  <p:stCondLst>
+                                    <p:cond delay="0"/>
+                                  </p:stCondLst>
+                                  <p:iterate type="el" backwards="0">
+                                    <p:tmAbs val="0"/>
+                                  </p:iterate>
+                                  <p:childTnLst>
+                                    <p:set>
+                                      <p:cBhvr>
+                                        <p:cTn id="6" fill="hold"/>
+                                        <p:tgtEl>
+                                          <p:spTgt spid="182"/>
+                                        </p:tgtEl>
+                                        <p:attrNameLst>
+                                          <p:attrName>style.visibility</p:attrName>
+                                        </p:attrNameLst>
+                                      </p:cBhvr>
+                                      <p:to>
+                                        <p:strVal val="visible"/>
+                                      </p:to>
+                                    </p:set>
+                                  </p:childTnLst>
+                                </p:cTn>
+                              </p:par>
+                            </p:childTnLst>
+                          </p:cTn>
+                        </p:par>
+                      </p:childTnLst>
+                    </p:cTn>
+                  </p:par>
+                </p:childTnLst>
+              </p:cTn>
+              <p:prevCondLst>
+                <p:cond evt="onPrev">
+                  <p:tgtEl>
+                    <p:sldTgt/>
+                  </p:tgtEl>
+                </p:cond>
+              </p:prevCondLst>
+              <p:nextCondLst>
+                <p:cond evt="onNext">
+                  <p:tgtEl>
+                    <p:sldTgt/>
+                  </p:tgtEl>
+                </p:cond>
+              </p:nextCondLst>
+            </p:seq>
+          </p:childTnLst>
+        </p:cTn>
+      </p:par>
+    </p:tnLst>
+    <p:bldLst>
+      <p:bldP build="whole" bldLvl="1" animBg="1" rev="0" advAuto="0" spid="182" grpId="1"/>
+    </p:bldLst>
+  </p:timing>
 </p:sld>
 </file>
 
@@ -6395,760 +7655,352 @@
       </p:grpSpPr>
       <p:sp>
         <p:nvSpPr>
-          <p:cNvPr id="180" name="PlaceHolder 1"/>
+          <p:cNvPr id="184" name="Positive Samples Filtering"/>
           <p:cNvSpPr txBox="1"/>
           <p:nvPr>
-            <p:ph type="title"/>
+            <p:ph type="ctrTitle"/>
           </p:nvPr>
         </p:nvSpPr>
         <p:spPr>
-          <a:xfrm>
-            <a:off x="1206359" y="1079639"/>
-            <a:ext cx="21970802" cy="1432804"/>
-          </a:xfrm>
           <a:prstGeom prst="rect">
             <a:avLst/>
           </a:prstGeom>
         </p:spPr>
         <p:txBody>
           <a:bodyPr/>
+          <a:lstStyle/>
+          <a:p>
+            <a:pPr/>
+            <a:r>
+              <a:t>Positive Samples Filtering</a:t>
+            </a:r>
+          </a:p>
+        </p:txBody>
+      </p:sp>
+      <p:sp>
+        <p:nvSpPr>
+          <p:cNvPr id="185" name="same Name, same File"/>
+          <p:cNvSpPr txBox="1"/>
+          <p:nvPr>
+            <p:ph type="subTitle" sz="quarter" idx="1"/>
+          </p:nvPr>
+        </p:nvSpPr>
+        <p:spPr>
+          <a:prstGeom prst="rect">
+            <a:avLst/>
+          </a:prstGeom>
+        </p:spPr>
+        <p:txBody>
+          <a:bodyPr/>
+          <a:lstStyle/>
+          <a:p>
+            <a:pPr/>
+            <a:r>
+              <a:t>same Name, same File</a:t>
+            </a:r>
+          </a:p>
+        </p:txBody>
+      </p:sp>
+      <p:pic>
+        <p:nvPicPr>
+          <p:cNvPr id="186" name="Bild" descr="Bild"/>
+          <p:cNvPicPr>
+            <a:picLocks noChangeAspect="1"/>
+          </p:cNvPicPr>
+          <p:nvPr/>
+        </p:nvPicPr>
+        <p:blipFill>
+          <a:blip r:embed="rId2">
+            <a:extLst/>
+          </a:blip>
+          <a:stretch>
+            <a:fillRect/>
+          </a:stretch>
+        </p:blipFill>
+        <p:spPr>
+          <a:xfrm>
+            <a:off x="2600374" y="2921614"/>
+            <a:ext cx="19183252" cy="8920883"/>
+          </a:xfrm>
+          <a:prstGeom prst="rect">
+            <a:avLst/>
+          </a:prstGeom>
+          <a:ln w="12700">
+            <a:miter lim="400000"/>
+          </a:ln>
+        </p:spPr>
+      </p:pic>
+      <p:sp>
+        <p:nvSpPr>
+          <p:cNvPr id="187" name="Linie"/>
+          <p:cNvSpPr/>
+          <p:nvPr/>
+        </p:nvSpPr>
+        <p:spPr>
+          <a:xfrm flipH="1">
+            <a:off x="7495956" y="5144335"/>
+            <a:ext cx="2309380" cy="3765924"/>
+          </a:xfrm>
+          <a:prstGeom prst="line">
+            <a:avLst/>
+          </a:prstGeom>
+          <a:ln w="63500">
+            <a:solidFill>
+              <a:srgbClr val="EE8C00"/>
+            </a:solidFill>
+            <a:tailEnd type="triangle"/>
+          </a:ln>
+        </p:spPr>
+        <p:txBody>
+          <a:bodyPr lIns="45718" tIns="45718" rIns="45718" bIns="45718"/>
+          <a:lstStyle/>
+          <a:p>
+            <a:pPr/>
+          </a:p>
+        </p:txBody>
+      </p:sp>
+      <p:sp>
+        <p:nvSpPr>
+          <p:cNvPr id="188" name="Linie"/>
+          <p:cNvSpPr/>
+          <p:nvPr/>
+        </p:nvSpPr>
+        <p:spPr>
+          <a:xfrm>
+            <a:off x="9808233" y="5180057"/>
+            <a:ext cx="7225698" cy="3705996"/>
+          </a:xfrm>
+          <a:prstGeom prst="line">
+            <a:avLst/>
+          </a:prstGeom>
+          <a:ln w="63500">
+            <a:solidFill>
+              <a:srgbClr val="EE8C00"/>
+            </a:solidFill>
+            <a:tailEnd type="triangle"/>
+          </a:ln>
+        </p:spPr>
+        <p:txBody>
+          <a:bodyPr lIns="45718" tIns="45718" rIns="45718" bIns="45718"/>
+          <a:lstStyle/>
+          <a:p>
+            <a:pPr/>
+          </a:p>
+        </p:txBody>
+      </p:sp>
+      <p:sp>
+        <p:nvSpPr>
+          <p:cNvPr id="189" name="Slight differences in assembly"/>
+          <p:cNvSpPr txBox="1"/>
+          <p:nvPr/>
+        </p:nvSpPr>
+        <p:spPr>
+          <a:xfrm>
+            <a:off x="4907986" y="4398947"/>
+            <a:ext cx="5381626" cy="482601"/>
+          </a:xfrm>
+          <a:prstGeom prst="rect">
+            <a:avLst/>
+          </a:prstGeom>
+          <a:ln w="12700">
+            <a:miter lim="400000"/>
+          </a:ln>
+          <a:extLst>
+            <a:ext uri="{C572A759-6A51-4108-AA02-DFA0A04FC94B}">
+              <ma14:wrappingTextBoxFlag xmlns:ma14="http://schemas.microsoft.com/office/mac/drawingml/2011/main" val="1"/>
+            </a:ext>
+          </a:extLst>
+        </p:spPr>
+        <p:txBody>
+          <a:bodyPr wrap="none" lIns="0" tIns="0" rIns="0" bIns="0">
+            <a:spAutoFit/>
+          </a:bodyPr>
           <a:lstStyle>
             <a:lvl1pPr>
-              <a:defRPr spc="-200"/>
+              <a:defRPr sz="3200"/>
             </a:lvl1pPr>
           </a:lstStyle>
           <a:p>
             <a:pPr/>
             <a:r>
-              <a:t>Results</a:t>
+              <a:t>Slight differences in assembly</a:t>
             </a:r>
           </a:p>
         </p:txBody>
       </p:sp>
-      <p:graphicFrame>
-        <p:nvGraphicFramePr>
-          <p:cNvPr id="181" name="Tabelle"/>
-          <p:cNvGraphicFramePr/>
-          <p:nvPr/>
-        </p:nvGraphicFramePr>
-        <p:xfrm>
-          <a:off x="1670760" y="3283198"/>
-          <a:ext cx="21042480" cy="8242558"/>
-        </p:xfrm>
-        <a:graphic xmlns:a="http://schemas.openxmlformats.org/drawingml/2006/main">
-          <a:graphicData uri="http://schemas.openxmlformats.org/drawingml/2006/table">
-            <a:tbl>
-              <a:tblPr firstCol="0" firstRow="0" lastCol="0" lastRow="0" bandCol="0" bandRow="0" rtl="0">
-                <a:tableStyleId>{4C3C2611-4C71-4FC5-86AE-919BDF0F9419}</a:tableStyleId>
-              </a:tblPr>
-              <a:tblGrid>
-                <a:gridCol w="5260620"/>
-                <a:gridCol w="5260620"/>
-                <a:gridCol w="5260620"/>
-                <a:gridCol w="5260620"/>
-              </a:tblGrid>
-              <a:tr h="2060639">
-                <a:tc>
-                  <a:txBody>
-                    <a:bodyPr/>
-                    <a:lstStyle/>
-                    <a:p>
-                      <a:pPr>
-                        <a:defRPr sz="3200">
-                          <a:solidFill>
-                            <a:srgbClr val="000000"/>
-                          </a:solidFill>
-                          <a:sym typeface="Helvetica Neue"/>
-                        </a:defRPr>
-                      </a:pPr>
-                    </a:p>
-                  </a:txBody>
-                  <a:tcPr marL="50760" marR="50760" marT="50760" marB="50760" anchor="ctr" anchorCtr="0" horzOverflow="overflow">
-                    <a:lnL w="12240">
-                      <a:solidFill>
-                        <a:srgbClr val="000000"/>
-                      </a:solidFill>
-                    </a:lnL>
-                    <a:lnR w="12240">
-                      <a:solidFill>
-                        <a:srgbClr val="000000"/>
-                      </a:solidFill>
-                    </a:lnR>
-                    <a:lnT w="12240">
-                      <a:solidFill>
-                        <a:srgbClr val="000000"/>
-                      </a:solidFill>
-                    </a:lnT>
-                    <a:lnB w="12240">
-                      <a:solidFill>
-                        <a:srgbClr val="000000"/>
-                      </a:solidFill>
-                    </a:lnB>
-                    <a:noFill/>
-                  </a:tcPr>
-                </a:tc>
-                <a:tc>
-                  <a:txBody>
-                    <a:bodyPr/>
-                    <a:lstStyle/>
-                    <a:p>
-                      <a:pPr algn="ctr">
-                        <a:defRPr>
-                          <a:solidFill>
-                            <a:srgbClr val="000000"/>
-                          </a:solidFill>
-                        </a:defRPr>
-                      </a:pPr>
-                      <a:r>
-                        <a:rPr sz="3200">
-                          <a:sym typeface="Helvetica Neue"/>
-                        </a:rPr>
-                        <a:t>MRR</a:t>
-                      </a:r>
-                    </a:p>
-                  </a:txBody>
-                  <a:tcPr marL="50760" marR="50760" marT="50760" marB="50760" anchor="ctr" anchorCtr="0" horzOverflow="overflow">
-                    <a:lnL w="12240">
-                      <a:solidFill>
-                        <a:srgbClr val="000000"/>
-                      </a:solidFill>
-                    </a:lnL>
-                    <a:lnR w="12240">
-                      <a:solidFill>
-                        <a:srgbClr val="000000"/>
-                      </a:solidFill>
-                    </a:lnR>
-                    <a:lnT w="12240">
-                      <a:solidFill>
-                        <a:srgbClr val="000000"/>
-                      </a:solidFill>
-                    </a:lnT>
-                    <a:lnB w="12240">
-                      <a:solidFill>
-                        <a:srgbClr val="000000"/>
-                      </a:solidFill>
-                    </a:lnB>
-                    <a:noFill/>
-                  </a:tcPr>
-                </a:tc>
-                <a:tc>
-                  <a:txBody>
-                    <a:bodyPr/>
-                    <a:lstStyle/>
-                    <a:p>
-                      <a:pPr algn="ctr">
-                        <a:defRPr>
-                          <a:solidFill>
-                            <a:srgbClr val="000000"/>
-                          </a:solidFill>
-                        </a:defRPr>
-                      </a:pPr>
-                      <a:r>
-                        <a:rPr sz="3200">
-                          <a:sym typeface="Helvetica Neue"/>
-                        </a:rPr>
-                        <a:t>nDCG</a:t>
-                      </a:r>
-                    </a:p>
-                  </a:txBody>
-                  <a:tcPr marL="50760" marR="50760" marT="50760" marB="50760" anchor="ctr" anchorCtr="0" horzOverflow="overflow">
-                    <a:lnL w="12240">
-                      <a:solidFill>
-                        <a:srgbClr val="000000"/>
-                      </a:solidFill>
-                    </a:lnL>
-                    <a:lnR w="12240">
-                      <a:solidFill>
-                        <a:srgbClr val="000000"/>
-                      </a:solidFill>
-                    </a:lnR>
-                    <a:lnT w="12240">
-                      <a:solidFill>
-                        <a:srgbClr val="000000"/>
-                      </a:solidFill>
-                    </a:lnT>
-                    <a:lnB w="12240">
-                      <a:solidFill>
-                        <a:srgbClr val="000000"/>
-                      </a:solidFill>
-                    </a:lnB>
-                    <a:noFill/>
-                  </a:tcPr>
-                </a:tc>
-                <a:tc>
-                  <a:txBody>
-                    <a:bodyPr/>
-                    <a:lstStyle/>
-                    <a:p>
-                      <a:pPr algn="ctr">
-                        <a:defRPr>
-                          <a:solidFill>
-                            <a:srgbClr val="000000"/>
-                          </a:solidFill>
-                        </a:defRPr>
-                      </a:pPr>
-                      <a:r>
-                        <a:rPr sz="3200">
-                          <a:sym typeface="Helvetica Neue"/>
-                        </a:rPr>
-                        <a:t>Top_K* </a:t>
-                      </a:r>
-                    </a:p>
-                  </a:txBody>
-                  <a:tcPr marL="50760" marR="50760" marT="50760" marB="50760" anchor="ctr" anchorCtr="0" horzOverflow="overflow">
-                    <a:lnL w="12240">
-                      <a:solidFill>
-                        <a:srgbClr val="000000"/>
-                      </a:solidFill>
-                    </a:lnL>
-                    <a:lnR w="12240">
-                      <a:solidFill>
-                        <a:srgbClr val="000000"/>
-                      </a:solidFill>
-                    </a:lnR>
-                    <a:lnT w="12240">
-                      <a:solidFill>
-                        <a:srgbClr val="000000"/>
-                      </a:solidFill>
-                    </a:lnT>
-                    <a:lnB w="12240">
-                      <a:solidFill>
-                        <a:srgbClr val="000000"/>
-                      </a:solidFill>
-                    </a:lnB>
-                    <a:noFill/>
-                  </a:tcPr>
-                </a:tc>
-              </a:tr>
-              <a:tr h="2060639">
-                <a:tc>
-                  <a:txBody>
-                    <a:bodyPr/>
-                    <a:lstStyle/>
-                    <a:p>
-                      <a:pPr algn="ctr">
-                        <a:defRPr>
-                          <a:solidFill>
-                            <a:srgbClr val="000000"/>
-                          </a:solidFill>
-                        </a:defRPr>
-                      </a:pPr>
-                      <a:r>
-                        <a:rPr sz="3200">
-                          <a:sym typeface="Helvetica Neue"/>
-                        </a:rPr>
-                        <a:t>Traditional MLM</a:t>
-                      </a:r>
-                    </a:p>
-                  </a:txBody>
-                  <a:tcPr marL="50760" marR="50760" marT="50760" marB="50760" anchor="ctr" anchorCtr="0" horzOverflow="overflow">
-                    <a:lnL w="12240">
-                      <a:solidFill>
-                        <a:srgbClr val="000000"/>
-                      </a:solidFill>
-                    </a:lnL>
-                    <a:lnR w="12240">
-                      <a:solidFill>
-                        <a:srgbClr val="000000"/>
-                      </a:solidFill>
-                    </a:lnR>
-                    <a:lnT w="12240">
-                      <a:solidFill>
-                        <a:srgbClr val="000000"/>
-                      </a:solidFill>
-                    </a:lnT>
-                    <a:lnB w="12240">
-                      <a:solidFill>
-                        <a:srgbClr val="000000"/>
-                      </a:solidFill>
-                    </a:lnB>
-                    <a:noFill/>
-                  </a:tcPr>
-                </a:tc>
-                <a:tc>
-                  <a:txBody>
-                    <a:bodyPr/>
-                    <a:lstStyle/>
-                    <a:p>
-                      <a:pPr algn="ctr">
-                        <a:defRPr>
-                          <a:solidFill>
-                            <a:srgbClr val="000000"/>
-                          </a:solidFill>
-                        </a:defRPr>
-                      </a:pPr>
-                      <a:r>
-                        <a:rPr sz="3200">
-                          <a:sym typeface="Helvetica Neue"/>
-                        </a:rPr>
-                        <a:t>0.108</a:t>
-                      </a:r>
-                    </a:p>
-                  </a:txBody>
-                  <a:tcPr marL="50760" marR="50760" marT="50760" marB="50760" anchor="ctr" anchorCtr="0" horzOverflow="overflow">
-                    <a:lnL w="12240">
-                      <a:solidFill>
-                        <a:srgbClr val="000000"/>
-                      </a:solidFill>
-                    </a:lnL>
-                    <a:lnR w="12240">
-                      <a:solidFill>
-                        <a:srgbClr val="000000"/>
-                      </a:solidFill>
-                    </a:lnR>
-                    <a:lnT w="12240">
-                      <a:solidFill>
-                        <a:srgbClr val="000000"/>
-                      </a:solidFill>
-                    </a:lnT>
-                    <a:lnB w="12240">
-                      <a:solidFill>
-                        <a:srgbClr val="000000"/>
-                      </a:solidFill>
-                    </a:lnB>
-                    <a:noFill/>
-                  </a:tcPr>
-                </a:tc>
-                <a:tc>
-                  <a:txBody>
-                    <a:bodyPr/>
-                    <a:lstStyle/>
-                    <a:p>
-                      <a:pPr algn="ctr">
-                        <a:defRPr>
-                          <a:solidFill>
-                            <a:srgbClr val="000000"/>
-                          </a:solidFill>
-                        </a:defRPr>
-                      </a:pPr>
-                      <a:r>
-                        <a:rPr sz="3200">
-                          <a:sym typeface="Helvetica Neue"/>
-                        </a:rPr>
-                        <a:t>0.855</a:t>
-                      </a:r>
-                    </a:p>
-                  </a:txBody>
-                  <a:tcPr marL="50760" marR="50760" marT="50760" marB="50760" anchor="ctr" anchorCtr="0" horzOverflow="overflow">
-                    <a:lnL w="12240">
-                      <a:solidFill>
-                        <a:srgbClr val="000000"/>
-                      </a:solidFill>
-                    </a:lnL>
-                    <a:lnR w="12240">
-                      <a:solidFill>
-                        <a:srgbClr val="000000"/>
-                      </a:solidFill>
-                    </a:lnR>
-                    <a:lnT w="12240">
-                      <a:solidFill>
-                        <a:srgbClr val="000000"/>
-                      </a:solidFill>
-                    </a:lnT>
-                    <a:lnB w="12240">
-                      <a:solidFill>
-                        <a:srgbClr val="000000"/>
-                      </a:solidFill>
-                    </a:lnB>
-                    <a:noFill/>
-                  </a:tcPr>
-                </a:tc>
-                <a:tc>
-                  <a:txBody>
-                    <a:bodyPr/>
-                    <a:lstStyle/>
-                    <a:p>
-                      <a:pPr algn="ctr">
-                        <a:defRPr>
-                          <a:solidFill>
-                            <a:srgbClr val="000000"/>
-                          </a:solidFill>
-                        </a:defRPr>
-                      </a:pPr>
-                      <a:r>
-                        <a:rPr sz="3200">
-                          <a:sym typeface="Helvetica Neue"/>
-                        </a:rPr>
-                        <a:t>0.870</a:t>
-                      </a:r>
-                    </a:p>
-                  </a:txBody>
-                  <a:tcPr marL="50760" marR="50760" marT="50760" marB="50760" anchor="ctr" anchorCtr="0" horzOverflow="overflow">
-                    <a:lnL w="12240">
-                      <a:solidFill>
-                        <a:srgbClr val="000000"/>
-                      </a:solidFill>
-                    </a:lnL>
-                    <a:lnR w="12240">
-                      <a:solidFill>
-                        <a:srgbClr val="000000"/>
-                      </a:solidFill>
-                    </a:lnR>
-                    <a:lnT w="12240">
-                      <a:solidFill>
-                        <a:srgbClr val="000000"/>
-                      </a:solidFill>
-                    </a:lnT>
-                    <a:lnB w="12240">
-                      <a:solidFill>
-                        <a:srgbClr val="000000"/>
-                      </a:solidFill>
-                    </a:lnB>
-                    <a:noFill/>
-                  </a:tcPr>
-                </a:tc>
-              </a:tr>
-              <a:tr h="2060639">
-                <a:tc>
-                  <a:txBody>
-                    <a:bodyPr/>
-                    <a:lstStyle/>
-                    <a:p>
-                      <a:pPr algn="ctr">
-                        <a:defRPr>
-                          <a:solidFill>
-                            <a:srgbClr val="000000"/>
-                          </a:solidFill>
-                        </a:defRPr>
-                      </a:pPr>
-                      <a:r>
-                        <a:rPr sz="3200">
-                          <a:sym typeface="Helvetica Neue"/>
-                        </a:rPr>
-                        <a:t>MLM -&gt; Opcodes</a:t>
-                      </a:r>
-                    </a:p>
-                  </a:txBody>
-                  <a:tcPr marL="50760" marR="50760" marT="50760" marB="50760" anchor="ctr" anchorCtr="0" horzOverflow="overflow">
-                    <a:lnL w="12240">
-                      <a:solidFill>
-                        <a:srgbClr val="000000"/>
-                      </a:solidFill>
-                    </a:lnL>
-                    <a:lnR w="12240">
-                      <a:solidFill>
-                        <a:srgbClr val="000000"/>
-                      </a:solidFill>
-                    </a:lnR>
-                    <a:lnT w="12240">
-                      <a:solidFill>
-                        <a:srgbClr val="000000"/>
-                      </a:solidFill>
-                    </a:lnT>
-                    <a:lnB w="12240">
-                      <a:solidFill>
-                        <a:srgbClr val="000000"/>
-                      </a:solidFill>
-                    </a:lnB>
-                    <a:noFill/>
-                  </a:tcPr>
-                </a:tc>
-                <a:tc>
-                  <a:txBody>
-                    <a:bodyPr/>
-                    <a:lstStyle/>
-                    <a:p>
-                      <a:pPr algn="ctr">
-                        <a:defRPr>
-                          <a:solidFill>
-                            <a:srgbClr val="000000"/>
-                          </a:solidFill>
-                        </a:defRPr>
-                      </a:pPr>
-                      <a:r>
-                        <a:rPr sz="3200">
-                          <a:sym typeface="Helvetica Neue"/>
-                        </a:rPr>
-                        <a:t>0.108</a:t>
-                      </a:r>
-                    </a:p>
-                  </a:txBody>
-                  <a:tcPr marL="50760" marR="50760" marT="50760" marB="50760" anchor="ctr" anchorCtr="0" horzOverflow="overflow">
-                    <a:lnL w="12240">
-                      <a:solidFill>
-                        <a:srgbClr val="000000"/>
-                      </a:solidFill>
-                    </a:lnL>
-                    <a:lnR w="12240">
-                      <a:solidFill>
-                        <a:srgbClr val="000000"/>
-                      </a:solidFill>
-                    </a:lnR>
-                    <a:lnT w="12240">
-                      <a:solidFill>
-                        <a:srgbClr val="000000"/>
-                      </a:solidFill>
-                    </a:lnT>
-                    <a:lnB w="12240">
-                      <a:solidFill>
-                        <a:srgbClr val="000000"/>
-                      </a:solidFill>
-                    </a:lnB>
-                    <a:noFill/>
-                  </a:tcPr>
-                </a:tc>
-                <a:tc>
-                  <a:txBody>
-                    <a:bodyPr/>
-                    <a:lstStyle/>
-                    <a:p>
-                      <a:pPr algn="ctr">
-                        <a:defRPr>
-                          <a:solidFill>
-                            <a:srgbClr val="000000"/>
-                          </a:solidFill>
-                        </a:defRPr>
-                      </a:pPr>
-                      <a:r>
-                        <a:rPr sz="3200">
-                          <a:sym typeface="Helvetica Neue"/>
-                        </a:rPr>
-                        <a:t>0.840</a:t>
-                      </a:r>
-                    </a:p>
-                  </a:txBody>
-                  <a:tcPr marL="50760" marR="50760" marT="50760" marB="50760" anchor="ctr" anchorCtr="0" horzOverflow="overflow">
-                    <a:lnL w="12240">
-                      <a:solidFill>
-                        <a:srgbClr val="000000"/>
-                      </a:solidFill>
-                    </a:lnL>
-                    <a:lnR w="12240">
-                      <a:solidFill>
-                        <a:srgbClr val="000000"/>
-                      </a:solidFill>
-                    </a:lnR>
-                    <a:lnT w="12240">
-                      <a:solidFill>
-                        <a:srgbClr val="000000"/>
-                      </a:solidFill>
-                    </a:lnT>
-                    <a:lnB w="12240">
-                      <a:solidFill>
-                        <a:srgbClr val="000000"/>
-                      </a:solidFill>
-                    </a:lnB>
-                    <a:noFill/>
-                  </a:tcPr>
-                </a:tc>
-                <a:tc>
-                  <a:txBody>
-                    <a:bodyPr/>
-                    <a:lstStyle/>
-                    <a:p>
-                      <a:pPr algn="ctr">
-                        <a:defRPr>
-                          <a:solidFill>
-                            <a:srgbClr val="000000"/>
-                          </a:solidFill>
-                        </a:defRPr>
-                      </a:pPr>
-                      <a:r>
-                        <a:rPr sz="3200">
-                          <a:sym typeface="Helvetica Neue"/>
-                        </a:rPr>
-                        <a:t>0.867</a:t>
-                      </a:r>
-                    </a:p>
-                  </a:txBody>
-                  <a:tcPr marL="50760" marR="50760" marT="50760" marB="50760" anchor="ctr" anchorCtr="0" horzOverflow="overflow">
-                    <a:lnL w="12240">
-                      <a:solidFill>
-                        <a:srgbClr val="000000"/>
-                      </a:solidFill>
-                    </a:lnL>
-                    <a:lnR w="12240">
-                      <a:solidFill>
-                        <a:srgbClr val="000000"/>
-                      </a:solidFill>
-                    </a:lnR>
-                    <a:lnT w="12240">
-                      <a:solidFill>
-                        <a:srgbClr val="000000"/>
-                      </a:solidFill>
-                    </a:lnT>
-                    <a:lnB w="12240">
-                      <a:solidFill>
-                        <a:srgbClr val="000000"/>
-                      </a:solidFill>
-                    </a:lnB>
-                    <a:noFill/>
-                  </a:tcPr>
-                </a:tc>
-              </a:tr>
-              <a:tr h="2060639">
-                <a:tc>
-                  <a:txBody>
-                    <a:bodyPr/>
-                    <a:lstStyle/>
-                    <a:p>
-                      <a:pPr algn="ctr">
-                        <a:defRPr>
-                          <a:solidFill>
-                            <a:srgbClr val="000000"/>
-                          </a:solidFill>
-                        </a:defRPr>
-                      </a:pPr>
-                      <a:r>
-                        <a:rPr sz="3200">
-                          <a:sym typeface="Helvetica Neue"/>
-                        </a:rPr>
-                        <a:t>MLM -&gt; Operands</a:t>
-                      </a:r>
-                    </a:p>
-                  </a:txBody>
-                  <a:tcPr marL="50760" marR="50760" marT="50760" marB="50760" anchor="ctr" anchorCtr="0" horzOverflow="overflow">
-                    <a:lnL w="12240">
-                      <a:solidFill>
-                        <a:srgbClr val="000000"/>
-                      </a:solidFill>
-                    </a:lnL>
-                    <a:lnR w="12240">
-                      <a:solidFill>
-                        <a:srgbClr val="000000"/>
-                      </a:solidFill>
-                    </a:lnR>
-                    <a:lnT w="12240">
-                      <a:solidFill>
-                        <a:srgbClr val="000000"/>
-                      </a:solidFill>
-                    </a:lnT>
-                    <a:lnB w="12240">
-                      <a:solidFill>
-                        <a:srgbClr val="000000"/>
-                      </a:solidFill>
-                    </a:lnB>
-                    <a:noFill/>
-                  </a:tcPr>
-                </a:tc>
-                <a:tc>
-                  <a:txBody>
-                    <a:bodyPr/>
-                    <a:lstStyle/>
-                    <a:p>
-                      <a:pPr algn="ctr">
-                        <a:defRPr sz="3200">
-                          <a:solidFill>
-                            <a:srgbClr val="000000"/>
-                          </a:solidFill>
-                          <a:sym typeface="Helvetica Neue"/>
-                        </a:defRPr>
-                      </a:pPr>
-                    </a:p>
-                  </a:txBody>
-                  <a:tcPr marL="50760" marR="50760" marT="50760" marB="50760" anchor="ctr" anchorCtr="0" horzOverflow="overflow">
-                    <a:lnL w="12240">
-                      <a:solidFill>
-                        <a:srgbClr val="000000"/>
-                      </a:solidFill>
-                    </a:lnL>
-                    <a:lnR w="12240">
-                      <a:solidFill>
-                        <a:srgbClr val="000000"/>
-                      </a:solidFill>
-                    </a:lnR>
-                    <a:lnT w="12240">
-                      <a:solidFill>
-                        <a:srgbClr val="000000"/>
-                      </a:solidFill>
-                    </a:lnT>
-                    <a:lnB w="12240">
-                      <a:solidFill>
-                        <a:srgbClr val="000000"/>
-                      </a:solidFill>
-                    </a:lnB>
-                    <a:noFill/>
-                  </a:tcPr>
-                </a:tc>
-                <a:tc>
-                  <a:txBody>
-                    <a:bodyPr/>
-                    <a:lstStyle/>
-                    <a:p>
-                      <a:pPr algn="ctr">
-                        <a:defRPr sz="3200">
-                          <a:solidFill>
-                            <a:srgbClr val="000000"/>
-                          </a:solidFill>
-                          <a:sym typeface="Helvetica Neue"/>
-                        </a:defRPr>
-                      </a:pPr>
-                    </a:p>
-                  </a:txBody>
-                  <a:tcPr marL="50760" marR="50760" marT="50760" marB="50760" anchor="ctr" anchorCtr="0" horzOverflow="overflow">
-                    <a:lnL w="12240">
-                      <a:solidFill>
-                        <a:srgbClr val="000000"/>
-                      </a:solidFill>
-                    </a:lnL>
-                    <a:lnR w="12240">
-                      <a:solidFill>
-                        <a:srgbClr val="000000"/>
-                      </a:solidFill>
-                    </a:lnR>
-                    <a:lnT w="12240">
-                      <a:solidFill>
-                        <a:srgbClr val="000000"/>
-                      </a:solidFill>
-                    </a:lnT>
-                    <a:lnB w="12240">
-                      <a:solidFill>
-                        <a:srgbClr val="000000"/>
-                      </a:solidFill>
-                    </a:lnB>
-                    <a:noFill/>
-                  </a:tcPr>
-                </a:tc>
-                <a:tc>
-                  <a:txBody>
-                    <a:bodyPr/>
-                    <a:lstStyle/>
-                    <a:p>
-                      <a:pPr algn="ctr">
-                        <a:defRPr sz="3200">
-                          <a:solidFill>
-                            <a:srgbClr val="000000"/>
-                          </a:solidFill>
-                          <a:sym typeface="Helvetica Neue"/>
-                        </a:defRPr>
-                      </a:pPr>
-                    </a:p>
-                  </a:txBody>
-                  <a:tcPr marL="50760" marR="50760" marT="50760" marB="50760" anchor="ctr" anchorCtr="0" horzOverflow="overflow">
-                    <a:lnL w="12240">
-                      <a:solidFill>
-                        <a:srgbClr val="000000"/>
-                      </a:solidFill>
-                    </a:lnL>
-                    <a:lnR w="12240">
-                      <a:solidFill>
-                        <a:srgbClr val="000000"/>
-                      </a:solidFill>
-                    </a:lnR>
-                    <a:lnT w="12240">
-                      <a:solidFill>
-                        <a:srgbClr val="000000"/>
-                      </a:solidFill>
-                    </a:lnT>
-                    <a:lnB w="12240">
-                      <a:solidFill>
-                        <a:srgbClr val="000000"/>
-                      </a:solidFill>
-                    </a:lnB>
-                    <a:noFill/>
-                  </a:tcPr>
-                </a:tc>
-              </a:tr>
-            </a:tbl>
-          </a:graphicData>
-        </a:graphic>
-      </p:graphicFrame>
     </p:spTree>
   </p:cSld>
   <p:clrMapOvr>
     <a:masterClrMapping/>
   </p:clrMapOvr>
   <p:transition xmlns:p14="http://schemas.microsoft.com/office/powerpoint/2010/main" spd="med" advClick="1"/>
+  <p:timing>
+    <p:tnLst>
+      <p:par>
+        <p:cTn id="1" nodeType="tmRoot" restart="never" dur="indefinite" fill="hold">
+          <p:childTnLst>
+            <p:seq concurrent="1" prevAc="none" nextAc="seek">
+              <p:cTn id="2" nodeType="mainSeq" dur="indefinite" fill="hold">
+                <p:childTnLst>
+                  <p:par>
+                    <p:cTn id="3" fill="hold">
+                      <p:stCondLst>
+                        <p:cond delay="indefinite"/>
+                      </p:stCondLst>
+                      <p:childTnLst>
+                        <p:par>
+                          <p:cTn id="4" fill="hold">
+                            <p:stCondLst>
+                              <p:cond delay="0"/>
+                            </p:stCondLst>
+                            <p:childTnLst>
+                              <p:par>
+                                <p:cTn id="5" presetClass="entr" nodeType="clickEffect" presetSubtype="0" presetID="1" grpId="1" fill="hold">
+                                  <p:stCondLst>
+                                    <p:cond delay="0"/>
+                                  </p:stCondLst>
+                                  <p:iterate type="el" backwards="0">
+                                    <p:tmAbs val="0"/>
+                                  </p:iterate>
+                                  <p:childTnLst>
+                                    <p:set>
+                                      <p:cBhvr>
+                                        <p:cTn id="6" fill="hold"/>
+                                        <p:tgtEl>
+                                          <p:spTgt spid="189"/>
+                                        </p:tgtEl>
+                                        <p:attrNameLst>
+                                          <p:attrName>style.visibility</p:attrName>
+                                        </p:attrNameLst>
+                                      </p:cBhvr>
+                                      <p:to>
+                                        <p:strVal val="visible"/>
+                                      </p:to>
+                                    </p:set>
+                                  </p:childTnLst>
+                                </p:cTn>
+                              </p:par>
+                            </p:childTnLst>
+                          </p:cTn>
+                        </p:par>
+                      </p:childTnLst>
+                    </p:cTn>
+                  </p:par>
+                  <p:par>
+                    <p:cTn id="7" fill="hold">
+                      <p:stCondLst>
+                        <p:cond delay="indefinite"/>
+                      </p:stCondLst>
+                      <p:childTnLst>
+                        <p:par>
+                          <p:cTn id="8" fill="hold">
+                            <p:stCondLst>
+                              <p:cond delay="0"/>
+                            </p:stCondLst>
+                            <p:childTnLst>
+                              <p:par>
+                                <p:cTn id="9" presetClass="entr" nodeType="clickEffect" presetSubtype="0" presetID="1" grpId="2" fill="hold">
+                                  <p:stCondLst>
+                                    <p:cond delay="0"/>
+                                  </p:stCondLst>
+                                  <p:iterate type="el" backwards="0">
+                                    <p:tmAbs val="0"/>
+                                  </p:iterate>
+                                  <p:childTnLst>
+                                    <p:set>
+                                      <p:cBhvr>
+                                        <p:cTn id="10" fill="hold"/>
+                                        <p:tgtEl>
+                                          <p:spTgt spid="187"/>
+                                        </p:tgtEl>
+                                        <p:attrNameLst>
+                                          <p:attrName>style.visibility</p:attrName>
+                                        </p:attrNameLst>
+                                      </p:cBhvr>
+                                      <p:to>
+                                        <p:strVal val="visible"/>
+                                      </p:to>
+                                    </p:set>
+                                  </p:childTnLst>
+                                </p:cTn>
+                              </p:par>
+                            </p:childTnLst>
+                          </p:cTn>
+                        </p:par>
+                      </p:childTnLst>
+                    </p:cTn>
+                  </p:par>
+                  <p:par>
+                    <p:cTn id="11" fill="hold">
+                      <p:stCondLst>
+                        <p:cond delay="indefinite"/>
+                      </p:stCondLst>
+                      <p:childTnLst>
+                        <p:par>
+                          <p:cTn id="12" fill="hold">
+                            <p:stCondLst>
+                              <p:cond delay="0"/>
+                            </p:stCondLst>
+                            <p:childTnLst>
+                              <p:par>
+                                <p:cTn id="13" presetClass="entr" nodeType="clickEffect" presetSubtype="0" presetID="1" grpId="3" fill="hold">
+                                  <p:stCondLst>
+                                    <p:cond delay="0"/>
+                                  </p:stCondLst>
+                                  <p:iterate type="el" backwards="0">
+                                    <p:tmAbs val="0"/>
+                                  </p:iterate>
+                                  <p:childTnLst>
+                                    <p:set>
+                                      <p:cBhvr>
+                                        <p:cTn id="14" fill="hold"/>
+                                        <p:tgtEl>
+                                          <p:spTgt spid="188"/>
+                                        </p:tgtEl>
+                                        <p:attrNameLst>
+                                          <p:attrName>style.visibility</p:attrName>
+                                        </p:attrNameLst>
+                                      </p:cBhvr>
+                                      <p:to>
+                                        <p:strVal val="visible"/>
+                                      </p:to>
+                                    </p:set>
+                                  </p:childTnLst>
+                                </p:cTn>
+                              </p:par>
+                            </p:childTnLst>
+                          </p:cTn>
+                        </p:par>
+                      </p:childTnLst>
+                    </p:cTn>
+                  </p:par>
+                </p:childTnLst>
+              </p:cTn>
+              <p:prevCondLst>
+                <p:cond evt="onPrev">
+                  <p:tgtEl>
+                    <p:sldTgt/>
+                  </p:tgtEl>
+                </p:cond>
+              </p:prevCondLst>
+              <p:nextCondLst>
+                <p:cond evt="onNext">
+                  <p:tgtEl>
+                    <p:sldTgt/>
+                  </p:tgtEl>
+                </p:cond>
+              </p:nextCondLst>
+            </p:seq>
+          </p:childTnLst>
+        </p:cTn>
+      </p:par>
+    </p:tnLst>
+    <p:bldLst>
+      <p:bldP build="whole" bldLvl="1" animBg="1" rev="0" advAuto="0" spid="189" grpId="1"/>
+      <p:bldP build="whole" bldLvl="1" animBg="1" rev="0" advAuto="0" spid="187" grpId="2"/>
+      <p:bldP build="whole" bldLvl="1" animBg="1" rev="0" advAuto="0" spid="188" grpId="3"/>
+    </p:bldLst>
+  </p:timing>
 </p:sld>
 </file>
 

</xml_diff>

<commit_message>
Slides: fix typo and mixed up measurements
</commit_message>
<xml_diff>
--- a/presentation/final_presentation.pptx
+++ b/presentation/final_presentation.pptx
@@ -77,10 +77,10 @@
         </a:solidFill>
         <a:effectLst/>
         <a:uFillTx/>
-        <a:latin typeface="+mj-lt"/>
-        <a:ea typeface="+mj-ea"/>
-        <a:cs typeface="+mj-cs"/>
-        <a:sym typeface="Helvetica Neue"/>
+        <a:latin typeface="+mn-lt"/>
+        <a:ea typeface="+mn-ea"/>
+        <a:cs typeface="+mn-cs"/>
+        <a:sym typeface="Helvetica"/>
       </a:defRPr>
     </a:lvl1pPr>
     <a:lvl2pPr marL="0" marR="0" indent="0" algn="l" defTabSz="914400" rtl="0" fontAlgn="auto" latinLnBrk="0" hangingPunct="0">
@@ -107,10 +107,10 @@
         </a:solidFill>
         <a:effectLst/>
         <a:uFillTx/>
-        <a:latin typeface="+mj-lt"/>
-        <a:ea typeface="+mj-ea"/>
-        <a:cs typeface="+mj-cs"/>
-        <a:sym typeface="Helvetica Neue"/>
+        <a:latin typeface="+mn-lt"/>
+        <a:ea typeface="+mn-ea"/>
+        <a:cs typeface="+mn-cs"/>
+        <a:sym typeface="Helvetica"/>
       </a:defRPr>
     </a:lvl2pPr>
     <a:lvl3pPr marL="0" marR="0" indent="0" algn="l" defTabSz="914400" rtl="0" fontAlgn="auto" latinLnBrk="0" hangingPunct="0">
@@ -137,10 +137,10 @@
         </a:solidFill>
         <a:effectLst/>
         <a:uFillTx/>
-        <a:latin typeface="+mj-lt"/>
-        <a:ea typeface="+mj-ea"/>
-        <a:cs typeface="+mj-cs"/>
-        <a:sym typeface="Helvetica Neue"/>
+        <a:latin typeface="+mn-lt"/>
+        <a:ea typeface="+mn-ea"/>
+        <a:cs typeface="+mn-cs"/>
+        <a:sym typeface="Helvetica"/>
       </a:defRPr>
     </a:lvl3pPr>
     <a:lvl4pPr marL="0" marR="0" indent="0" algn="l" defTabSz="914400" rtl="0" fontAlgn="auto" latinLnBrk="0" hangingPunct="0">
@@ -167,10 +167,10 @@
         </a:solidFill>
         <a:effectLst/>
         <a:uFillTx/>
-        <a:latin typeface="+mj-lt"/>
-        <a:ea typeface="+mj-ea"/>
-        <a:cs typeface="+mj-cs"/>
-        <a:sym typeface="Helvetica Neue"/>
+        <a:latin typeface="+mn-lt"/>
+        <a:ea typeface="+mn-ea"/>
+        <a:cs typeface="+mn-cs"/>
+        <a:sym typeface="Helvetica"/>
       </a:defRPr>
     </a:lvl4pPr>
     <a:lvl5pPr marL="0" marR="0" indent="0" algn="l" defTabSz="914400" rtl="0" fontAlgn="auto" latinLnBrk="0" hangingPunct="0">
@@ -197,10 +197,10 @@
         </a:solidFill>
         <a:effectLst/>
         <a:uFillTx/>
-        <a:latin typeface="+mj-lt"/>
-        <a:ea typeface="+mj-ea"/>
-        <a:cs typeface="+mj-cs"/>
-        <a:sym typeface="Helvetica Neue"/>
+        <a:latin typeface="+mn-lt"/>
+        <a:ea typeface="+mn-ea"/>
+        <a:cs typeface="+mn-cs"/>
+        <a:sym typeface="Helvetica"/>
       </a:defRPr>
     </a:lvl5pPr>
     <a:lvl6pPr marL="0" marR="0" indent="0" algn="l" defTabSz="914400" rtl="0" fontAlgn="auto" latinLnBrk="0" hangingPunct="0">
@@ -227,10 +227,10 @@
         </a:solidFill>
         <a:effectLst/>
         <a:uFillTx/>
-        <a:latin typeface="+mj-lt"/>
-        <a:ea typeface="+mj-ea"/>
-        <a:cs typeface="+mj-cs"/>
-        <a:sym typeface="Helvetica Neue"/>
+        <a:latin typeface="+mn-lt"/>
+        <a:ea typeface="+mn-ea"/>
+        <a:cs typeface="+mn-cs"/>
+        <a:sym typeface="Helvetica"/>
       </a:defRPr>
     </a:lvl6pPr>
     <a:lvl7pPr marL="0" marR="0" indent="0" algn="l" defTabSz="914400" rtl="0" fontAlgn="auto" latinLnBrk="0" hangingPunct="0">
@@ -257,10 +257,10 @@
         </a:solidFill>
         <a:effectLst/>
         <a:uFillTx/>
-        <a:latin typeface="+mj-lt"/>
-        <a:ea typeface="+mj-ea"/>
-        <a:cs typeface="+mj-cs"/>
-        <a:sym typeface="Helvetica Neue"/>
+        <a:latin typeface="+mn-lt"/>
+        <a:ea typeface="+mn-ea"/>
+        <a:cs typeface="+mn-cs"/>
+        <a:sym typeface="Helvetica"/>
       </a:defRPr>
     </a:lvl7pPr>
     <a:lvl8pPr marL="0" marR="0" indent="0" algn="l" defTabSz="914400" rtl="0" fontAlgn="auto" latinLnBrk="0" hangingPunct="0">
@@ -287,10 +287,10 @@
         </a:solidFill>
         <a:effectLst/>
         <a:uFillTx/>
-        <a:latin typeface="+mj-lt"/>
-        <a:ea typeface="+mj-ea"/>
-        <a:cs typeface="+mj-cs"/>
-        <a:sym typeface="Helvetica Neue"/>
+        <a:latin typeface="+mn-lt"/>
+        <a:ea typeface="+mn-ea"/>
+        <a:cs typeface="+mn-cs"/>
+        <a:sym typeface="Helvetica"/>
       </a:defRPr>
     </a:lvl8pPr>
     <a:lvl9pPr marL="0" marR="0" indent="0" algn="l" defTabSz="914400" rtl="0" fontAlgn="auto" latinLnBrk="0" hangingPunct="0">
@@ -317,10 +317,10 @@
         </a:solidFill>
         <a:effectLst/>
         <a:uFillTx/>
-        <a:latin typeface="+mj-lt"/>
-        <a:ea typeface="+mj-ea"/>
-        <a:cs typeface="+mj-cs"/>
-        <a:sym typeface="Helvetica Neue"/>
+        <a:latin typeface="+mn-lt"/>
+        <a:ea typeface="+mn-ea"/>
+        <a:cs typeface="+mn-cs"/>
+        <a:sym typeface="Helvetica"/>
       </a:defRPr>
     </a:lvl9pPr>
   </p:defaultTextStyle>
@@ -521,15 +521,15 @@
         </p:nvSpPr>
         <p:spPr>
           <a:xfrm>
-            <a:off x="-1155601" y="-1295281"/>
-            <a:ext cx="26745482" cy="16018202"/>
+            <a:off x="-1155601" y="-1295282"/>
+            <a:ext cx="26745481" cy="16018204"/>
           </a:xfrm>
           <a:prstGeom prst="rect">
             <a:avLst/>
           </a:prstGeom>
         </p:spPr>
         <p:txBody>
-          <a:bodyPr lIns="45719" tIns="45719" rIns="45719" bIns="45719" numCol="1" spcCol="38100"/>
+          <a:bodyPr lIns="45718" tIns="45718" rIns="45718" bIns="45718" numCol="1" spcCol="38100"/>
           <a:lstStyle/>
           <a:p>
             <a:pPr/>
@@ -573,8 +573,8 @@
         </p:nvSpPr>
         <p:spPr>
           <a:xfrm>
-            <a:off x="1206359" y="7124759"/>
-            <a:ext cx="21970442" cy="4647601"/>
+            <a:off x="1206359" y="7124758"/>
+            <a:ext cx="21970442" cy="4647602"/>
           </a:xfrm>
           <a:prstGeom prst="rect">
             <a:avLst/>
@@ -604,7 +604,7 @@
         <p:spPr>
           <a:xfrm>
             <a:off x="1206359" y="11609999"/>
-            <a:ext cx="21970442" cy="1116361"/>
+            <a:ext cx="21970442" cy="1116362"/>
           </a:xfrm>
           <a:prstGeom prst="rect">
             <a:avLst/>
@@ -614,22 +614,7 @@
           <a:bodyPr numCol="1" spcCol="38100"/>
           <a:lstStyle/>
           <a:p>
-            <a:pPr marL="431999" indent="-323999">
-              <a:spcBef>
-                <a:spcPts val="1400"/>
-              </a:spcBef>
-              <a:buClr>
-                <a:srgbClr val="000000"/>
-              </a:buClr>
-              <a:buSzPct val="45000"/>
-              <a:buChar char="●"/>
-              <a:defRPr>
-                <a:latin typeface="Arial"/>
-                <a:ea typeface="Arial"/>
-                <a:cs typeface="Arial"/>
-                <a:sym typeface="Arial"/>
-              </a:defRPr>
-            </a:pPr>
+            <a:pPr/>
           </a:p>
         </p:txBody>
       </p:sp>
@@ -751,25 +736,10 @@
           </a:prstGeom>
         </p:spPr>
         <p:txBody>
-          <a:bodyPr lIns="45719" tIns="45719" rIns="45719" bIns="45719" numCol="1" spcCol="38100"/>
+          <a:bodyPr lIns="45718" tIns="45718" rIns="45718" bIns="45718" numCol="1" spcCol="38100"/>
           <a:lstStyle/>
           <a:p>
-            <a:pPr marL="431999" indent="-323999">
-              <a:spcBef>
-                <a:spcPts val="1400"/>
-              </a:spcBef>
-              <a:buClr>
-                <a:srgbClr val="000000"/>
-              </a:buClr>
-              <a:buSzPct val="45000"/>
-              <a:buChar char="●"/>
-              <a:defRPr>
-                <a:latin typeface="Arial"/>
-                <a:ea typeface="Arial"/>
-                <a:cs typeface="Arial"/>
-                <a:sym typeface="Arial"/>
-              </a:defRPr>
-            </a:pPr>
+            <a:pPr/>
           </a:p>
         </p:txBody>
       </p:sp>
@@ -831,15 +801,15 @@
         </p:nvSpPr>
         <p:spPr>
           <a:xfrm>
-            <a:off x="2429999" y="10675439"/>
-            <a:ext cx="20199241" cy="636121"/>
+            <a:off x="2429998" y="10675439"/>
+            <a:ext cx="20199243" cy="636122"/>
           </a:xfrm>
           <a:prstGeom prst="rect">
             <a:avLst/>
           </a:prstGeom>
         </p:spPr>
         <p:txBody>
-          <a:bodyPr lIns="45719" tIns="45719" rIns="45719" bIns="45719" numCol="1" spcCol="38100"/>
+          <a:bodyPr lIns="45718" tIns="45718" rIns="45718" bIns="45718" numCol="1" spcCol="38100"/>
           <a:lstStyle/>
           <a:p>
             <a:pPr/>
@@ -884,7 +854,7 @@
         <p:spPr>
           <a:xfrm>
             <a:off x="1753920" y="4939920"/>
-            <a:ext cx="20875320" cy="3835441"/>
+            <a:ext cx="20875320" cy="3835442"/>
           </a:xfrm>
           <a:prstGeom prst="rect">
             <a:avLst/>
@@ -894,22 +864,7 @@
           <a:bodyPr numCol="1" spcCol="38100"/>
           <a:lstStyle/>
           <a:p>
-            <a:pPr marL="431999" indent="-323999">
-              <a:spcBef>
-                <a:spcPts val="1400"/>
-              </a:spcBef>
-              <a:buClr>
-                <a:srgbClr val="000000"/>
-              </a:buClr>
-              <a:buSzPct val="45000"/>
-              <a:buChar char="●"/>
-              <a:defRPr>
-                <a:latin typeface="Arial"/>
-                <a:ea typeface="Arial"/>
-                <a:cs typeface="Arial"/>
-                <a:sym typeface="Arial"/>
-              </a:defRPr>
-            </a:pPr>
+            <a:pPr/>
           </a:p>
         </p:txBody>
       </p:sp>
@@ -971,15 +926,15 @@
         </p:nvSpPr>
         <p:spPr>
           <a:xfrm>
-            <a:off x="15760800" y="1015919"/>
-            <a:ext cx="7438321" cy="5949002"/>
+            <a:off x="15760800" y="1015918"/>
+            <a:ext cx="7438322" cy="5949003"/>
           </a:xfrm>
           <a:prstGeom prst="rect">
             <a:avLst/>
           </a:prstGeom>
         </p:spPr>
         <p:txBody>
-          <a:bodyPr lIns="45719" tIns="45719" rIns="45719" bIns="45719" numCol="1" spcCol="38100"/>
+          <a:bodyPr lIns="45718" tIns="45718" rIns="45718" bIns="45718" numCol="1" spcCol="38100"/>
           <a:lstStyle/>
           <a:p>
             <a:pPr/>
@@ -1023,33 +978,18 @@
         </p:nvSpPr>
         <p:spPr>
           <a:xfrm>
-            <a:off x="-139680" y="495359"/>
-            <a:ext cx="16610760" cy="12458162"/>
+            <a:off x="-139680" y="495358"/>
+            <a:ext cx="16610760" cy="12458164"/>
           </a:xfrm>
           <a:prstGeom prst="rect">
             <a:avLst/>
           </a:prstGeom>
         </p:spPr>
         <p:txBody>
-          <a:bodyPr lIns="45719" tIns="45719" rIns="45719" bIns="45719" numCol="1" spcCol="38100"/>
+          <a:bodyPr lIns="45718" tIns="45718" rIns="45718" bIns="45718" numCol="1" spcCol="38100"/>
           <a:lstStyle/>
           <a:p>
-            <a:pPr marL="431999" indent="-323999">
-              <a:spcBef>
-                <a:spcPts val="1400"/>
-              </a:spcBef>
-              <a:buClr>
-                <a:srgbClr val="000000"/>
-              </a:buClr>
-              <a:buSzPct val="45000"/>
-              <a:buChar char="●"/>
-              <a:defRPr>
-                <a:latin typeface="Arial"/>
-                <a:ea typeface="Arial"/>
-                <a:cs typeface="Arial"/>
-                <a:sym typeface="Arial"/>
-              </a:defRPr>
-            </a:pPr>
+            <a:pPr/>
           </a:p>
         </p:txBody>
       </p:sp>
@@ -1112,14 +1052,14 @@
         <p:spPr>
           <a:xfrm>
             <a:off x="-1333441" y="-5524561"/>
-            <a:ext cx="27050400" cy="21639961"/>
+            <a:ext cx="27050399" cy="21639962"/>
           </a:xfrm>
           <a:prstGeom prst="rect">
             <a:avLst/>
           </a:prstGeom>
         </p:spPr>
         <p:txBody>
-          <a:bodyPr lIns="45719" tIns="45719" rIns="45719" bIns="45719" numCol="1" spcCol="38100"/>
+          <a:bodyPr lIns="45718" tIns="45718" rIns="45718" bIns="45718" numCol="1" spcCol="38100"/>
           <a:lstStyle/>
           <a:p>
             <a:pPr/>
@@ -1259,15 +1199,15 @@
         </p:nvSpPr>
         <p:spPr>
           <a:xfrm>
-            <a:off x="1201319" y="11859839"/>
-            <a:ext cx="21970442" cy="636121"/>
+            <a:off x="1201319" y="11859838"/>
+            <a:ext cx="21970442" cy="636122"/>
           </a:xfrm>
           <a:prstGeom prst="rect">
             <a:avLst/>
           </a:prstGeom>
         </p:spPr>
         <p:txBody>
-          <a:bodyPr lIns="45719" tIns="45719" rIns="45719" bIns="45719" numCol="1" spcCol="38100"/>
+          <a:bodyPr lIns="45718" tIns="45718" rIns="45718" bIns="45718" numCol="1" spcCol="38100"/>
           <a:lstStyle/>
           <a:p>
             <a:pPr/>
@@ -1341,8 +1281,8 @@
         </p:nvSpPr>
         <p:spPr>
           <a:xfrm>
-            <a:off x="1201319" y="7223039"/>
-            <a:ext cx="21970442" cy="1904401"/>
+            <a:off x="1201319" y="7223038"/>
+            <a:ext cx="21970442" cy="1904402"/>
           </a:xfrm>
           <a:prstGeom prst="rect">
             <a:avLst/>
@@ -1352,22 +1292,7 @@
           <a:bodyPr numCol="1" spcCol="38100"/>
           <a:lstStyle/>
           <a:p>
-            <a:pPr marL="431999" indent="-323999">
-              <a:spcBef>
-                <a:spcPts val="1400"/>
-              </a:spcBef>
-              <a:buClr>
-                <a:srgbClr val="000000"/>
-              </a:buClr>
-              <a:buSzPct val="45000"/>
-              <a:buChar char="●"/>
-              <a:defRPr>
-                <a:latin typeface="Arial"/>
-                <a:ea typeface="Arial"/>
-                <a:cs typeface="Arial"/>
-                <a:sym typeface="Arial"/>
-              </a:defRPr>
-            </a:pPr>
+            <a:pPr/>
           </a:p>
         </p:txBody>
       </p:sp>
@@ -1437,7 +1362,7 @@
           </a:prstGeom>
         </p:spPr>
         <p:txBody>
-          <a:bodyPr lIns="45719" tIns="45719" rIns="45719" bIns="45719" numCol="1" spcCol="38100"/>
+          <a:bodyPr lIns="45718" tIns="45718" rIns="45718" bIns="45718" numCol="1" spcCol="38100"/>
           <a:lstStyle/>
           <a:p>
             <a:pPr/>
@@ -1523,8 +1448,8 @@
         </p:nvSpPr>
         <p:spPr>
           <a:xfrm>
-            <a:off x="1206359" y="7060679"/>
-            <a:ext cx="9778322" cy="5384881"/>
+            <a:off x="1206358" y="7060679"/>
+            <a:ext cx="9778324" cy="5384882"/>
           </a:xfrm>
           <a:prstGeom prst="rect">
             <a:avLst/>
@@ -1534,22 +1459,7 @@
           <a:bodyPr numCol="1" spcCol="38100"/>
           <a:lstStyle/>
           <a:p>
-            <a:pPr marL="431999" indent="-323999">
-              <a:spcBef>
-                <a:spcPts val="1400"/>
-              </a:spcBef>
-              <a:buClr>
-                <a:srgbClr val="000000"/>
-              </a:buClr>
-              <a:buSzPct val="45000"/>
-              <a:buChar char="●"/>
-              <a:defRPr>
-                <a:latin typeface="Arial"/>
-                <a:ea typeface="Arial"/>
-                <a:cs typeface="Arial"/>
-                <a:sym typeface="Arial"/>
-              </a:defRPr>
-            </a:pPr>
+            <a:pPr/>
           </a:p>
         </p:txBody>
       </p:sp>
@@ -1563,7 +1473,7 @@
         </p:nvSpPr>
         <p:spPr>
           <a:xfrm>
-            <a:off x="12001320" y="13078400"/>
+            <a:off x="12001320" y="13078401"/>
             <a:ext cx="368494" cy="380921"/>
           </a:xfrm>
           <a:prstGeom prst="rect">
@@ -1658,14 +1568,14 @@
         <p:spPr>
           <a:xfrm>
             <a:off x="1206359" y="2373120"/>
-            <a:ext cx="21970442" cy="934201"/>
+            <a:ext cx="21970442" cy="934202"/>
           </a:xfrm>
           <a:prstGeom prst="rect">
             <a:avLst/>
           </a:prstGeom>
         </p:spPr>
         <p:txBody>
-          <a:bodyPr lIns="45719" tIns="45719" rIns="45719" bIns="45719" numCol="1" spcCol="38100"/>
+          <a:bodyPr lIns="45718" tIns="45718" rIns="45718" bIns="45718" numCol="1" spcCol="38100"/>
           <a:lstStyle/>
           <a:p>
             <a:pPr/>
@@ -1720,22 +1630,7 @@
           <a:bodyPr numCol="1" spcCol="38100"/>
           <a:lstStyle/>
           <a:p>
-            <a:pPr marL="431999" indent="-323999">
-              <a:spcBef>
-                <a:spcPts val="1400"/>
-              </a:spcBef>
-              <a:buClr>
-                <a:srgbClr val="000000"/>
-              </a:buClr>
-              <a:buSzPct val="45000"/>
-              <a:buChar char="●"/>
-              <a:defRPr>
-                <a:latin typeface="Arial"/>
-                <a:ea typeface="Arial"/>
-                <a:cs typeface="Arial"/>
-                <a:sym typeface="Arial"/>
-              </a:defRPr>
-            </a:pPr>
+            <a:pPr/>
           </a:p>
         </p:txBody>
       </p:sp>
@@ -1894,14 +1789,14 @@
         <p:spPr>
           <a:xfrm>
             <a:off x="1206359" y="2373120"/>
-            <a:ext cx="9778322" cy="934201"/>
+            <a:ext cx="9778322" cy="934202"/>
           </a:xfrm>
           <a:prstGeom prst="rect">
             <a:avLst/>
           </a:prstGeom>
         </p:spPr>
         <p:txBody>
-          <a:bodyPr lIns="45719" tIns="45719" rIns="45719" bIns="45719" numCol="1" spcCol="38100"/>
+          <a:bodyPr lIns="45718" tIns="45718" rIns="45718" bIns="45718" numCol="1" spcCol="38100"/>
           <a:lstStyle/>
           <a:p>
             <a:pPr/>
@@ -1946,32 +1841,17 @@
         <p:spPr>
           <a:xfrm>
             <a:off x="12192120" y="-407160"/>
-            <a:ext cx="10916281" cy="14555160"/>
+            <a:ext cx="10916282" cy="14555160"/>
           </a:xfrm>
           <a:prstGeom prst="rect">
             <a:avLst/>
           </a:prstGeom>
         </p:spPr>
         <p:txBody>
-          <a:bodyPr lIns="45719" tIns="45719" rIns="45719" bIns="45719" numCol="1" spcCol="38100"/>
+          <a:bodyPr lIns="45718" tIns="45718" rIns="45718" bIns="45718" numCol="1" spcCol="38100"/>
           <a:lstStyle/>
           <a:p>
-            <a:pPr marL="431999" indent="-323999">
-              <a:spcBef>
-                <a:spcPts val="1400"/>
-              </a:spcBef>
-              <a:buClr>
-                <a:srgbClr val="000000"/>
-              </a:buClr>
-              <a:buSzPct val="45000"/>
-              <a:buChar char="●"/>
-              <a:defRPr>
-                <a:latin typeface="Arial"/>
-                <a:ea typeface="Arial"/>
-                <a:cs typeface="Arial"/>
-                <a:sym typeface="Arial"/>
-              </a:defRPr>
-            </a:pPr>
+            <a:pPr/>
           </a:p>
         </p:txBody>
       </p:sp>
@@ -2117,7 +1997,7 @@
         </p:nvSpPr>
         <p:spPr>
           <a:xfrm>
-            <a:off x="12001320" y="13078400"/>
+            <a:off x="12001320" y="13078401"/>
             <a:ext cx="368494" cy="380921"/>
           </a:xfrm>
           <a:prstGeom prst="rect">
@@ -2212,14 +2092,14 @@
         <p:spPr>
           <a:xfrm>
             <a:off x="1206359" y="2373120"/>
-            <a:ext cx="21970442" cy="934201"/>
+            <a:ext cx="21970442" cy="934202"/>
           </a:xfrm>
           <a:prstGeom prst="rect">
             <a:avLst/>
           </a:prstGeom>
         </p:spPr>
         <p:txBody>
-          <a:bodyPr lIns="45719" tIns="45719" rIns="45719" bIns="45719" numCol="1" spcCol="38100"/>
+          <a:bodyPr lIns="45718" tIns="45718" rIns="45718" bIns="45718" numCol="1" spcCol="38100"/>
           <a:lstStyle/>
           <a:p>
             <a:pPr/>
@@ -2354,14 +2234,14 @@
         <p:spPr>
           <a:xfrm>
             <a:off x="1206359" y="2373120"/>
-            <a:ext cx="21970442" cy="934201"/>
+            <a:ext cx="21970442" cy="934202"/>
           </a:xfrm>
           <a:prstGeom prst="rect">
             <a:avLst/>
           </a:prstGeom>
         </p:spPr>
         <p:txBody>
-          <a:bodyPr lIns="45719" tIns="45719" rIns="45719" bIns="45719" numCol="1" spcCol="38100"/>
+          <a:bodyPr lIns="45718" tIns="45718" rIns="45718" bIns="45718" numCol="1" spcCol="38100"/>
           <a:lstStyle/>
           <a:p>
             <a:pPr/>
@@ -2416,22 +2296,7 @@
           <a:bodyPr numCol="1" spcCol="38100"/>
           <a:lstStyle/>
           <a:p>
-            <a:pPr marL="431999" indent="-323999">
-              <a:spcBef>
-                <a:spcPts val="1400"/>
-              </a:spcBef>
-              <a:buClr>
-                <a:srgbClr val="000000"/>
-              </a:buClr>
-              <a:buSzPct val="45000"/>
-              <a:buChar char="●"/>
-              <a:defRPr>
-                <a:latin typeface="Arial"/>
-                <a:ea typeface="Arial"/>
-                <a:cs typeface="Arial"/>
-                <a:sym typeface="Arial"/>
-              </a:defRPr>
-            </a:pPr>
+            <a:pPr/>
           </a:p>
         </p:txBody>
       </p:sp>
@@ -2494,7 +2359,7 @@
         <p:spPr>
           <a:xfrm>
             <a:off x="1206359" y="4920839"/>
-            <a:ext cx="21970442" cy="3873601"/>
+            <a:ext cx="21970442" cy="3873602"/>
           </a:xfrm>
           <a:prstGeom prst="rect">
             <a:avLst/>
@@ -2678,7 +2543,7 @@
           </a:extLst>
         </p:spPr>
         <p:txBody>
-          <a:bodyPr lIns="45719" rIns="45719" anchor="ctr"/>
+          <a:bodyPr lIns="45718" tIns="45718" rIns="45718" bIns="45718" anchor="ctr"/>
           <a:lstStyle/>
           <a:p>
             <a:pPr/>
@@ -2698,7 +2563,7 @@
         </p:nvSpPr>
         <p:spPr>
           <a:xfrm>
-            <a:off x="12001320" y="13074079"/>
+            <a:off x="12001320" y="13074080"/>
             <a:ext cx="368494" cy="380921"/>
           </a:xfrm>
           <a:prstGeom prst="rect">
@@ -2718,10 +2583,6 @@
                 <a:solidFill>
                   <a:srgbClr val="000000"/>
                 </a:solidFill>
-                <a:latin typeface="+mn-lt"/>
-                <a:ea typeface="+mn-ea"/>
-                <a:cs typeface="+mn-cs"/>
-                <a:sym typeface="Helvetica"/>
               </a:defRPr>
             </a:lvl1pPr>
           </a:lstStyle>
@@ -3492,8 +3353,8 @@
         </p:nvSpPr>
         <p:spPr>
           <a:xfrm>
-            <a:off x="1201319" y="11859839"/>
-            <a:ext cx="21970442" cy="636121"/>
+            <a:off x="1201319" y="11859838"/>
+            <a:ext cx="21970442" cy="636122"/>
           </a:xfrm>
           <a:prstGeom prst="rect">
             <a:avLst/>
@@ -3567,8 +3428,8 @@
         </p:nvSpPr>
         <p:spPr>
           <a:xfrm>
-            <a:off x="1201319" y="7223039"/>
-            <a:ext cx="21970442" cy="1904401"/>
+            <a:off x="1201319" y="7223038"/>
+            <a:ext cx="21970442" cy="1904402"/>
           </a:xfrm>
           <a:prstGeom prst="rect">
             <a:avLst/>
@@ -3592,6 +3453,10 @@
                 <a:solidFill>
                   <a:srgbClr val="000000"/>
                 </a:solidFill>
+                <a:latin typeface="+mj-lt"/>
+                <a:ea typeface="+mj-ea"/>
+                <a:cs typeface="+mj-cs"/>
+                <a:sym typeface="Helvetica Neue"/>
               </a:defRPr>
             </a:lvl1pPr>
           </a:lstStyle>
@@ -3716,8 +3581,8 @@
         </p:blipFill>
         <p:spPr>
           <a:xfrm>
-            <a:off x="2628359" y="4348800"/>
-            <a:ext cx="19126801" cy="7246801"/>
+            <a:off x="2628358" y="4348800"/>
+            <a:ext cx="19126803" cy="7246802"/>
           </a:xfrm>
           <a:prstGeom prst="rect">
             <a:avLst/>
@@ -3735,10 +3600,10 @@
         </p:nvGrpSpPr>
         <p:grpSpPr>
           <a:xfrm>
-            <a:off x="12481200" y="4445639"/>
-            <a:ext cx="9213121" cy="7052761"/>
+            <a:off x="12481199" y="4445638"/>
+            <a:ext cx="9213124" cy="7052763"/>
             <a:chOff x="0" y="0"/>
-            <a:chExt cx="9213119" cy="7052760"/>
+            <a:chExt cx="9213122" cy="7052761"/>
           </a:xfrm>
         </p:grpSpPr>
         <p:sp>
@@ -3749,8 +3614,8 @@
           </p:nvSpPr>
           <p:spPr>
             <a:xfrm>
-              <a:off x="0" y="-1"/>
-              <a:ext cx="9213120" cy="7052762"/>
+              <a:off x="-1" y="-1"/>
+              <a:ext cx="9213124" cy="7052763"/>
             </a:xfrm>
             <a:prstGeom prst="rect">
               <a:avLst/>
@@ -3793,7 +3658,7 @@
           <p:spPr>
             <a:xfrm>
               <a:off x="31679" y="2988534"/>
-              <a:ext cx="9149401" cy="1076413"/>
+              <a:ext cx="9149404" cy="1076413"/>
             </a:xfrm>
             <a:prstGeom prst="rect">
               <a:avLst/>
@@ -4059,7 +3924,7 @@
         <p:spPr>
           <a:xfrm flipH="1">
             <a:off x="7495919" y="5144039"/>
-            <a:ext cx="2309401" cy="3765961"/>
+            <a:ext cx="2309402" cy="3765961"/>
           </a:xfrm>
           <a:prstGeom prst="line">
             <a:avLst/>
@@ -4072,7 +3937,7 @@
           </a:ln>
         </p:spPr>
         <p:txBody>
-          <a:bodyPr lIns="0" tIns="0" rIns="0" bIns="0"/>
+          <a:bodyPr lIns="45718" tIns="45718" rIns="45718" bIns="45718"/>
           <a:lstStyle/>
           <a:p>
             <a:pPr/>
@@ -4087,8 +3952,8 @@
         </p:nvSpPr>
         <p:spPr>
           <a:xfrm>
-            <a:off x="9808199" y="5180039"/>
-            <a:ext cx="7225560" cy="3705842"/>
+            <a:off x="9808199" y="5180038"/>
+            <a:ext cx="7225560" cy="3705843"/>
           </a:xfrm>
           <a:prstGeom prst="line">
             <a:avLst/>
@@ -4101,7 +3966,7 @@
           </a:ln>
         </p:spPr>
         <p:txBody>
-          <a:bodyPr lIns="0" tIns="0" rIns="0" bIns="0"/>
+          <a:bodyPr lIns="45718" tIns="45718" rIns="45718" bIns="45718"/>
           <a:lstStyle/>
           <a:p>
             <a:pPr/>
@@ -4117,7 +3982,7 @@
         <p:spPr>
           <a:xfrm>
             <a:off x="4907879" y="4398840"/>
-            <a:ext cx="5381428" cy="456605"/>
+            <a:ext cx="5381427" cy="456605"/>
           </a:xfrm>
           <a:prstGeom prst="rect">
             <a:avLst/>
@@ -4321,9 +4186,9 @@
       </p:par>
     </p:tnLst>
     <p:bldLst>
+      <p:bldP build="whole" bldLvl="1" animBg="1" rev="0" advAuto="0" spid="231" grpId="3"/>
+      <p:bldP build="whole" bldLvl="1" animBg="1" rev="0" advAuto="0" spid="230" grpId="2"/>
       <p:bldP build="whole" bldLvl="1" animBg="1" rev="0" advAuto="0" spid="232" grpId="1"/>
-      <p:bldP build="whole" bldLvl="1" animBg="1" rev="0" advAuto="0" spid="230" grpId="2"/>
-      <p:bldP build="whole" bldLvl="1" animBg="1" rev="0" advAuto="0" spid="231" grpId="3"/>
     </p:bldLst>
   </p:timing>
 </p:sld>
@@ -4356,8 +4221,8 @@
         </p:nvSpPr>
         <p:spPr>
           <a:xfrm>
-            <a:off x="1206359" y="1079640"/>
-            <a:ext cx="21970442" cy="1432441"/>
+            <a:off x="1206359" y="1079639"/>
+            <a:ext cx="21970442" cy="1432443"/>
           </a:xfrm>
           <a:prstGeom prst="rect">
             <a:avLst/>
@@ -4447,7 +4312,7 @@
           </a:bodyPr>
           <a:lstStyle/>
           <a:p>
-            <a:pPr marL="609479" indent="-609479" defTabSz="2438280">
+            <a:pPr marL="609478" indent="-609478" defTabSz="2438280">
               <a:lnSpc>
                 <a:spcPct val="90000"/>
               </a:lnSpc>
@@ -4464,6 +4329,10 @@
                 <a:solidFill>
                   <a:srgbClr val="000000"/>
                 </a:solidFill>
+                <a:latin typeface="+mj-lt"/>
+                <a:ea typeface="+mj-ea"/>
+                <a:cs typeface="+mj-cs"/>
+                <a:sym typeface="Helvetica Neue"/>
               </a:defRPr>
             </a:pPr>
             <a:r>
@@ -4494,6 +4363,10 @@
                 <a:solidFill>
                   <a:srgbClr val="000000"/>
                 </a:solidFill>
+                <a:latin typeface="+mj-lt"/>
+                <a:ea typeface="+mj-ea"/>
+                <a:cs typeface="+mj-cs"/>
+                <a:sym typeface="Helvetica Neue"/>
               </a:defRPr>
             </a:pPr>
             <a:r>
@@ -4524,6 +4397,10 @@
                 <a:solidFill>
                   <a:srgbClr val="000000"/>
                 </a:solidFill>
+                <a:latin typeface="+mj-lt"/>
+                <a:ea typeface="+mj-ea"/>
+                <a:cs typeface="+mj-cs"/>
+                <a:sym typeface="Helvetica Neue"/>
               </a:defRPr>
             </a:pPr>
             <a:r>
@@ -4537,7 +4414,7 @@
             </a:endParaRPr>
           </a:p>
           <a:p>
-            <a:pPr marL="609479" indent="-609479" defTabSz="2438280">
+            <a:pPr marL="609478" indent="-609478" defTabSz="2438280">
               <a:lnSpc>
                 <a:spcPct val="90000"/>
               </a:lnSpc>
@@ -4554,6 +4431,10 @@
                 <a:solidFill>
                   <a:srgbClr val="000000"/>
                 </a:solidFill>
+                <a:latin typeface="+mj-lt"/>
+                <a:ea typeface="+mj-ea"/>
+                <a:cs typeface="+mj-cs"/>
+                <a:sym typeface="Helvetica Neue"/>
               </a:defRPr>
             </a:pPr>
             <a:r>
@@ -4584,6 +4465,10 @@
                 <a:solidFill>
                   <a:srgbClr val="000000"/>
                 </a:solidFill>
+                <a:latin typeface="+mj-lt"/>
+                <a:ea typeface="+mj-ea"/>
+                <a:cs typeface="+mj-cs"/>
+                <a:sym typeface="Helvetica Neue"/>
               </a:defRPr>
             </a:pPr>
             <a:r>
@@ -4628,8 +4513,8 @@
         </p:nvSpPr>
         <p:spPr>
           <a:xfrm>
-            <a:off x="1206359" y="1079640"/>
-            <a:ext cx="21970442" cy="1432441"/>
+            <a:off x="1206359" y="1079639"/>
+            <a:ext cx="21970442" cy="1432443"/>
           </a:xfrm>
           <a:prstGeom prst="rect">
             <a:avLst/>
@@ -4657,8 +4542,8 @@
           <p:nvPr/>
         </p:nvGraphicFramePr>
         <p:xfrm>
-          <a:off x="2877119" y="3518279"/>
-          <a:ext cx="18629281" cy="8777161"/>
+          <a:off x="2877118" y="3518279"/>
+          <a:ext cx="18629283" cy="8777162"/>
         </p:xfrm>
         <a:graphic xmlns:a="http://schemas.openxmlformats.org/drawingml/2006/main">
           <a:graphicData uri="http://schemas.openxmlformats.org/drawingml/2006/table">
@@ -5520,8 +5405,8 @@
         </p:nvSpPr>
         <p:spPr>
           <a:xfrm>
-            <a:off x="1206359" y="1079640"/>
-            <a:ext cx="21970442" cy="1432441"/>
+            <a:off x="1206359" y="1079639"/>
+            <a:ext cx="21970442" cy="1432443"/>
           </a:xfrm>
           <a:prstGeom prst="rect">
             <a:avLst/>
@@ -5549,8 +5434,8 @@
           <p:nvPr/>
         </p:nvGraphicFramePr>
         <p:xfrm>
-          <a:off x="1736639" y="3136319"/>
-          <a:ext cx="20910241" cy="9024121"/>
+          <a:off x="1736638" y="3136319"/>
+          <a:ext cx="20910243" cy="9024122"/>
         </p:xfrm>
         <a:graphic xmlns:a="http://schemas.openxmlformats.org/drawingml/2006/main">
           <a:graphicData uri="http://schemas.openxmlformats.org/drawingml/2006/table">
@@ -5847,7 +5732,7 @@
                         <a:rPr sz="3200">
                           <a:sym typeface="Helvetica Neue"/>
                         </a:rPr>
-                        <a:t>0.8339</a:t>
+                        <a:t>0.8870</a:t>
                       </a:r>
                     </a:p>
                   </a:txBody>
@@ -5891,7 +5776,7 @@
                         <a:rPr sz="3200">
                           <a:sym typeface="Helvetica Neue"/>
                         </a:rPr>
-                        <a:t>0.8870</a:t>
+                        <a:t>0.8339</a:t>
                       </a:r>
                     </a:p>
                   </a:txBody>
@@ -6025,7 +5910,7 @@
                         <a:rPr sz="3200">
                           <a:sym typeface="Helvetica Neue"/>
                         </a:rPr>
-                        <a:t>0.8585</a:t>
+                        <a:t>0.8886</a:t>
                       </a:r>
                     </a:p>
                   </a:txBody>
@@ -6069,7 +5954,7 @@
                         <a:rPr sz="3200">
                           <a:sym typeface="Helvetica Neue"/>
                         </a:rPr>
-                        <a:t>0.8886</a:t>
+                        <a:t>0.8585</a:t>
                       </a:r>
                     </a:p>
                   </a:txBody>
@@ -6203,7 +6088,7 @@
                         <a:rPr sz="3200">
                           <a:sym typeface="Helvetica Neue"/>
                         </a:rPr>
-                        <a:t>0.8493</a:t>
+                        <a:t>0.8893</a:t>
                       </a:r>
                     </a:p>
                   </a:txBody>
@@ -6247,7 +6132,7 @@
                         <a:rPr sz="3200">
                           <a:sym typeface="Helvetica Neue"/>
                         </a:rPr>
-                        <a:t>0.8893</a:t>
+                        <a:t>0.8493</a:t>
                       </a:r>
                     </a:p>
                   </a:txBody>
@@ -6381,7 +6266,7 @@
                         <a:rPr sz="3200">
                           <a:sym typeface="Helvetica Neue"/>
                         </a:rPr>
-                        <a:t>0.8226</a:t>
+                        <a:t>0.8769</a:t>
                       </a:r>
                     </a:p>
                   </a:txBody>
@@ -6425,7 +6310,7 @@
                         <a:rPr sz="3200">
                           <a:sym typeface="Helvetica Neue"/>
                         </a:rPr>
-                        <a:t>0.8769</a:t>
+                        <a:t>0.8226</a:t>
                       </a:r>
                     </a:p>
                   </a:txBody>
@@ -6722,7 +6607,7 @@
                         <a:rPr sz="3200">
                           <a:sym typeface="Helvetica Neue"/>
                         </a:rPr>
-                        <a:t>0.8499</a:t>
+                        <a:t>0.8935</a:t>
                       </a:r>
                     </a:p>
                   </a:txBody>
@@ -6766,7 +6651,7 @@
                         <a:rPr sz="3200">
                           <a:sym typeface="Helvetica Neue"/>
                         </a:rPr>
-                        <a:t>0.8936</a:t>
+                        <a:t>0.8498</a:t>
                       </a:r>
                     </a:p>
                   </a:txBody>
@@ -6836,7 +6721,7 @@
         <p:spPr>
           <a:xfrm>
             <a:off x="1206359" y="1079640"/>
-            <a:ext cx="21970442" cy="1432440"/>
+            <a:ext cx="21970442" cy="1432441"/>
           </a:xfrm>
           <a:prstGeom prst="rect">
             <a:avLst/>
@@ -6864,8 +6749,8 @@
           <p:nvPr/>
         </p:nvGraphicFramePr>
         <p:xfrm>
-          <a:off x="1736880" y="4279680"/>
-          <a:ext cx="20910240" cy="9024120"/>
+          <a:off x="1736880" y="4279679"/>
+          <a:ext cx="20910240" cy="5156641"/>
         </p:xfrm>
         <a:graphic xmlns:a="http://schemas.openxmlformats.org/drawingml/2006/main">
           <a:graphicData uri="http://schemas.openxmlformats.org/drawingml/2006/table">
@@ -7286,13 +7171,18 @@
                     <a:lstStyle/>
                     <a:p>
                       <a:pPr algn="ctr">
-                        <a:defRPr sz="3200">
+                        <a:defRPr>
                           <a:solidFill>
                             <a:srgbClr val="000000"/>
                           </a:solidFill>
-                          <a:sym typeface="Helvetica Neue"/>
                         </a:defRPr>
                       </a:pPr>
+                      <a:r>
+                        <a:rPr sz="3200">
+                          <a:sym typeface="Helvetica Neue"/>
+                        </a:rPr>
+                        <a:t>0.1343</a:t>
+                      </a:r>
                     </a:p>
                   </a:txBody>
                   <a:tcPr marL="50760" marR="50760" marT="50760" marB="50760" anchor="ctr" anchorCtr="0" horzOverflow="overflow">
@@ -7325,13 +7215,18 @@
                     <a:lstStyle/>
                     <a:p>
                       <a:pPr algn="ctr">
-                        <a:defRPr sz="3200">
+                        <a:defRPr>
                           <a:solidFill>
                             <a:srgbClr val="000000"/>
                           </a:solidFill>
-                          <a:sym typeface="Helvetica Neue"/>
                         </a:defRPr>
                       </a:pPr>
+                      <a:r>
+                        <a:rPr sz="3200">
+                          <a:sym typeface="Helvetica Neue"/>
+                        </a:rPr>
+                        <a:t>0.9012</a:t>
+                      </a:r>
                     </a:p>
                   </a:txBody>
                   <a:tcPr marL="50760" marR="50760" marT="50760" marB="50760" anchor="ctr" anchorCtr="0" horzOverflow="overflow">
@@ -7364,13 +7259,18 @@
                     <a:lstStyle/>
                     <a:p>
                       <a:pPr algn="ctr">
-                        <a:defRPr sz="3200">
+                        <a:defRPr>
                           <a:solidFill>
                             <a:srgbClr val="000000"/>
                           </a:solidFill>
-                          <a:sym typeface="Helvetica Neue"/>
                         </a:defRPr>
                       </a:pPr>
+                      <a:r>
+                        <a:rPr sz="3200">
+                          <a:sym typeface="Helvetica Neue"/>
+                        </a:rPr>
+                        <a:t>0.8718</a:t>
+                      </a:r>
                     </a:p>
                   </a:txBody>
                   <a:tcPr marL="50760" marR="50760" marT="50760" marB="50760" anchor="ctr" anchorCtr="0" horzOverflow="overflow">
@@ -7601,8 +7501,8 @@
         </p:nvSpPr>
         <p:spPr>
           <a:xfrm>
-            <a:off x="1206359" y="1079640"/>
-            <a:ext cx="21970442" cy="1432441"/>
+            <a:off x="1206359" y="1079639"/>
+            <a:ext cx="21970442" cy="1432443"/>
           </a:xfrm>
           <a:prstGeom prst="rect">
             <a:avLst/>
@@ -7634,7 +7534,7 @@
         <p:spPr>
           <a:xfrm>
             <a:off x="1206359" y="2992679"/>
-            <a:ext cx="21970442" cy="8255160"/>
+            <a:ext cx="21970442" cy="8255159"/>
           </a:xfrm>
           <a:prstGeom prst="rect">
             <a:avLst/>
@@ -7644,7 +7544,7 @@
           <a:bodyPr lIns="50760" tIns="50760" rIns="50760" bIns="50760"/>
           <a:lstStyle/>
           <a:p>
-            <a:pPr marL="609479" indent="-609479" defTabSz="2438280">
+            <a:pPr marL="609478" indent="-609478" defTabSz="2438280">
               <a:lnSpc>
                 <a:spcPct val="90000"/>
               </a:lnSpc>
@@ -7675,7 +7575,7 @@
             </a:endParaRPr>
           </a:p>
           <a:p>
-            <a:pPr marL="609479" indent="-609479" defTabSz="2438280">
+            <a:pPr marL="609478" indent="-609478" defTabSz="2438280">
               <a:lnSpc>
                 <a:spcPct val="90000"/>
               </a:lnSpc>
@@ -7713,7 +7613,7 @@
             </a:endParaRPr>
           </a:p>
           <a:p>
-            <a:pPr marL="609479" indent="-609479" defTabSz="2438280">
+            <a:pPr marL="609478" indent="-609478" defTabSz="2438280">
               <a:lnSpc>
                 <a:spcPct val="90000"/>
               </a:lnSpc>
@@ -7727,22 +7627,22 @@
               <a:buFont typeface="Symbol"/>
               <a:buChar char="·"/>
               <a:defRPr sz="4800">
+                <a:latin typeface="Arial"/>
+                <a:ea typeface="Arial"/>
+                <a:cs typeface="Arial"/>
+                <a:sym typeface="Arial"/>
+              </a:defRPr>
+            </a:pPr>
+            <a:r>
+              <a:t>Our Approach:</a:t>
+            </a:r>
+            <a:r>
+              <a:rPr>
                 <a:latin typeface="+mj-lt"/>
                 <a:ea typeface="+mj-ea"/>
                 <a:cs typeface="+mj-cs"/>
                 <a:sym typeface="Helvetica Neue"/>
-              </a:defRPr>
-            </a:pPr>
-            <a:r>
-              <a:rPr>
-                <a:latin typeface="Arial"/>
-                <a:ea typeface="Arial"/>
-                <a:cs typeface="Arial"/>
-                <a:sym typeface="Arial"/>
               </a:rPr>
-              <a:t>Our Approach:</a:t>
-            </a:r>
-            <a:r>
               <a:t> measure the importance between different instruction parts, ( opcode vs. operands )</a:t>
             </a:r>
           </a:p>
@@ -7757,7 +7657,7 @@
         <p:spPr>
           <a:xfrm>
             <a:off x="1092599" y="12310919"/>
-            <a:ext cx="22102516" cy="382483"/>
+            <a:ext cx="22102515" cy="382483"/>
           </a:xfrm>
           <a:prstGeom prst="rect">
             <a:avLst/>
@@ -7831,8 +7731,8 @@
         </p:nvSpPr>
         <p:spPr>
           <a:xfrm>
-            <a:off x="1206359" y="1079640"/>
-            <a:ext cx="21970442" cy="1432441"/>
+            <a:off x="1206359" y="1079639"/>
+            <a:ext cx="21970442" cy="1432443"/>
           </a:xfrm>
           <a:prstGeom prst="rect">
             <a:avLst/>
@@ -7890,10 +7790,10 @@
         </p:nvGrpSpPr>
         <p:grpSpPr>
           <a:xfrm>
-            <a:off x="16416360" y="9380880"/>
-            <a:ext cx="3293641" cy="2320201"/>
-            <a:chOff x="0" y="0"/>
-            <a:chExt cx="3293640" cy="2320200"/>
+            <a:off x="16416359" y="9380879"/>
+            <a:ext cx="3293644" cy="2320203"/>
+            <a:chOff x="-1" y="0"/>
+            <a:chExt cx="3293642" cy="2320202"/>
           </a:xfrm>
         </p:grpSpPr>
         <p:sp>
@@ -7904,8 +7804,8 @@
           </p:nvSpPr>
           <p:spPr>
             <a:xfrm>
-              <a:off x="-1" y="-1"/>
-              <a:ext cx="3293642" cy="2320202"/>
+              <a:off x="-2" y="-1"/>
+              <a:ext cx="3293644" cy="2320203"/>
             </a:xfrm>
             <a:prstGeom prst="rect">
               <a:avLst/>
@@ -7933,6 +7833,10 @@
                   <a:solidFill>
                     <a:srgbClr val="000000"/>
                   </a:solidFill>
+                  <a:latin typeface="+mj-lt"/>
+                  <a:ea typeface="+mj-ea"/>
+                  <a:cs typeface="+mj-cs"/>
+                  <a:sym typeface="Helvetica Neue"/>
                 </a:defRPr>
               </a:pPr>
             </a:p>
@@ -7946,8 +7850,8 @@
           </p:nvSpPr>
           <p:spPr>
             <a:xfrm>
-              <a:off x="63360" y="607931"/>
-              <a:ext cx="3166561" cy="1104339"/>
+              <a:off x="63359" y="607931"/>
+              <a:ext cx="3166564" cy="1104339"/>
             </a:xfrm>
             <a:prstGeom prst="rect">
               <a:avLst/>
@@ -7974,6 +7878,10 @@
                   <a:solidFill>
                     <a:srgbClr val="000000"/>
                   </a:solidFill>
+                  <a:latin typeface="+mj-lt"/>
+                  <a:ea typeface="+mj-ea"/>
+                  <a:cs typeface="+mj-cs"/>
+                  <a:sym typeface="Helvetica Neue"/>
                 </a:defRPr>
               </a:lvl1pPr>
             </a:lstStyle>
@@ -7994,10 +7902,10 @@
         </p:nvGrpSpPr>
         <p:grpSpPr>
           <a:xfrm>
-            <a:off x="16416360" y="9380880"/>
-            <a:ext cx="3293641" cy="2320201"/>
-            <a:chOff x="0" y="0"/>
-            <a:chExt cx="3293640" cy="2320200"/>
+            <a:off x="16416359" y="9380879"/>
+            <a:ext cx="3293644" cy="2320203"/>
+            <a:chOff x="-1" y="0"/>
+            <a:chExt cx="3293642" cy="2320202"/>
           </a:xfrm>
         </p:grpSpPr>
         <p:sp>
@@ -8008,8 +7916,8 @@
           </p:nvSpPr>
           <p:spPr>
             <a:xfrm>
-              <a:off x="-1" y="-1"/>
-              <a:ext cx="3293642" cy="2320202"/>
+              <a:off x="-2" y="-1"/>
+              <a:ext cx="3293644" cy="2320203"/>
             </a:xfrm>
             <a:prstGeom prst="rect">
               <a:avLst/>
@@ -8039,6 +7947,10 @@
                   <a:solidFill>
                     <a:srgbClr val="000000"/>
                   </a:solidFill>
+                  <a:latin typeface="+mj-lt"/>
+                  <a:ea typeface="+mj-ea"/>
+                  <a:cs typeface="+mj-cs"/>
+                  <a:sym typeface="Helvetica Neue"/>
                 </a:defRPr>
               </a:pPr>
             </a:p>
@@ -8052,8 +7964,8 @@
           </p:nvSpPr>
           <p:spPr>
             <a:xfrm>
-              <a:off x="63360" y="607931"/>
-              <a:ext cx="3166561" cy="1104339"/>
+              <a:off x="63359" y="607931"/>
+              <a:ext cx="3166564" cy="1104339"/>
             </a:xfrm>
             <a:prstGeom prst="rect">
               <a:avLst/>
@@ -8080,6 +7992,10 @@
                   <a:solidFill>
                     <a:srgbClr val="000000"/>
                   </a:solidFill>
+                  <a:latin typeface="+mj-lt"/>
+                  <a:ea typeface="+mj-ea"/>
+                  <a:cs typeface="+mj-cs"/>
+                  <a:sym typeface="Helvetica Neue"/>
                 </a:defRPr>
               </a:lvl1pPr>
             </a:lstStyle>
@@ -8100,7 +8016,7 @@
         </p:nvSpPr>
         <p:spPr>
           <a:xfrm>
-            <a:off x="10209600" y="12541319"/>
+            <a:off x="10209600" y="12541318"/>
             <a:ext cx="13562943" cy="525923"/>
           </a:xfrm>
           <a:prstGeom prst="rect">
@@ -8161,7 +8077,7 @@
         </p:nvSpPr>
         <p:spPr>
           <a:xfrm>
-            <a:off x="12755880" y="10794959"/>
+            <a:off x="12755880" y="10794958"/>
             <a:ext cx="351582" cy="345630"/>
           </a:xfrm>
           <a:prstGeom prst="rect">
@@ -8359,8 +8275,8 @@
         </p:nvSpPr>
         <p:spPr>
           <a:xfrm>
-            <a:off x="1206359" y="1079640"/>
-            <a:ext cx="21970442" cy="1432441"/>
+            <a:off x="1206359" y="1079639"/>
+            <a:ext cx="21970442" cy="1432443"/>
           </a:xfrm>
           <a:prstGeom prst="rect">
             <a:avLst/>
@@ -8445,7 +8361,7 @@
           </a:bodyPr>
           <a:lstStyle/>
           <a:p>
-            <a:pPr marL="609479" indent="-609479" defTabSz="2438280">
+            <a:pPr marL="609478" indent="-609478" defTabSz="2438280">
               <a:lnSpc>
                 <a:spcPct val="90000"/>
               </a:lnSpc>
@@ -8462,6 +8378,10 @@
                 <a:solidFill>
                   <a:srgbClr val="000000"/>
                 </a:solidFill>
+                <a:latin typeface="+mj-lt"/>
+                <a:ea typeface="+mj-ea"/>
+                <a:cs typeface="+mj-cs"/>
+                <a:sym typeface="Helvetica Neue"/>
               </a:defRPr>
             </a:pPr>
             <a:r>
@@ -8475,7 +8395,7 @@
             </a:endParaRPr>
           </a:p>
           <a:p>
-            <a:pPr marL="609479" indent="-609479" defTabSz="2438280">
+            <a:pPr marL="609478" indent="-609478" defTabSz="2438280">
               <a:lnSpc>
                 <a:spcPct val="90000"/>
               </a:lnSpc>
@@ -8492,6 +8412,10 @@
                 <a:solidFill>
                   <a:srgbClr val="000000"/>
                 </a:solidFill>
+                <a:latin typeface="+mj-lt"/>
+                <a:ea typeface="+mj-ea"/>
+                <a:cs typeface="+mj-cs"/>
+                <a:sym typeface="Helvetica Neue"/>
               </a:defRPr>
             </a:pPr>
             <a:r>
@@ -8505,7 +8429,7 @@
             </a:endParaRPr>
           </a:p>
           <a:p>
-            <a:pPr marL="609479" indent="-609479" defTabSz="2438280">
+            <a:pPr marL="609478" indent="-609478" defTabSz="2438280">
               <a:lnSpc>
                 <a:spcPct val="90000"/>
               </a:lnSpc>
@@ -8522,6 +8446,10 @@
                 <a:solidFill>
                   <a:srgbClr val="000000"/>
                 </a:solidFill>
+                <a:latin typeface="+mj-lt"/>
+                <a:ea typeface="+mj-ea"/>
+                <a:cs typeface="+mj-cs"/>
+                <a:sym typeface="Helvetica Neue"/>
               </a:defRPr>
             </a:pPr>
             <a:r>
@@ -8566,8 +8494,8 @@
         </p:nvSpPr>
         <p:spPr>
           <a:xfrm>
-            <a:off x="1206359" y="1079640"/>
-            <a:ext cx="21970442" cy="1432441"/>
+            <a:off x="1206359" y="1079639"/>
+            <a:ext cx="21970442" cy="1432443"/>
           </a:xfrm>
           <a:prstGeom prst="rect">
             <a:avLst/>
@@ -8669,7 +8597,7 @@
         <p:spPr>
           <a:xfrm>
             <a:off x="11036520" y="9598320"/>
-            <a:ext cx="2183041" cy="1171441"/>
+            <a:ext cx="2183042" cy="1171442"/>
           </a:xfrm>
           <a:prstGeom prst="rect">
             <a:avLst/>
@@ -8705,10 +8633,10 @@
         </p:nvGrpSpPr>
         <p:grpSpPr>
           <a:xfrm>
-            <a:off x="11142360" y="9683639"/>
-            <a:ext cx="1971001" cy="1000800"/>
+            <a:off x="11142359" y="9683639"/>
+            <a:ext cx="1971004" cy="1000801"/>
             <a:chOff x="0" y="0"/>
-            <a:chExt cx="1971000" cy="1000798"/>
+            <a:chExt cx="1971002" cy="1000800"/>
           </a:xfrm>
         </p:grpSpPr>
         <p:sp>
@@ -8719,8 +8647,8 @@
           </p:nvSpPr>
           <p:spPr>
             <a:xfrm>
-              <a:off x="-1" y="0"/>
-              <a:ext cx="1971002" cy="1000799"/>
+              <a:off x="-1" y="-1"/>
+              <a:ext cx="1971004" cy="1000802"/>
             </a:xfrm>
             <a:prstGeom prst="rect">
               <a:avLst/>
@@ -8763,7 +8691,7 @@
           <p:spPr>
             <a:xfrm>
               <a:off x="-1" y="241178"/>
-              <a:ext cx="1971002" cy="518443"/>
+              <a:ext cx="1971004" cy="518444"/>
             </a:xfrm>
             <a:prstGeom prst="rect">
               <a:avLst/>
@@ -8814,10 +8742,10 @@
         </p:nvGrpSpPr>
         <p:grpSpPr>
           <a:xfrm>
-            <a:off x="11142360" y="9683639"/>
-            <a:ext cx="1971001" cy="1000800"/>
+            <a:off x="11142359" y="9683639"/>
+            <a:ext cx="1971004" cy="1000801"/>
             <a:chOff x="0" y="0"/>
-            <a:chExt cx="1971000" cy="1000798"/>
+            <a:chExt cx="1971002" cy="1000800"/>
           </a:xfrm>
         </p:grpSpPr>
         <p:sp>
@@ -8828,8 +8756,8 @@
           </p:nvSpPr>
           <p:spPr>
             <a:xfrm>
-              <a:off x="-1" y="0"/>
-              <a:ext cx="1971002" cy="1000799"/>
+              <a:off x="-1" y="-1"/>
+              <a:ext cx="1971004" cy="1000802"/>
             </a:xfrm>
             <a:prstGeom prst="rect">
               <a:avLst/>
@@ -8872,7 +8800,7 @@
           <p:spPr>
             <a:xfrm>
               <a:off x="-1" y="240049"/>
-              <a:ext cx="1971002" cy="520701"/>
+              <a:ext cx="1971004" cy="520701"/>
             </a:xfrm>
             <a:prstGeom prst="rect">
               <a:avLst/>
@@ -9118,8 +9046,8 @@
         </p:nvSpPr>
         <p:spPr>
           <a:xfrm>
-            <a:off x="1206359" y="1079640"/>
-            <a:ext cx="21970442" cy="1432441"/>
+            <a:off x="1206359" y="1079639"/>
+            <a:ext cx="21970442" cy="1432443"/>
           </a:xfrm>
           <a:prstGeom prst="rect">
             <a:avLst/>
@@ -9220,10 +9148,10 @@
         </p:nvGrpSpPr>
         <p:grpSpPr>
           <a:xfrm>
-            <a:off x="6752880" y="9701279"/>
-            <a:ext cx="1971001" cy="1000800"/>
+            <a:off x="6752879" y="9701279"/>
+            <a:ext cx="1971004" cy="1000801"/>
             <a:chOff x="0" y="0"/>
-            <a:chExt cx="1971000" cy="1000798"/>
+            <a:chExt cx="1971002" cy="1000800"/>
           </a:xfrm>
         </p:grpSpPr>
         <p:sp>
@@ -9234,8 +9162,8 @@
           </p:nvSpPr>
           <p:spPr>
             <a:xfrm>
-              <a:off x="-1" y="0"/>
-              <a:ext cx="1971002" cy="1000799"/>
+              <a:off x="-1" y="-1"/>
+              <a:ext cx="1971004" cy="1000802"/>
             </a:xfrm>
             <a:prstGeom prst="rect">
               <a:avLst/>
@@ -9278,7 +9206,7 @@
           <p:spPr>
             <a:xfrm>
               <a:off x="-1" y="241178"/>
-              <a:ext cx="1971002" cy="518443"/>
+              <a:ext cx="1971004" cy="518444"/>
             </a:xfrm>
             <a:prstGeom prst="rect">
               <a:avLst/>
@@ -9329,10 +9257,10 @@
         </p:nvGrpSpPr>
         <p:grpSpPr>
           <a:xfrm>
-            <a:off x="6752880" y="9701279"/>
-            <a:ext cx="1971001" cy="1000800"/>
+            <a:off x="6752879" y="9701279"/>
+            <a:ext cx="1971004" cy="1000801"/>
             <a:chOff x="0" y="0"/>
-            <a:chExt cx="1971000" cy="1000798"/>
+            <a:chExt cx="1971002" cy="1000800"/>
           </a:xfrm>
         </p:grpSpPr>
         <p:sp>
@@ -9343,8 +9271,8 @@
           </p:nvSpPr>
           <p:spPr>
             <a:xfrm>
-              <a:off x="-1" y="0"/>
-              <a:ext cx="1971002" cy="1000799"/>
+              <a:off x="-1" y="-1"/>
+              <a:ext cx="1971004" cy="1000802"/>
             </a:xfrm>
             <a:prstGeom prst="rect">
               <a:avLst/>
@@ -9387,7 +9315,7 @@
           <p:spPr>
             <a:xfrm>
               <a:off x="-1" y="240049"/>
-              <a:ext cx="1971002" cy="520701"/>
+              <a:ext cx="1971004" cy="520701"/>
             </a:xfrm>
             <a:prstGeom prst="rect">
               <a:avLst/>
@@ -9439,9 +9367,9 @@
         <p:grpSpPr>
           <a:xfrm>
             <a:off x="603000" y="11100878"/>
-            <a:ext cx="5661000" cy="1585244"/>
+            <a:ext cx="5661001" cy="1585243"/>
             <a:chOff x="0" y="0"/>
-            <a:chExt cx="5660999" cy="1585242"/>
+            <a:chExt cx="5661000" cy="1585242"/>
           </a:xfrm>
         </p:grpSpPr>
         <p:sp>
@@ -9453,7 +9381,7 @@
           <p:spPr>
             <a:xfrm>
               <a:off x="0" y="157761"/>
-              <a:ext cx="5661000" cy="1269721"/>
+              <a:ext cx="5661001" cy="1269723"/>
             </a:xfrm>
             <a:prstGeom prst="rect">
               <a:avLst/>
@@ -9495,8 +9423,8 @@
           </p:nvSpPr>
           <p:spPr>
             <a:xfrm>
-              <a:off x="0" y="0"/>
-              <a:ext cx="5661000" cy="1585243"/>
+              <a:off x="0" y="-1"/>
+              <a:ext cx="5661001" cy="1585244"/>
             </a:xfrm>
             <a:prstGeom prst="rect">
               <a:avLst/>
@@ -9547,10 +9475,10 @@
         </p:nvGrpSpPr>
         <p:grpSpPr>
           <a:xfrm>
-            <a:off x="6695999" y="11258639"/>
-            <a:ext cx="2664001" cy="1269721"/>
+            <a:off x="6695998" y="11258639"/>
+            <a:ext cx="2664004" cy="1269723"/>
             <a:chOff x="0" y="0"/>
-            <a:chExt cx="2663999" cy="1269719"/>
+            <a:chExt cx="2664002" cy="1269722"/>
           </a:xfrm>
         </p:grpSpPr>
         <p:sp>
@@ -9561,8 +9489,8 @@
           </p:nvSpPr>
           <p:spPr>
             <a:xfrm>
-              <a:off x="0" y="0"/>
-              <a:ext cx="2664000" cy="1269720"/>
+              <a:off x="-1" y="0"/>
+              <a:ext cx="2664004" cy="1269723"/>
             </a:xfrm>
             <a:prstGeom prst="rect">
               <a:avLst/>
@@ -9607,8 +9535,8 @@
           </p:nvSpPr>
           <p:spPr>
             <a:xfrm>
-              <a:off x="12700" y="375638"/>
-              <a:ext cx="2638600" cy="518444"/>
+              <a:off x="12699" y="375638"/>
+              <a:ext cx="2638604" cy="518444"/>
             </a:xfrm>
             <a:prstGeom prst="rect">
               <a:avLst/>
@@ -9659,10 +9587,10 @@
         </p:nvGrpSpPr>
         <p:grpSpPr>
           <a:xfrm>
-            <a:off x="12024000" y="11258639"/>
-            <a:ext cx="2520001" cy="1269721"/>
+            <a:off x="12023999" y="11258639"/>
+            <a:ext cx="2520004" cy="1269723"/>
             <a:chOff x="0" y="0"/>
-            <a:chExt cx="2520000" cy="1269719"/>
+            <a:chExt cx="2520002" cy="1269722"/>
           </a:xfrm>
         </p:grpSpPr>
         <p:sp>
@@ -9674,7 +9602,7 @@
           <p:spPr>
             <a:xfrm>
               <a:off x="-1" y="0"/>
-              <a:ext cx="2520002" cy="1269720"/>
+              <a:ext cx="2520004" cy="1269723"/>
             </a:xfrm>
             <a:prstGeom prst="rect">
               <a:avLst/>
@@ -9720,7 +9648,7 @@
           <p:spPr>
             <a:xfrm>
               <a:off x="12699" y="108938"/>
-              <a:ext cx="2494602" cy="1051844"/>
+              <a:ext cx="2494604" cy="1051843"/>
             </a:xfrm>
             <a:prstGeom prst="rect">
               <a:avLst/>
@@ -9772,7 +9700,7 @@
         <p:spPr>
           <a:xfrm flipV="1">
             <a:off x="7698960" y="10650959"/>
-            <a:ext cx="1" cy="593641"/>
+            <a:ext cx="2" cy="593642"/>
           </a:xfrm>
           <a:prstGeom prst="line">
             <a:avLst/>
@@ -9785,7 +9713,7 @@
           </a:ln>
         </p:spPr>
         <p:txBody>
-          <a:bodyPr lIns="0" tIns="0" rIns="0" bIns="0"/>
+          <a:bodyPr lIns="45718" tIns="45718" rIns="45718" bIns="45718"/>
           <a:lstStyle/>
           <a:p>
             <a:pPr/>
@@ -9801,7 +9729,7 @@
         <p:spPr>
           <a:xfrm flipH="1" flipV="1">
             <a:off x="9889200" y="10630079"/>
-            <a:ext cx="2134801" cy="1105921"/>
+            <a:ext cx="2134802" cy="1105921"/>
           </a:xfrm>
           <a:prstGeom prst="line">
             <a:avLst/>
@@ -9814,7 +9742,7 @@
           </a:ln>
         </p:spPr>
         <p:txBody>
-          <a:bodyPr lIns="0" tIns="0" rIns="0" bIns="0"/>
+          <a:bodyPr lIns="45718" tIns="45718" rIns="45718" bIns="45718"/>
           <a:lstStyle/>
           <a:p>
             <a:pPr/>
@@ -9830,7 +9758,7 @@
         <p:spPr>
           <a:xfrm flipV="1">
             <a:off x="14544000" y="10618560"/>
-            <a:ext cx="1919521" cy="1261441"/>
+            <a:ext cx="1919522" cy="1261442"/>
           </a:xfrm>
           <a:prstGeom prst="line">
             <a:avLst/>
@@ -9843,7 +9771,7 @@
           </a:ln>
         </p:spPr>
         <p:txBody>
-          <a:bodyPr lIns="0" tIns="0" rIns="0" bIns="0"/>
+          <a:bodyPr lIns="45718" tIns="45718" rIns="45718" bIns="45718"/>
           <a:lstStyle/>
           <a:p>
             <a:pPr/>
@@ -9859,7 +9787,7 @@
         <p:spPr>
           <a:xfrm flipV="1">
             <a:off x="13663800" y="10633319"/>
-            <a:ext cx="619921" cy="619561"/>
+            <a:ext cx="619922" cy="619562"/>
           </a:xfrm>
           <a:prstGeom prst="line">
             <a:avLst/>
@@ -9872,7 +9800,7 @@
           </a:ln>
         </p:spPr>
         <p:txBody>
-          <a:bodyPr lIns="0" tIns="0" rIns="0" bIns="0"/>
+          <a:bodyPr lIns="45718" tIns="45718" rIns="45718" bIns="45718"/>
           <a:lstStyle/>
           <a:p>
             <a:pPr/>
@@ -9887,8 +9815,8 @@
         </p:nvSpPr>
         <p:spPr>
           <a:xfrm flipH="1" flipV="1">
-            <a:off x="12160800" y="10629359"/>
-            <a:ext cx="627841" cy="627841"/>
+            <a:off x="12160800" y="10629358"/>
+            <a:ext cx="627842" cy="627842"/>
           </a:xfrm>
           <a:prstGeom prst="line">
             <a:avLst/>
@@ -9901,7 +9829,7 @@
           </a:ln>
         </p:spPr>
         <p:txBody>
-          <a:bodyPr lIns="0" tIns="0" rIns="0" bIns="0"/>
+          <a:bodyPr lIns="45718" tIns="45718" rIns="45718" bIns="45718"/>
           <a:lstStyle/>
           <a:p>
             <a:pPr/>
@@ -9917,7 +9845,7 @@
         <p:spPr>
           <a:xfrm>
             <a:off x="6646680" y="9615960"/>
-            <a:ext cx="2183041" cy="1171441"/>
+            <a:ext cx="2183042" cy="1171442"/>
           </a:xfrm>
           <a:prstGeom prst="rect">
             <a:avLst/>
@@ -10113,9 +10041,9 @@
       </p:par>
     </p:tnLst>
     <p:bldLst>
-      <p:bldP build="whole" bldLvl="1" animBg="1" rev="0" advAuto="0" spid="205" grpId="1"/>
       <p:bldP build="whole" bldLvl="1" animBg="1" rev="0" advAuto="0" spid="187" grpId="2"/>
       <p:bldP build="whole" bldLvl="1" animBg="1" rev="0" advAuto="0" spid="190" grpId="3"/>
+      <p:bldP build="whole" bldLvl="1" animBg="1" rev="0" advAuto="0" spid="205" grpId="1"/>
     </p:bldLst>
   </p:timing>
 </p:sld>
@@ -10148,8 +10076,8 @@
         </p:nvSpPr>
         <p:spPr>
           <a:xfrm>
-            <a:off x="1206359" y="1079640"/>
-            <a:ext cx="21970442" cy="1432441"/>
+            <a:off x="1206359" y="1079639"/>
+            <a:ext cx="21970442" cy="1432443"/>
           </a:xfrm>
           <a:prstGeom prst="rect">
             <a:avLst/>
@@ -10242,7 +10170,7 @@
           </a:bodyPr>
           <a:lstStyle/>
           <a:p>
-            <a:pPr marL="609479" indent="-609479" defTabSz="2438280">
+            <a:pPr marL="609478" indent="-609478" defTabSz="2438280">
               <a:lnSpc>
                 <a:spcPct val="90000"/>
               </a:lnSpc>
@@ -10259,6 +10187,10 @@
                 <a:solidFill>
                   <a:srgbClr val="000000"/>
                 </a:solidFill>
+                <a:latin typeface="+mj-lt"/>
+                <a:ea typeface="+mj-ea"/>
+                <a:cs typeface="+mj-cs"/>
+                <a:sym typeface="Helvetica Neue"/>
               </a:defRPr>
             </a:pPr>
             <a:r>
@@ -10272,7 +10204,7 @@
             </a:endParaRPr>
           </a:p>
           <a:p>
-            <a:pPr marL="609479" indent="-609479" defTabSz="2438280">
+            <a:pPr marL="609478" indent="-609478" defTabSz="2438280">
               <a:lnSpc>
                 <a:spcPct val="90000"/>
               </a:lnSpc>
@@ -10289,6 +10221,10 @@
                 <a:solidFill>
                   <a:srgbClr val="000000"/>
                 </a:solidFill>
+                <a:latin typeface="+mj-lt"/>
+                <a:ea typeface="+mj-ea"/>
+                <a:cs typeface="+mj-cs"/>
+                <a:sym typeface="Helvetica Neue"/>
               </a:defRPr>
             </a:pPr>
             <a:r>
@@ -10302,7 +10238,7 @@
             </a:endParaRPr>
           </a:p>
           <a:p>
-            <a:pPr marL="609479" indent="-609479" defTabSz="2438280">
+            <a:pPr marL="609478" indent="-609478" defTabSz="2438280">
               <a:lnSpc>
                 <a:spcPct val="90000"/>
               </a:lnSpc>
@@ -10319,6 +10255,10 @@
                 <a:solidFill>
                   <a:srgbClr val="000000"/>
                 </a:solidFill>
+                <a:latin typeface="+mj-lt"/>
+                <a:ea typeface="+mj-ea"/>
+                <a:cs typeface="+mj-cs"/>
+                <a:sym typeface="Helvetica Neue"/>
               </a:defRPr>
             </a:pPr>
             <a:r>
@@ -10363,8 +10303,8 @@
         </p:nvSpPr>
         <p:spPr>
           <a:xfrm>
-            <a:off x="1206359" y="1079640"/>
-            <a:ext cx="21970442" cy="1432441"/>
+            <a:off x="1206359" y="1079639"/>
+            <a:ext cx="21970442" cy="1432443"/>
           </a:xfrm>
           <a:prstGeom prst="rect">
             <a:avLst/>
@@ -10468,6 +10408,10 @@
                 <a:solidFill>
                   <a:srgbClr val="000000"/>
                 </a:solidFill>
+                <a:latin typeface="+mj-lt"/>
+                <a:ea typeface="+mj-ea"/>
+                <a:cs typeface="+mj-cs"/>
+                <a:sym typeface="Helvetica Neue"/>
               </a:defRPr>
             </a:pPr>
             <a:r>
@@ -10498,6 +10442,10 @@
                 <a:solidFill>
                   <a:srgbClr val="000000"/>
                 </a:solidFill>
+                <a:latin typeface="+mj-lt"/>
+                <a:ea typeface="+mj-ea"/>
+                <a:cs typeface="+mj-cs"/>
+                <a:sym typeface="Helvetica Neue"/>
               </a:defRPr>
             </a:pPr>
             <a:r>
@@ -10528,6 +10476,10 @@
                 <a:solidFill>
                   <a:srgbClr val="000000"/>
                 </a:solidFill>
+                <a:latin typeface="+mj-lt"/>
+                <a:ea typeface="+mj-ea"/>
+                <a:cs typeface="+mj-cs"/>
+                <a:sym typeface="Helvetica Neue"/>
               </a:defRPr>
             </a:pPr>
             <a:r>
@@ -10541,7 +10493,7 @@
             </a:endParaRPr>
           </a:p>
           <a:p>
-            <a:pPr lvl="3" marL="2243159" indent="-560880" defTabSz="2243159">
+            <a:pPr lvl="3" marL="2243159" indent="-560879" defTabSz="2243159">
               <a:lnSpc>
                 <a:spcPct val="90000"/>
               </a:lnSpc>
@@ -10558,6 +10510,10 @@
                 <a:solidFill>
                   <a:srgbClr val="000000"/>
                 </a:solidFill>
+                <a:latin typeface="+mj-lt"/>
+                <a:ea typeface="+mj-ea"/>
+                <a:cs typeface="+mj-cs"/>
+                <a:sym typeface="Helvetica Neue"/>
               </a:defRPr>
             </a:pPr>
             <a:r>
@@ -10571,7 +10527,7 @@
             </a:endParaRPr>
           </a:p>
           <a:p>
-            <a:pPr lvl="3" marL="2243159" indent="-560880" defTabSz="2243159">
+            <a:pPr lvl="3" marL="2243159" indent="-560879" defTabSz="2243159">
               <a:lnSpc>
                 <a:spcPct val="90000"/>
               </a:lnSpc>
@@ -10588,6 +10544,10 @@
                 <a:solidFill>
                   <a:srgbClr val="000000"/>
                 </a:solidFill>
+                <a:latin typeface="+mj-lt"/>
+                <a:ea typeface="+mj-ea"/>
+                <a:cs typeface="+mj-cs"/>
+                <a:sym typeface="Helvetica Neue"/>
               </a:defRPr>
             </a:pPr>
             <a:r>
@@ -10601,7 +10561,7 @@
             </a:endParaRPr>
           </a:p>
           <a:p>
-            <a:pPr lvl="3" marL="2243159" indent="-560880" defTabSz="2243159">
+            <a:pPr lvl="3" marL="2243159" indent="-560879" defTabSz="2243159">
               <a:lnSpc>
                 <a:spcPct val="90000"/>
               </a:lnSpc>
@@ -10618,6 +10578,10 @@
                 <a:solidFill>
                   <a:srgbClr val="000000"/>
                 </a:solidFill>
+                <a:latin typeface="+mj-lt"/>
+                <a:ea typeface="+mj-ea"/>
+                <a:cs typeface="+mj-cs"/>
+                <a:sym typeface="Helvetica Neue"/>
               </a:defRPr>
             </a:pPr>
             <a:r>
@@ -10662,8 +10626,8 @@
         </p:nvSpPr>
         <p:spPr>
           <a:xfrm>
-            <a:off x="1206359" y="1079640"/>
-            <a:ext cx="21970442" cy="1432441"/>
+            <a:off x="1206359" y="1079639"/>
+            <a:ext cx="21970442" cy="1432443"/>
           </a:xfrm>
           <a:prstGeom prst="rect">
             <a:avLst/>
@@ -10767,6 +10731,10 @@
                 <a:solidFill>
                   <a:srgbClr val="000000"/>
                 </a:solidFill>
+                <a:latin typeface="+mj-lt"/>
+                <a:ea typeface="+mj-ea"/>
+                <a:cs typeface="+mj-cs"/>
+                <a:sym typeface="Helvetica Neue"/>
               </a:defRPr>
             </a:pPr>
             <a:r>
@@ -10797,10 +10765,14 @@
                 <a:solidFill>
                   <a:srgbClr val="000000"/>
                 </a:solidFill>
+                <a:latin typeface="+mj-lt"/>
+                <a:ea typeface="+mj-ea"/>
+                <a:cs typeface="+mj-cs"/>
+                <a:sym typeface="Helvetica Neue"/>
               </a:defRPr>
             </a:pPr>
             <a:r>
-              <a:t>N = number of all positive samples across the anchors’ project (mininum 7)</a:t>
+              <a:t>N = number of all positive samples across the anchors’ project (minimum 7)</a:t>
             </a:r>
             <a:endParaRPr>
               <a:latin typeface="Arial"/>
@@ -10827,6 +10799,10 @@
                 <a:solidFill>
                   <a:srgbClr val="000000"/>
                 </a:solidFill>
+                <a:latin typeface="+mj-lt"/>
+                <a:ea typeface="+mj-ea"/>
+                <a:cs typeface="+mj-cs"/>
+                <a:sym typeface="Helvetica Neue"/>
               </a:defRPr>
             </a:pPr>
             <a:r>
@@ -10853,8 +10829,8 @@
         </p:blipFill>
         <p:spPr>
           <a:xfrm>
-            <a:off x="9729359" y="2657160"/>
-            <a:ext cx="13191122" cy="8401320"/>
+            <a:off x="9729358" y="2657160"/>
+            <a:ext cx="13191123" cy="8401320"/>
           </a:xfrm>
           <a:prstGeom prst="rect">
             <a:avLst/>
@@ -11066,9 +11042,12 @@
         <a:solidFill>
           <a:srgbClr val="FFFFFF"/>
         </a:solidFill>
-        <a:ln w="12700" cap="flat">
-          <a:noFill/>
-          <a:miter lim="400000"/>
+        <a:ln w="25400" cap="flat">
+          <a:solidFill>
+            <a:schemeClr val="accent1"/>
+          </a:solidFill>
+          <a:prstDash val="solid"/>
+          <a:round/>
         </a:ln>
         <a:effectLst/>
         <a:sp3d/>
@@ -11101,10 +11080,10 @@
             </a:solidFill>
             <a:effectLst/>
             <a:uFillTx/>
-            <a:latin typeface="+mj-lt"/>
-            <a:ea typeface="+mj-ea"/>
-            <a:cs typeface="+mj-cs"/>
-            <a:sym typeface="Helvetica Neue"/>
+            <a:latin typeface="+mn-lt"/>
+            <a:ea typeface="+mn-ea"/>
+            <a:cs typeface="+mn-cs"/>
+            <a:sym typeface="Helvetica"/>
           </a:defRPr>
         </a:defPPr>
         <a:lvl1pPr marL="0" marR="0" indent="0" algn="l" defTabSz="914400" rtl="0" fontAlgn="auto" latinLnBrk="1" hangingPunct="0">
@@ -11352,9 +11331,12 @@
     <a:lnDef>
       <a:spPr>
         <a:noFill/>
-        <a:ln w="12700" cap="flat">
-          <a:noFill/>
-          <a:miter lim="400000"/>
+        <a:ln w="25400" cap="flat">
+          <a:solidFill>
+            <a:schemeClr val="accent1"/>
+          </a:solidFill>
+          <a:prstDash val="solid"/>
+          <a:round/>
         </a:ln>
         <a:effectLst/>
         <a:sp3d/>
@@ -11669,10 +11651,10 @@
             </a:solidFill>
             <a:effectLst/>
             <a:uFillTx/>
-            <a:latin typeface="+mj-lt"/>
-            <a:ea typeface="+mj-ea"/>
-            <a:cs typeface="+mj-cs"/>
-            <a:sym typeface="Helvetica Neue"/>
+            <a:latin typeface="+mn-lt"/>
+            <a:ea typeface="+mn-ea"/>
+            <a:cs typeface="+mn-cs"/>
+            <a:sym typeface="Helvetica"/>
           </a:defRPr>
         </a:defPPr>
         <a:lvl1pPr marL="0" marR="0" indent="0" algn="l" defTabSz="914400" rtl="0" fontAlgn="auto" latinLnBrk="1" hangingPunct="0">
@@ -12114,9 +12096,12 @@
         <a:solidFill>
           <a:srgbClr val="FFFFFF"/>
         </a:solidFill>
-        <a:ln w="12700" cap="flat">
-          <a:noFill/>
-          <a:miter lim="400000"/>
+        <a:ln w="25400" cap="flat">
+          <a:solidFill>
+            <a:schemeClr val="accent1"/>
+          </a:solidFill>
+          <a:prstDash val="solid"/>
+          <a:round/>
         </a:ln>
         <a:effectLst/>
         <a:sp3d/>
@@ -12149,10 +12134,10 @@
             </a:solidFill>
             <a:effectLst/>
             <a:uFillTx/>
-            <a:latin typeface="+mj-lt"/>
-            <a:ea typeface="+mj-ea"/>
-            <a:cs typeface="+mj-cs"/>
-            <a:sym typeface="Helvetica Neue"/>
+            <a:latin typeface="+mn-lt"/>
+            <a:ea typeface="+mn-ea"/>
+            <a:cs typeface="+mn-cs"/>
+            <a:sym typeface="Helvetica"/>
           </a:defRPr>
         </a:defPPr>
         <a:lvl1pPr marL="0" marR="0" indent="0" algn="l" defTabSz="914400" rtl="0" fontAlgn="auto" latinLnBrk="1" hangingPunct="0">
@@ -12400,9 +12385,12 @@
     <a:lnDef>
       <a:spPr>
         <a:noFill/>
-        <a:ln w="12700" cap="flat">
-          <a:noFill/>
-          <a:miter lim="400000"/>
+        <a:ln w="25400" cap="flat">
+          <a:solidFill>
+            <a:schemeClr val="accent1"/>
+          </a:solidFill>
+          <a:prstDash val="solid"/>
+          <a:round/>
         </a:ln>
         <a:effectLst/>
         <a:sp3d/>
@@ -12717,10 +12705,10 @@
             </a:solidFill>
             <a:effectLst/>
             <a:uFillTx/>
-            <a:latin typeface="+mj-lt"/>
-            <a:ea typeface="+mj-ea"/>
-            <a:cs typeface="+mj-cs"/>
-            <a:sym typeface="Helvetica Neue"/>
+            <a:latin typeface="+mn-lt"/>
+            <a:ea typeface="+mn-ea"/>
+            <a:cs typeface="+mn-cs"/>
+            <a:sym typeface="Helvetica"/>
           </a:defRPr>
         </a:defPPr>
         <a:lvl1pPr marL="0" marR="0" indent="0" algn="l" defTabSz="914400" rtl="0" fontAlgn="auto" latinLnBrk="1" hangingPunct="0">

</xml_diff>

<commit_message>
Slides: add 20/80alt measurements
</commit_message>
<xml_diff>
--- a/presentation/final_presentation.pptx
+++ b/presentation/final_presentation.pptx
@@ -77,9 +77,9 @@
         </a:solidFill>
         <a:effectLst/>
         <a:uFillTx/>
-        <a:latin typeface="+mn-lt"/>
-        <a:ea typeface="+mn-ea"/>
-        <a:cs typeface="+mn-cs"/>
+        <a:latin typeface="+mj-lt"/>
+        <a:ea typeface="+mj-ea"/>
+        <a:cs typeface="+mj-cs"/>
         <a:sym typeface="Helvetica"/>
       </a:defRPr>
     </a:lvl1pPr>
@@ -107,9 +107,9 @@
         </a:solidFill>
         <a:effectLst/>
         <a:uFillTx/>
-        <a:latin typeface="+mn-lt"/>
-        <a:ea typeface="+mn-ea"/>
-        <a:cs typeface="+mn-cs"/>
+        <a:latin typeface="+mj-lt"/>
+        <a:ea typeface="+mj-ea"/>
+        <a:cs typeface="+mj-cs"/>
         <a:sym typeface="Helvetica"/>
       </a:defRPr>
     </a:lvl2pPr>
@@ -137,9 +137,9 @@
         </a:solidFill>
         <a:effectLst/>
         <a:uFillTx/>
-        <a:latin typeface="+mn-lt"/>
-        <a:ea typeface="+mn-ea"/>
-        <a:cs typeface="+mn-cs"/>
+        <a:latin typeface="+mj-lt"/>
+        <a:ea typeface="+mj-ea"/>
+        <a:cs typeface="+mj-cs"/>
         <a:sym typeface="Helvetica"/>
       </a:defRPr>
     </a:lvl3pPr>
@@ -167,9 +167,9 @@
         </a:solidFill>
         <a:effectLst/>
         <a:uFillTx/>
-        <a:latin typeface="+mn-lt"/>
-        <a:ea typeface="+mn-ea"/>
-        <a:cs typeface="+mn-cs"/>
+        <a:latin typeface="+mj-lt"/>
+        <a:ea typeface="+mj-ea"/>
+        <a:cs typeface="+mj-cs"/>
         <a:sym typeface="Helvetica"/>
       </a:defRPr>
     </a:lvl4pPr>
@@ -197,9 +197,9 @@
         </a:solidFill>
         <a:effectLst/>
         <a:uFillTx/>
-        <a:latin typeface="+mn-lt"/>
-        <a:ea typeface="+mn-ea"/>
-        <a:cs typeface="+mn-cs"/>
+        <a:latin typeface="+mj-lt"/>
+        <a:ea typeface="+mj-ea"/>
+        <a:cs typeface="+mj-cs"/>
         <a:sym typeface="Helvetica"/>
       </a:defRPr>
     </a:lvl5pPr>
@@ -227,9 +227,9 @@
         </a:solidFill>
         <a:effectLst/>
         <a:uFillTx/>
-        <a:latin typeface="+mn-lt"/>
-        <a:ea typeface="+mn-ea"/>
-        <a:cs typeface="+mn-cs"/>
+        <a:latin typeface="+mj-lt"/>
+        <a:ea typeface="+mj-ea"/>
+        <a:cs typeface="+mj-cs"/>
         <a:sym typeface="Helvetica"/>
       </a:defRPr>
     </a:lvl6pPr>
@@ -257,9 +257,9 @@
         </a:solidFill>
         <a:effectLst/>
         <a:uFillTx/>
-        <a:latin typeface="+mn-lt"/>
-        <a:ea typeface="+mn-ea"/>
-        <a:cs typeface="+mn-cs"/>
+        <a:latin typeface="+mj-lt"/>
+        <a:ea typeface="+mj-ea"/>
+        <a:cs typeface="+mj-cs"/>
         <a:sym typeface="Helvetica"/>
       </a:defRPr>
     </a:lvl7pPr>
@@ -287,9 +287,9 @@
         </a:solidFill>
         <a:effectLst/>
         <a:uFillTx/>
-        <a:latin typeface="+mn-lt"/>
-        <a:ea typeface="+mn-ea"/>
-        <a:cs typeface="+mn-cs"/>
+        <a:latin typeface="+mj-lt"/>
+        <a:ea typeface="+mj-ea"/>
+        <a:cs typeface="+mj-cs"/>
         <a:sym typeface="Helvetica"/>
       </a:defRPr>
     </a:lvl8pPr>
@@ -317,9 +317,9 @@
         </a:solidFill>
         <a:effectLst/>
         <a:uFillTx/>
-        <a:latin typeface="+mn-lt"/>
-        <a:ea typeface="+mn-ea"/>
-        <a:cs typeface="+mn-cs"/>
+        <a:latin typeface="+mj-lt"/>
+        <a:ea typeface="+mj-ea"/>
+        <a:cs typeface="+mj-cs"/>
         <a:sym typeface="Helvetica"/>
       </a:defRPr>
     </a:lvl9pPr>
@@ -420,73 +420,73 @@
   <p:notesStyle>
     <a:lvl1pPr latinLnBrk="0">
       <a:defRPr sz="1200">
-        <a:latin typeface="+mj-lt"/>
-        <a:ea typeface="+mj-ea"/>
-        <a:cs typeface="+mj-cs"/>
+        <a:latin typeface="+mn-lt"/>
+        <a:ea typeface="+mn-ea"/>
+        <a:cs typeface="+mn-cs"/>
         <a:sym typeface="Helvetica Neue"/>
       </a:defRPr>
     </a:lvl1pPr>
     <a:lvl2pPr indent="228600" latinLnBrk="0">
       <a:defRPr sz="1200">
-        <a:latin typeface="+mj-lt"/>
-        <a:ea typeface="+mj-ea"/>
-        <a:cs typeface="+mj-cs"/>
+        <a:latin typeface="+mn-lt"/>
+        <a:ea typeface="+mn-ea"/>
+        <a:cs typeface="+mn-cs"/>
         <a:sym typeface="Helvetica Neue"/>
       </a:defRPr>
     </a:lvl2pPr>
     <a:lvl3pPr indent="457200" latinLnBrk="0">
       <a:defRPr sz="1200">
-        <a:latin typeface="+mj-lt"/>
-        <a:ea typeface="+mj-ea"/>
-        <a:cs typeface="+mj-cs"/>
+        <a:latin typeface="+mn-lt"/>
+        <a:ea typeface="+mn-ea"/>
+        <a:cs typeface="+mn-cs"/>
         <a:sym typeface="Helvetica Neue"/>
       </a:defRPr>
     </a:lvl3pPr>
     <a:lvl4pPr indent="685800" latinLnBrk="0">
       <a:defRPr sz="1200">
-        <a:latin typeface="+mj-lt"/>
-        <a:ea typeface="+mj-ea"/>
-        <a:cs typeface="+mj-cs"/>
+        <a:latin typeface="+mn-lt"/>
+        <a:ea typeface="+mn-ea"/>
+        <a:cs typeface="+mn-cs"/>
         <a:sym typeface="Helvetica Neue"/>
       </a:defRPr>
     </a:lvl4pPr>
     <a:lvl5pPr indent="914400" latinLnBrk="0">
       <a:defRPr sz="1200">
-        <a:latin typeface="+mj-lt"/>
-        <a:ea typeface="+mj-ea"/>
-        <a:cs typeface="+mj-cs"/>
+        <a:latin typeface="+mn-lt"/>
+        <a:ea typeface="+mn-ea"/>
+        <a:cs typeface="+mn-cs"/>
         <a:sym typeface="Helvetica Neue"/>
       </a:defRPr>
     </a:lvl5pPr>
     <a:lvl6pPr indent="1143000" latinLnBrk="0">
       <a:defRPr sz="1200">
-        <a:latin typeface="+mj-lt"/>
-        <a:ea typeface="+mj-ea"/>
-        <a:cs typeface="+mj-cs"/>
+        <a:latin typeface="+mn-lt"/>
+        <a:ea typeface="+mn-ea"/>
+        <a:cs typeface="+mn-cs"/>
         <a:sym typeface="Helvetica Neue"/>
       </a:defRPr>
     </a:lvl6pPr>
     <a:lvl7pPr indent="1371600" latinLnBrk="0">
       <a:defRPr sz="1200">
-        <a:latin typeface="+mj-lt"/>
-        <a:ea typeface="+mj-ea"/>
-        <a:cs typeface="+mj-cs"/>
+        <a:latin typeface="+mn-lt"/>
+        <a:ea typeface="+mn-ea"/>
+        <a:cs typeface="+mn-cs"/>
         <a:sym typeface="Helvetica Neue"/>
       </a:defRPr>
     </a:lvl7pPr>
     <a:lvl8pPr indent="1600200" latinLnBrk="0">
       <a:defRPr sz="1200">
-        <a:latin typeface="+mj-lt"/>
-        <a:ea typeface="+mj-ea"/>
-        <a:cs typeface="+mj-cs"/>
+        <a:latin typeface="+mn-lt"/>
+        <a:ea typeface="+mn-ea"/>
+        <a:cs typeface="+mn-cs"/>
         <a:sym typeface="Helvetica Neue"/>
       </a:defRPr>
     </a:lvl8pPr>
     <a:lvl9pPr indent="1828800" latinLnBrk="0">
       <a:defRPr sz="1200">
-        <a:latin typeface="+mj-lt"/>
-        <a:ea typeface="+mj-ea"/>
-        <a:cs typeface="+mj-cs"/>
+        <a:latin typeface="+mn-lt"/>
+        <a:ea typeface="+mn-ea"/>
+        <a:cs typeface="+mn-cs"/>
         <a:sym typeface="Helvetica Neue"/>
       </a:defRPr>
     </a:lvl9pPr>
@@ -574,7 +574,7 @@
         <p:spPr>
           <a:xfrm>
             <a:off x="1206359" y="7124758"/>
-            <a:ext cx="21970442" cy="4647602"/>
+            <a:ext cx="21970442" cy="4647603"/>
           </a:xfrm>
           <a:prstGeom prst="rect">
             <a:avLst/>
@@ -604,7 +604,7 @@
         <p:spPr>
           <a:xfrm>
             <a:off x="1206359" y="11609999"/>
-            <a:ext cx="21970442" cy="1116362"/>
+            <a:ext cx="21970442" cy="1116363"/>
           </a:xfrm>
           <a:prstGeom prst="rect">
             <a:avLst/>
@@ -801,8 +801,8 @@
         </p:nvSpPr>
         <p:spPr>
           <a:xfrm>
-            <a:off x="2429998" y="10675439"/>
-            <a:ext cx="20199243" cy="636122"/>
+            <a:off x="2429997" y="10675439"/>
+            <a:ext cx="20199245" cy="636123"/>
           </a:xfrm>
           <a:prstGeom prst="rect">
             <a:avLst/>
@@ -927,7 +927,7 @@
         <p:spPr>
           <a:xfrm>
             <a:off x="15760800" y="1015918"/>
-            <a:ext cx="7438322" cy="5949003"/>
+            <a:ext cx="7438323" cy="5949004"/>
           </a:xfrm>
           <a:prstGeom prst="rect">
             <a:avLst/>
@@ -978,8 +978,8 @@
         </p:nvSpPr>
         <p:spPr>
           <a:xfrm>
-            <a:off x="-139680" y="495358"/>
-            <a:ext cx="16610760" cy="12458164"/>
+            <a:off x="-139680" y="495357"/>
+            <a:ext cx="16610760" cy="12458166"/>
           </a:xfrm>
           <a:prstGeom prst="rect">
             <a:avLst/>
@@ -1200,7 +1200,7 @@
         <p:spPr>
           <a:xfrm>
             <a:off x="1201319" y="11859838"/>
-            <a:ext cx="21970442" cy="636122"/>
+            <a:ext cx="21970442" cy="636123"/>
           </a:xfrm>
           <a:prstGeom prst="rect">
             <a:avLst/>
@@ -1282,7 +1282,7 @@
         <p:spPr>
           <a:xfrm>
             <a:off x="1201319" y="7223038"/>
-            <a:ext cx="21970442" cy="1904402"/>
+            <a:ext cx="21970442" cy="1904403"/>
           </a:xfrm>
           <a:prstGeom prst="rect">
             <a:avLst/>
@@ -1423,9 +1423,9 @@
                 <a:spcPct val="80000"/>
               </a:lnSpc>
               <a:defRPr b="1" spc="-170" sz="8500">
-                <a:latin typeface="+mj-lt"/>
-                <a:ea typeface="+mj-ea"/>
-                <a:cs typeface="+mj-cs"/>
+                <a:latin typeface="+mn-lt"/>
+                <a:ea typeface="+mn-ea"/>
+                <a:cs typeface="+mn-cs"/>
                 <a:sym typeface="Helvetica Neue"/>
               </a:defRPr>
             </a:lvl1pPr>
@@ -1448,8 +1448,8 @@
         </p:nvSpPr>
         <p:spPr>
           <a:xfrm>
-            <a:off x="1206358" y="7060679"/>
-            <a:ext cx="9778324" cy="5384882"/>
+            <a:off x="1206357" y="7060679"/>
+            <a:ext cx="9778325" cy="5384883"/>
           </a:xfrm>
           <a:prstGeom prst="rect">
             <a:avLst/>
@@ -1473,7 +1473,7 @@
         </p:nvSpPr>
         <p:spPr>
           <a:xfrm>
-            <a:off x="12001320" y="13078401"/>
+            <a:off x="12001320" y="13078402"/>
             <a:ext cx="368494" cy="380921"/>
           </a:xfrm>
           <a:prstGeom prst="rect">
@@ -1542,9 +1542,9 @@
                 <a:spcPct val="80000"/>
               </a:lnSpc>
               <a:defRPr b="1" spc="-170" sz="8500">
-                <a:latin typeface="+mj-lt"/>
-                <a:ea typeface="+mj-ea"/>
-                <a:cs typeface="+mj-cs"/>
+                <a:latin typeface="+mn-lt"/>
+                <a:ea typeface="+mn-ea"/>
+                <a:cs typeface="+mn-cs"/>
                 <a:sym typeface="Helvetica Neue"/>
               </a:defRPr>
             </a:lvl1pPr>
@@ -1568,7 +1568,7 @@
         <p:spPr>
           <a:xfrm>
             <a:off x="1206359" y="2373120"/>
-            <a:ext cx="21970442" cy="934202"/>
+            <a:ext cx="21970442" cy="934203"/>
           </a:xfrm>
           <a:prstGeom prst="rect">
             <a:avLst/>
@@ -1789,7 +1789,7 @@
         <p:spPr>
           <a:xfrm>
             <a:off x="1206359" y="2373120"/>
-            <a:ext cx="9778322" cy="934202"/>
+            <a:ext cx="9778322" cy="934203"/>
           </a:xfrm>
           <a:prstGeom prst="rect">
             <a:avLst/>
@@ -1840,8 +1840,8 @@
         </p:nvSpPr>
         <p:spPr>
           <a:xfrm>
-            <a:off x="12192120" y="-407160"/>
-            <a:ext cx="10916282" cy="14555160"/>
+            <a:off x="12192119" y="-407160"/>
+            <a:ext cx="10916284" cy="14555160"/>
           </a:xfrm>
           <a:prstGeom prst="rect">
             <a:avLst/>
@@ -1882,9 +1882,9 @@
                 <a:spcPct val="80000"/>
               </a:lnSpc>
               <a:defRPr b="1" spc="-170" sz="8500">
-                <a:latin typeface="+mj-lt"/>
-                <a:ea typeface="+mj-ea"/>
-                <a:cs typeface="+mj-cs"/>
+                <a:latin typeface="+mn-lt"/>
+                <a:ea typeface="+mn-ea"/>
+                <a:cs typeface="+mn-cs"/>
                 <a:sym typeface="Helvetica Neue"/>
               </a:defRPr>
             </a:lvl1pPr>
@@ -1997,7 +1997,7 @@
         </p:nvSpPr>
         <p:spPr>
           <a:xfrm>
-            <a:off x="12001320" y="13078401"/>
+            <a:off x="12001320" y="13078402"/>
             <a:ext cx="368494" cy="380921"/>
           </a:xfrm>
           <a:prstGeom prst="rect">
@@ -2066,9 +2066,9 @@
                 <a:spcPct val="80000"/>
               </a:lnSpc>
               <a:defRPr b="1" spc="-170" sz="8500">
-                <a:latin typeface="+mj-lt"/>
-                <a:ea typeface="+mj-ea"/>
-                <a:cs typeface="+mj-cs"/>
+                <a:latin typeface="+mn-lt"/>
+                <a:ea typeface="+mn-ea"/>
+                <a:cs typeface="+mn-cs"/>
                 <a:sym typeface="Helvetica Neue"/>
               </a:defRPr>
             </a:lvl1pPr>
@@ -2092,7 +2092,7 @@
         <p:spPr>
           <a:xfrm>
             <a:off x="1206359" y="2373120"/>
-            <a:ext cx="21970442" cy="934202"/>
+            <a:ext cx="21970442" cy="934203"/>
           </a:xfrm>
           <a:prstGeom prst="rect">
             <a:avLst/>
@@ -2208,9 +2208,9 @@
                 <a:spcPct val="80000"/>
               </a:lnSpc>
               <a:defRPr b="1" spc="-170" sz="8500">
-                <a:latin typeface="+mj-lt"/>
-                <a:ea typeface="+mj-ea"/>
-                <a:cs typeface="+mj-cs"/>
+                <a:latin typeface="+mn-lt"/>
+                <a:ea typeface="+mn-ea"/>
+                <a:cs typeface="+mn-cs"/>
                 <a:sym typeface="Helvetica Neue"/>
               </a:defRPr>
             </a:lvl1pPr>
@@ -2234,7 +2234,7 @@
         <p:spPr>
           <a:xfrm>
             <a:off x="1206359" y="2373120"/>
-            <a:ext cx="21970442" cy="934202"/>
+            <a:ext cx="21970442" cy="934203"/>
           </a:xfrm>
           <a:prstGeom prst="rect">
             <a:avLst/>
@@ -2359,7 +2359,7 @@
         <p:spPr>
           <a:xfrm>
             <a:off x="1206359" y="4920839"/>
-            <a:ext cx="21970442" cy="3873602"/>
+            <a:ext cx="21970442" cy="3873603"/>
           </a:xfrm>
           <a:prstGeom prst="rect">
             <a:avLst/>
@@ -2635,9 +2635,9 @@
             <a:srgbClr val="000000"/>
           </a:solidFill>
           <a:uFillTx/>
-          <a:latin typeface="+mn-lt"/>
-          <a:ea typeface="+mn-ea"/>
-          <a:cs typeface="+mn-cs"/>
+          <a:latin typeface="+mj-lt"/>
+          <a:ea typeface="+mj-ea"/>
+          <a:cs typeface="+mj-cs"/>
           <a:sym typeface="Helvetica"/>
         </a:defRPr>
       </a:lvl1pPr>
@@ -2661,9 +2661,9 @@
             <a:srgbClr val="000000"/>
           </a:solidFill>
           <a:uFillTx/>
-          <a:latin typeface="+mn-lt"/>
-          <a:ea typeface="+mn-ea"/>
-          <a:cs typeface="+mn-cs"/>
+          <a:latin typeface="+mj-lt"/>
+          <a:ea typeface="+mj-ea"/>
+          <a:cs typeface="+mj-cs"/>
           <a:sym typeface="Helvetica"/>
         </a:defRPr>
       </a:lvl2pPr>
@@ -2687,9 +2687,9 @@
             <a:srgbClr val="000000"/>
           </a:solidFill>
           <a:uFillTx/>
-          <a:latin typeface="+mn-lt"/>
-          <a:ea typeface="+mn-ea"/>
-          <a:cs typeface="+mn-cs"/>
+          <a:latin typeface="+mj-lt"/>
+          <a:ea typeface="+mj-ea"/>
+          <a:cs typeface="+mj-cs"/>
           <a:sym typeface="Helvetica"/>
         </a:defRPr>
       </a:lvl3pPr>
@@ -2713,9 +2713,9 @@
             <a:srgbClr val="000000"/>
           </a:solidFill>
           <a:uFillTx/>
-          <a:latin typeface="+mn-lt"/>
-          <a:ea typeface="+mn-ea"/>
-          <a:cs typeface="+mn-cs"/>
+          <a:latin typeface="+mj-lt"/>
+          <a:ea typeface="+mj-ea"/>
+          <a:cs typeface="+mj-cs"/>
           <a:sym typeface="Helvetica"/>
         </a:defRPr>
       </a:lvl4pPr>
@@ -2739,9 +2739,9 @@
             <a:srgbClr val="000000"/>
           </a:solidFill>
           <a:uFillTx/>
-          <a:latin typeface="+mn-lt"/>
-          <a:ea typeface="+mn-ea"/>
-          <a:cs typeface="+mn-cs"/>
+          <a:latin typeface="+mj-lt"/>
+          <a:ea typeface="+mj-ea"/>
+          <a:cs typeface="+mj-cs"/>
           <a:sym typeface="Helvetica"/>
         </a:defRPr>
       </a:lvl5pPr>
@@ -2765,9 +2765,9 @@
             <a:srgbClr val="000000"/>
           </a:solidFill>
           <a:uFillTx/>
-          <a:latin typeface="+mn-lt"/>
-          <a:ea typeface="+mn-ea"/>
-          <a:cs typeface="+mn-cs"/>
+          <a:latin typeface="+mj-lt"/>
+          <a:ea typeface="+mj-ea"/>
+          <a:cs typeface="+mj-cs"/>
           <a:sym typeface="Helvetica"/>
         </a:defRPr>
       </a:lvl6pPr>
@@ -2791,9 +2791,9 @@
             <a:srgbClr val="000000"/>
           </a:solidFill>
           <a:uFillTx/>
-          <a:latin typeface="+mn-lt"/>
-          <a:ea typeface="+mn-ea"/>
-          <a:cs typeface="+mn-cs"/>
+          <a:latin typeface="+mj-lt"/>
+          <a:ea typeface="+mj-ea"/>
+          <a:cs typeface="+mj-cs"/>
           <a:sym typeface="Helvetica"/>
         </a:defRPr>
       </a:lvl7pPr>
@@ -2817,9 +2817,9 @@
             <a:srgbClr val="000000"/>
           </a:solidFill>
           <a:uFillTx/>
-          <a:latin typeface="+mn-lt"/>
-          <a:ea typeface="+mn-ea"/>
-          <a:cs typeface="+mn-cs"/>
+          <a:latin typeface="+mj-lt"/>
+          <a:ea typeface="+mj-ea"/>
+          <a:cs typeface="+mj-cs"/>
           <a:sym typeface="Helvetica"/>
         </a:defRPr>
       </a:lvl8pPr>
@@ -2843,9 +2843,9 @@
             <a:srgbClr val="000000"/>
           </a:solidFill>
           <a:uFillTx/>
-          <a:latin typeface="+mn-lt"/>
-          <a:ea typeface="+mn-ea"/>
-          <a:cs typeface="+mn-cs"/>
+          <a:latin typeface="+mj-lt"/>
+          <a:ea typeface="+mj-ea"/>
+          <a:cs typeface="+mj-cs"/>
           <a:sym typeface="Helvetica"/>
         </a:defRPr>
       </a:lvl9pPr>
@@ -2871,9 +2871,9 @@
             <a:srgbClr val="000000"/>
           </a:solidFill>
           <a:uFillTx/>
-          <a:latin typeface="+mn-lt"/>
-          <a:ea typeface="+mn-ea"/>
-          <a:cs typeface="+mn-cs"/>
+          <a:latin typeface="+mj-lt"/>
+          <a:ea typeface="+mj-ea"/>
+          <a:cs typeface="+mj-cs"/>
           <a:sym typeface="Helvetica"/>
         </a:defRPr>
       </a:lvl1pPr>
@@ -2897,9 +2897,9 @@
             <a:srgbClr val="000000"/>
           </a:solidFill>
           <a:uFillTx/>
-          <a:latin typeface="+mn-lt"/>
-          <a:ea typeface="+mn-ea"/>
-          <a:cs typeface="+mn-cs"/>
+          <a:latin typeface="+mj-lt"/>
+          <a:ea typeface="+mj-ea"/>
+          <a:cs typeface="+mj-cs"/>
           <a:sym typeface="Helvetica"/>
         </a:defRPr>
       </a:lvl2pPr>
@@ -2923,9 +2923,9 @@
             <a:srgbClr val="000000"/>
           </a:solidFill>
           <a:uFillTx/>
-          <a:latin typeface="+mn-lt"/>
-          <a:ea typeface="+mn-ea"/>
-          <a:cs typeface="+mn-cs"/>
+          <a:latin typeface="+mj-lt"/>
+          <a:ea typeface="+mj-ea"/>
+          <a:cs typeface="+mj-cs"/>
           <a:sym typeface="Helvetica"/>
         </a:defRPr>
       </a:lvl3pPr>
@@ -2949,9 +2949,9 @@
             <a:srgbClr val="000000"/>
           </a:solidFill>
           <a:uFillTx/>
-          <a:latin typeface="+mn-lt"/>
-          <a:ea typeface="+mn-ea"/>
-          <a:cs typeface="+mn-cs"/>
+          <a:latin typeface="+mj-lt"/>
+          <a:ea typeface="+mj-ea"/>
+          <a:cs typeface="+mj-cs"/>
           <a:sym typeface="Helvetica"/>
         </a:defRPr>
       </a:lvl4pPr>
@@ -2975,9 +2975,9 @@
             <a:srgbClr val="000000"/>
           </a:solidFill>
           <a:uFillTx/>
-          <a:latin typeface="+mn-lt"/>
-          <a:ea typeface="+mn-ea"/>
-          <a:cs typeface="+mn-cs"/>
+          <a:latin typeface="+mj-lt"/>
+          <a:ea typeface="+mj-ea"/>
+          <a:cs typeface="+mj-cs"/>
           <a:sym typeface="Helvetica"/>
         </a:defRPr>
       </a:lvl5pPr>
@@ -3001,9 +3001,9 @@
             <a:srgbClr val="000000"/>
           </a:solidFill>
           <a:uFillTx/>
-          <a:latin typeface="+mn-lt"/>
-          <a:ea typeface="+mn-ea"/>
-          <a:cs typeface="+mn-cs"/>
+          <a:latin typeface="+mj-lt"/>
+          <a:ea typeface="+mj-ea"/>
+          <a:cs typeface="+mj-cs"/>
           <a:sym typeface="Helvetica"/>
         </a:defRPr>
       </a:lvl6pPr>
@@ -3027,9 +3027,9 @@
             <a:srgbClr val="000000"/>
           </a:solidFill>
           <a:uFillTx/>
-          <a:latin typeface="+mn-lt"/>
-          <a:ea typeface="+mn-ea"/>
-          <a:cs typeface="+mn-cs"/>
+          <a:latin typeface="+mj-lt"/>
+          <a:ea typeface="+mj-ea"/>
+          <a:cs typeface="+mj-cs"/>
           <a:sym typeface="Helvetica"/>
         </a:defRPr>
       </a:lvl7pPr>
@@ -3053,9 +3053,9 @@
             <a:srgbClr val="000000"/>
           </a:solidFill>
           <a:uFillTx/>
-          <a:latin typeface="+mn-lt"/>
-          <a:ea typeface="+mn-ea"/>
-          <a:cs typeface="+mn-cs"/>
+          <a:latin typeface="+mj-lt"/>
+          <a:ea typeface="+mj-ea"/>
+          <a:cs typeface="+mj-cs"/>
           <a:sym typeface="Helvetica"/>
         </a:defRPr>
       </a:lvl8pPr>
@@ -3079,9 +3079,9 @@
             <a:srgbClr val="000000"/>
           </a:solidFill>
           <a:uFillTx/>
-          <a:latin typeface="+mn-lt"/>
-          <a:ea typeface="+mn-ea"/>
-          <a:cs typeface="+mn-cs"/>
+          <a:latin typeface="+mj-lt"/>
+          <a:ea typeface="+mj-ea"/>
+          <a:cs typeface="+mj-cs"/>
           <a:sym typeface="Helvetica"/>
         </a:defRPr>
       </a:lvl9pPr>
@@ -3354,7 +3354,7 @@
         <p:spPr>
           <a:xfrm>
             <a:off x="1201319" y="11859838"/>
-            <a:ext cx="21970442" cy="636122"/>
+            <a:ext cx="21970442" cy="636123"/>
           </a:xfrm>
           <a:prstGeom prst="rect">
             <a:avLst/>
@@ -3365,9 +3365,9 @@
           <a:lstStyle>
             <a:lvl1pPr defTabSz="825480">
               <a:defRPr b="1" sz="3600">
-                <a:latin typeface="+mj-lt"/>
-                <a:ea typeface="+mj-ea"/>
-                <a:cs typeface="+mj-cs"/>
+                <a:latin typeface="+mn-lt"/>
+                <a:ea typeface="+mn-ea"/>
+                <a:cs typeface="+mn-cs"/>
                 <a:sym typeface="Helvetica Neue"/>
               </a:defRPr>
             </a:lvl1pPr>
@@ -3405,9 +3405,9 @@
                 <a:spcPct val="80000"/>
               </a:lnSpc>
               <a:defRPr b="1" spc="-300" sz="11600">
-                <a:latin typeface="+mj-lt"/>
-                <a:ea typeface="+mj-ea"/>
-                <a:cs typeface="+mj-cs"/>
+                <a:latin typeface="+mn-lt"/>
+                <a:ea typeface="+mn-ea"/>
+                <a:cs typeface="+mn-cs"/>
                 <a:sym typeface="Helvetica Neue"/>
               </a:defRPr>
             </a:lvl1pPr>
@@ -3429,7 +3429,7 @@
         <p:spPr>
           <a:xfrm>
             <a:off x="1201319" y="7223038"/>
-            <a:ext cx="21970442" cy="1904402"/>
+            <a:ext cx="21970442" cy="1904403"/>
           </a:xfrm>
           <a:prstGeom prst="rect">
             <a:avLst/>
@@ -3453,9 +3453,9 @@
                 <a:solidFill>
                   <a:srgbClr val="000000"/>
                 </a:solidFill>
-                <a:latin typeface="+mj-lt"/>
-                <a:ea typeface="+mj-ea"/>
-                <a:cs typeface="+mj-cs"/>
+                <a:latin typeface="+mn-lt"/>
+                <a:ea typeface="+mn-ea"/>
+                <a:cs typeface="+mn-cs"/>
                 <a:sym typeface="Helvetica Neue"/>
               </a:defRPr>
             </a:lvl1pPr>
@@ -3548,9 +3548,9 @@
           <a:lstStyle>
             <a:lvl1pPr defTabSz="825480">
               <a:defRPr b="1" sz="5500">
-                <a:latin typeface="+mj-lt"/>
-                <a:ea typeface="+mj-ea"/>
-                <a:cs typeface="+mj-cs"/>
+                <a:latin typeface="+mn-lt"/>
+                <a:ea typeface="+mn-ea"/>
+                <a:cs typeface="+mn-cs"/>
                 <a:sym typeface="Helvetica Neue"/>
               </a:defRPr>
             </a:lvl1pPr>
@@ -3581,8 +3581,8 @@
         </p:blipFill>
         <p:spPr>
           <a:xfrm>
-            <a:off x="2628358" y="4348800"/>
-            <a:ext cx="19126803" cy="7246802"/>
+            <a:off x="2628357" y="4348800"/>
+            <a:ext cx="19126805" cy="7246802"/>
           </a:xfrm>
           <a:prstGeom prst="rect">
             <a:avLst/>
@@ -3600,10 +3600,10 @@
         </p:nvGrpSpPr>
         <p:grpSpPr>
           <a:xfrm>
-            <a:off x="12481199" y="4445638"/>
-            <a:ext cx="9213124" cy="7052763"/>
-            <a:chOff x="0" y="0"/>
-            <a:chExt cx="9213122" cy="7052761"/>
+            <a:off x="12481197" y="4445637"/>
+            <a:ext cx="9213127" cy="7052766"/>
+            <a:chOff x="-1" y="0"/>
+            <a:chExt cx="9213126" cy="7052764"/>
           </a:xfrm>
         </p:grpSpPr>
         <p:sp>
@@ -3614,8 +3614,8 @@
           </p:nvSpPr>
           <p:spPr>
             <a:xfrm>
-              <a:off x="-1" y="-1"/>
-              <a:ext cx="9213124" cy="7052763"/>
+              <a:off x="-2" y="-1"/>
+              <a:ext cx="9213127" cy="7052766"/>
             </a:xfrm>
             <a:prstGeom prst="rect">
               <a:avLst/>
@@ -3657,8 +3657,8 @@
           </p:nvSpPr>
           <p:spPr>
             <a:xfrm>
-              <a:off x="31679" y="2988534"/>
-              <a:ext cx="9149404" cy="1076413"/>
+              <a:off x="31678" y="2988535"/>
+              <a:ext cx="9149407" cy="1076412"/>
             </a:xfrm>
             <a:prstGeom prst="rect">
               <a:avLst/>
@@ -3871,9 +3871,9 @@
           <a:lstStyle>
             <a:lvl1pPr defTabSz="825480">
               <a:defRPr b="1" sz="5500">
-                <a:latin typeface="+mj-lt"/>
-                <a:ea typeface="+mj-ea"/>
-                <a:cs typeface="+mj-cs"/>
+                <a:latin typeface="+mn-lt"/>
+                <a:ea typeface="+mn-ea"/>
+                <a:cs typeface="+mn-cs"/>
                 <a:sym typeface="Helvetica Neue"/>
               </a:defRPr>
             </a:lvl1pPr>
@@ -3924,7 +3924,7 @@
         <p:spPr>
           <a:xfrm flipH="1">
             <a:off x="7495919" y="5144039"/>
-            <a:ext cx="2309402" cy="3765961"/>
+            <a:ext cx="2309403" cy="3765961"/>
           </a:xfrm>
           <a:prstGeom prst="line">
             <a:avLst/>
@@ -3952,8 +3952,8 @@
         </p:nvSpPr>
         <p:spPr>
           <a:xfrm>
-            <a:off x="9808199" y="5180038"/>
-            <a:ext cx="7225560" cy="3705843"/>
+            <a:off x="9808199" y="5180037"/>
+            <a:ext cx="7225560" cy="3705845"/>
           </a:xfrm>
           <a:prstGeom prst="line">
             <a:avLst/>
@@ -4186,9 +4186,9 @@
       </p:par>
     </p:tnLst>
     <p:bldLst>
+      <p:bldP build="whole" bldLvl="1" animBg="1" rev="0" advAuto="0" spid="232" grpId="1"/>
+      <p:bldP build="whole" bldLvl="1" animBg="1" rev="0" advAuto="0" spid="230" grpId="2"/>
       <p:bldP build="whole" bldLvl="1" animBg="1" rev="0" advAuto="0" spid="231" grpId="3"/>
-      <p:bldP build="whole" bldLvl="1" animBg="1" rev="0" advAuto="0" spid="230" grpId="2"/>
-      <p:bldP build="whole" bldLvl="1" animBg="1" rev="0" advAuto="0" spid="232" grpId="1"/>
     </p:bldLst>
   </p:timing>
 </p:sld>
@@ -4222,7 +4222,7 @@
         <p:spPr>
           <a:xfrm>
             <a:off x="1206359" y="1079639"/>
-            <a:ext cx="21970442" cy="1432443"/>
+            <a:ext cx="21970442" cy="1432444"/>
           </a:xfrm>
           <a:prstGeom prst="rect">
             <a:avLst/>
@@ -4268,9 +4268,9 @@
                 <a:spcPct val="80000"/>
               </a:lnSpc>
               <a:defRPr b="1" spc="-300" sz="5600">
-                <a:latin typeface="+mj-lt"/>
-                <a:ea typeface="+mj-ea"/>
-                <a:cs typeface="+mj-cs"/>
+                <a:latin typeface="+mn-lt"/>
+                <a:ea typeface="+mn-ea"/>
+                <a:cs typeface="+mn-cs"/>
                 <a:sym typeface="Helvetica Neue"/>
               </a:defRPr>
             </a:lvl1pPr>
@@ -4329,9 +4329,9 @@
                 <a:solidFill>
                   <a:srgbClr val="000000"/>
                 </a:solidFill>
-                <a:latin typeface="+mj-lt"/>
-                <a:ea typeface="+mj-ea"/>
-                <a:cs typeface="+mj-cs"/>
+                <a:latin typeface="+mn-lt"/>
+                <a:ea typeface="+mn-ea"/>
+                <a:cs typeface="+mn-cs"/>
                 <a:sym typeface="Helvetica Neue"/>
               </a:defRPr>
             </a:pPr>
@@ -4363,9 +4363,9 @@
                 <a:solidFill>
                   <a:srgbClr val="000000"/>
                 </a:solidFill>
-                <a:latin typeface="+mj-lt"/>
-                <a:ea typeface="+mj-ea"/>
-                <a:cs typeface="+mj-cs"/>
+                <a:latin typeface="+mn-lt"/>
+                <a:ea typeface="+mn-ea"/>
+                <a:cs typeface="+mn-cs"/>
                 <a:sym typeface="Helvetica Neue"/>
               </a:defRPr>
             </a:pPr>
@@ -4397,9 +4397,9 @@
                 <a:solidFill>
                   <a:srgbClr val="000000"/>
                 </a:solidFill>
-                <a:latin typeface="+mj-lt"/>
-                <a:ea typeface="+mj-ea"/>
-                <a:cs typeface="+mj-cs"/>
+                <a:latin typeface="+mn-lt"/>
+                <a:ea typeface="+mn-ea"/>
+                <a:cs typeface="+mn-cs"/>
                 <a:sym typeface="Helvetica Neue"/>
               </a:defRPr>
             </a:pPr>
@@ -4431,9 +4431,9 @@
                 <a:solidFill>
                   <a:srgbClr val="000000"/>
                 </a:solidFill>
-                <a:latin typeface="+mj-lt"/>
-                <a:ea typeface="+mj-ea"/>
-                <a:cs typeface="+mj-cs"/>
+                <a:latin typeface="+mn-lt"/>
+                <a:ea typeface="+mn-ea"/>
+                <a:cs typeface="+mn-cs"/>
                 <a:sym typeface="Helvetica Neue"/>
               </a:defRPr>
             </a:pPr>
@@ -4465,9 +4465,9 @@
                 <a:solidFill>
                   <a:srgbClr val="000000"/>
                 </a:solidFill>
-                <a:latin typeface="+mj-lt"/>
-                <a:ea typeface="+mj-ea"/>
-                <a:cs typeface="+mj-cs"/>
+                <a:latin typeface="+mn-lt"/>
+                <a:ea typeface="+mn-ea"/>
+                <a:cs typeface="+mn-cs"/>
                 <a:sym typeface="Helvetica Neue"/>
               </a:defRPr>
             </a:pPr>
@@ -4514,7 +4514,7 @@
         <p:spPr>
           <a:xfrm>
             <a:off x="1206359" y="1079639"/>
-            <a:ext cx="21970442" cy="1432443"/>
+            <a:ext cx="21970442" cy="1432444"/>
           </a:xfrm>
           <a:prstGeom prst="rect">
             <a:avLst/>
@@ -4542,8 +4542,8 @@
           <p:nvPr/>
         </p:nvGraphicFramePr>
         <p:xfrm>
-          <a:off x="2877118" y="3518279"/>
-          <a:ext cx="18629283" cy="8777162"/>
+          <a:off x="2877117" y="3518279"/>
+          <a:ext cx="18629285" cy="8777162"/>
         </p:xfrm>
         <a:graphic xmlns:a="http://schemas.openxmlformats.org/drawingml/2006/main">
           <a:graphicData uri="http://schemas.openxmlformats.org/drawingml/2006/table">
@@ -5406,7 +5406,7 @@
         <p:spPr>
           <a:xfrm>
             <a:off x="1206359" y="1079639"/>
-            <a:ext cx="21970442" cy="1432443"/>
+            <a:ext cx="21970442" cy="1432444"/>
           </a:xfrm>
           <a:prstGeom prst="rect">
             <a:avLst/>
@@ -5434,8 +5434,8 @@
           <p:nvPr/>
         </p:nvGraphicFramePr>
         <p:xfrm>
-          <a:off x="1736638" y="3136319"/>
-          <a:ext cx="20910243" cy="9024122"/>
+          <a:off x="1736637" y="3136319"/>
+          <a:ext cx="20910245" cy="9024123"/>
         </p:xfrm>
         <a:graphic xmlns:a="http://schemas.openxmlformats.org/drawingml/2006/main">
           <a:graphicData uri="http://schemas.openxmlformats.org/drawingml/2006/table">
@@ -6720,8 +6720,8 @@
         </p:nvSpPr>
         <p:spPr>
           <a:xfrm>
-            <a:off x="1206359" y="1079640"/>
-            <a:ext cx="21970442" cy="1432441"/>
+            <a:off x="1206359" y="1079639"/>
+            <a:ext cx="21970442" cy="1432443"/>
           </a:xfrm>
           <a:prstGeom prst="rect">
             <a:avLst/>
@@ -6750,7 +6750,7 @@
         </p:nvGraphicFramePr>
         <p:xfrm>
           <a:off x="1736880" y="4279679"/>
-          <a:ext cx="20910240" cy="5156641"/>
+          <a:ext cx="20910240" cy="5156642"/>
         </p:xfrm>
         <a:graphic xmlns:a="http://schemas.openxmlformats.org/drawingml/2006/main">
           <a:graphicData uri="http://schemas.openxmlformats.org/drawingml/2006/table">
@@ -7047,7 +7047,7 @@
                         <a:rPr sz="3200">
                           <a:sym typeface="Helvetica Neue"/>
                         </a:rPr>
-                        <a:t>0.8339</a:t>
+                        <a:t>0.8870</a:t>
                       </a:r>
                     </a:p>
                   </a:txBody>
@@ -7091,7 +7091,7 @@
                         <a:rPr sz="3200">
                           <a:sym typeface="Helvetica Neue"/>
                         </a:rPr>
-                        <a:t>0.8870</a:t>
+                        <a:t>0.8339</a:t>
                       </a:r>
                     </a:p>
                   </a:txBody>
@@ -7349,13 +7349,18 @@
                     <a:lstStyle/>
                     <a:p>
                       <a:pPr algn="ctr">
-                        <a:defRPr sz="3200">
+                        <a:defRPr>
                           <a:solidFill>
                             <a:srgbClr val="000000"/>
                           </a:solidFill>
-                          <a:sym typeface="Helvetica Neue"/>
                         </a:defRPr>
                       </a:pPr>
+                      <a:r>
+                        <a:rPr sz="3200">
+                          <a:sym typeface="Helvetica Neue"/>
+                        </a:rPr>
+                        <a:t>0.1312</a:t>
+                      </a:r>
                     </a:p>
                   </a:txBody>
                   <a:tcPr marL="50760" marR="50760" marT="50760" marB="50760" anchor="ctr" anchorCtr="0" horzOverflow="overflow">
@@ -7388,13 +7393,18 @@
                     <a:lstStyle/>
                     <a:p>
                       <a:pPr algn="ctr">
-                        <a:defRPr sz="3200">
+                        <a:defRPr>
                           <a:solidFill>
                             <a:srgbClr val="000000"/>
                           </a:solidFill>
-                          <a:sym typeface="Helvetica Neue"/>
                         </a:defRPr>
                       </a:pPr>
+                      <a:r>
+                        <a:rPr sz="3200">
+                          <a:sym typeface="Helvetica Neue"/>
+                        </a:rPr>
+                        <a:t>0.8871</a:t>
+                      </a:r>
                     </a:p>
                   </a:txBody>
                   <a:tcPr marL="50760" marR="50760" marT="50760" marB="50760" anchor="ctr" anchorCtr="0" horzOverflow="overflow">
@@ -7427,13 +7437,18 @@
                     <a:lstStyle/>
                     <a:p>
                       <a:pPr algn="ctr">
-                        <a:defRPr sz="3200">
+                        <a:defRPr>
                           <a:solidFill>
                             <a:srgbClr val="000000"/>
                           </a:solidFill>
-                          <a:sym typeface="Helvetica Neue"/>
                         </a:defRPr>
                       </a:pPr>
+                      <a:r>
+                        <a:rPr sz="3200">
+                          <a:sym typeface="Helvetica Neue"/>
+                        </a:rPr>
+                        <a:t>0.8502</a:t>
+                      </a:r>
                     </a:p>
                   </a:txBody>
                   <a:tcPr marL="50760" marR="50760" marT="50760" marB="50760" anchor="ctr" anchorCtr="0" horzOverflow="overflow">
@@ -7502,7 +7517,7 @@
         <p:spPr>
           <a:xfrm>
             <a:off x="1206359" y="1079639"/>
-            <a:ext cx="21970442" cy="1432443"/>
+            <a:ext cx="21970442" cy="1432444"/>
           </a:xfrm>
           <a:prstGeom prst="rect">
             <a:avLst/>
@@ -7558,9 +7573,9 @@
               <a:buFont typeface="Symbol"/>
               <a:buChar char="·"/>
               <a:defRPr sz="4800">
-                <a:latin typeface="+mj-lt"/>
-                <a:ea typeface="+mj-ea"/>
-                <a:cs typeface="+mj-cs"/>
+                <a:latin typeface="+mn-lt"/>
+                <a:ea typeface="+mn-ea"/>
+                <a:cs typeface="+mn-cs"/>
                 <a:sym typeface="Helvetica Neue"/>
               </a:defRPr>
             </a:pPr>
@@ -7589,9 +7604,9 @@
               <a:buFont typeface="Symbol"/>
               <a:buChar char="·"/>
               <a:defRPr sz="4800">
-                <a:latin typeface="+mj-lt"/>
-                <a:ea typeface="+mj-ea"/>
-                <a:cs typeface="+mj-cs"/>
+                <a:latin typeface="+mn-lt"/>
+                <a:ea typeface="+mn-ea"/>
+                <a:cs typeface="+mn-cs"/>
                 <a:sym typeface="Helvetica Neue"/>
               </a:defRPr>
             </a:pPr>
@@ -7638,9 +7653,9 @@
             </a:r>
             <a:r>
               <a:rPr>
-                <a:latin typeface="+mj-lt"/>
-                <a:ea typeface="+mj-ea"/>
-                <a:cs typeface="+mj-cs"/>
+                <a:latin typeface="+mn-lt"/>
+                <a:ea typeface="+mn-ea"/>
+                <a:cs typeface="+mn-cs"/>
                 <a:sym typeface="Helvetica Neue"/>
               </a:rPr>
               <a:t> measure the importance between different instruction parts, ( opcode vs. operands )</a:t>
@@ -7656,8 +7671,8 @@
         </p:nvSpPr>
         <p:spPr>
           <a:xfrm>
-            <a:off x="1092599" y="12310919"/>
-            <a:ext cx="22102515" cy="382483"/>
+            <a:off x="1092598" y="12310919"/>
+            <a:ext cx="22102516" cy="382483"/>
           </a:xfrm>
           <a:prstGeom prst="rect">
             <a:avLst/>
@@ -7732,7 +7747,7 @@
         <p:spPr>
           <a:xfrm>
             <a:off x="1206359" y="1079639"/>
-            <a:ext cx="21970442" cy="1432443"/>
+            <a:ext cx="21970442" cy="1432444"/>
           </a:xfrm>
           <a:prstGeom prst="rect">
             <a:avLst/>
@@ -7790,10 +7805,10 @@
         </p:nvGrpSpPr>
         <p:grpSpPr>
           <a:xfrm>
-            <a:off x="16416359" y="9380879"/>
-            <a:ext cx="3293644" cy="2320203"/>
+            <a:off x="16416358" y="9380878"/>
+            <a:ext cx="3293646" cy="2320205"/>
             <a:chOff x="-1" y="0"/>
-            <a:chExt cx="3293642" cy="2320202"/>
+            <a:chExt cx="3293645" cy="2320203"/>
           </a:xfrm>
         </p:grpSpPr>
         <p:sp>
@@ -7805,7 +7820,7 @@
           <p:spPr>
             <a:xfrm>
               <a:off x="-2" y="-1"/>
-              <a:ext cx="3293644" cy="2320203"/>
+              <a:ext cx="3293647" cy="2320204"/>
             </a:xfrm>
             <a:prstGeom prst="rect">
               <a:avLst/>
@@ -7833,9 +7848,9 @@
                   <a:solidFill>
                     <a:srgbClr val="000000"/>
                   </a:solidFill>
-                  <a:latin typeface="+mj-lt"/>
-                  <a:ea typeface="+mj-ea"/>
-                  <a:cs typeface="+mj-cs"/>
+                  <a:latin typeface="+mn-lt"/>
+                  <a:ea typeface="+mn-ea"/>
+                  <a:cs typeface="+mn-cs"/>
                   <a:sym typeface="Helvetica Neue"/>
                 </a:defRPr>
               </a:pPr>
@@ -7850,8 +7865,8 @@
           </p:nvSpPr>
           <p:spPr>
             <a:xfrm>
-              <a:off x="63359" y="607931"/>
-              <a:ext cx="3166564" cy="1104339"/>
+              <a:off x="63360" y="607931"/>
+              <a:ext cx="3166566" cy="1104339"/>
             </a:xfrm>
             <a:prstGeom prst="rect">
               <a:avLst/>
@@ -7878,9 +7893,9 @@
                   <a:solidFill>
                     <a:srgbClr val="000000"/>
                   </a:solidFill>
-                  <a:latin typeface="+mj-lt"/>
-                  <a:ea typeface="+mj-ea"/>
-                  <a:cs typeface="+mj-cs"/>
+                  <a:latin typeface="+mn-lt"/>
+                  <a:ea typeface="+mn-ea"/>
+                  <a:cs typeface="+mn-cs"/>
                   <a:sym typeface="Helvetica Neue"/>
                 </a:defRPr>
               </a:lvl1pPr>
@@ -7902,10 +7917,10 @@
         </p:nvGrpSpPr>
         <p:grpSpPr>
           <a:xfrm>
-            <a:off x="16416359" y="9380879"/>
-            <a:ext cx="3293644" cy="2320203"/>
+            <a:off x="16416358" y="9380878"/>
+            <a:ext cx="3293646" cy="2320205"/>
             <a:chOff x="-1" y="0"/>
-            <a:chExt cx="3293642" cy="2320202"/>
+            <a:chExt cx="3293645" cy="2320203"/>
           </a:xfrm>
         </p:grpSpPr>
         <p:sp>
@@ -7917,7 +7932,7 @@
           <p:spPr>
             <a:xfrm>
               <a:off x="-2" y="-1"/>
-              <a:ext cx="3293644" cy="2320203"/>
+              <a:ext cx="3293647" cy="2320204"/>
             </a:xfrm>
             <a:prstGeom prst="rect">
               <a:avLst/>
@@ -7947,9 +7962,9 @@
                   <a:solidFill>
                     <a:srgbClr val="000000"/>
                   </a:solidFill>
-                  <a:latin typeface="+mj-lt"/>
-                  <a:ea typeface="+mj-ea"/>
-                  <a:cs typeface="+mj-cs"/>
+                  <a:latin typeface="+mn-lt"/>
+                  <a:ea typeface="+mn-ea"/>
+                  <a:cs typeface="+mn-cs"/>
                   <a:sym typeface="Helvetica Neue"/>
                 </a:defRPr>
               </a:pPr>
@@ -7964,8 +7979,8 @@
           </p:nvSpPr>
           <p:spPr>
             <a:xfrm>
-              <a:off x="63359" y="607931"/>
-              <a:ext cx="3166564" cy="1104339"/>
+              <a:off x="63360" y="607931"/>
+              <a:ext cx="3166566" cy="1104339"/>
             </a:xfrm>
             <a:prstGeom prst="rect">
               <a:avLst/>
@@ -7992,9 +8007,9 @@
                   <a:solidFill>
                     <a:srgbClr val="000000"/>
                   </a:solidFill>
-                  <a:latin typeface="+mj-lt"/>
-                  <a:ea typeface="+mj-ea"/>
-                  <a:cs typeface="+mj-cs"/>
+                  <a:latin typeface="+mn-lt"/>
+                  <a:ea typeface="+mn-ea"/>
+                  <a:cs typeface="+mn-cs"/>
                   <a:sym typeface="Helvetica Neue"/>
                 </a:defRPr>
               </a:lvl1pPr>
@@ -8017,7 +8032,7 @@
         <p:spPr>
           <a:xfrm>
             <a:off x="10209600" y="12541318"/>
-            <a:ext cx="13562943" cy="525923"/>
+            <a:ext cx="13562943" cy="525922"/>
           </a:xfrm>
           <a:prstGeom prst="rect">
             <a:avLst/>
@@ -8078,7 +8093,7 @@
         <p:spPr>
           <a:xfrm>
             <a:off x="12755880" y="10794958"/>
-            <a:ext cx="351582" cy="345630"/>
+            <a:ext cx="351582" cy="345629"/>
           </a:xfrm>
           <a:prstGeom prst="rect">
             <a:avLst/>
@@ -8276,7 +8291,7 @@
         <p:spPr>
           <a:xfrm>
             <a:off x="1206359" y="1079639"/>
-            <a:ext cx="21970442" cy="1432443"/>
+            <a:ext cx="21970442" cy="1432444"/>
           </a:xfrm>
           <a:prstGeom prst="rect">
             <a:avLst/>
@@ -8323,9 +8338,9 @@
                 <a:spcPts val="1400"/>
               </a:spcBef>
               <a:defRPr b="1" sz="5500">
-                <a:latin typeface="+mj-lt"/>
-                <a:ea typeface="+mj-ea"/>
-                <a:cs typeface="+mj-cs"/>
+                <a:latin typeface="+mn-lt"/>
+                <a:ea typeface="+mn-ea"/>
+                <a:cs typeface="+mn-cs"/>
                 <a:sym typeface="Helvetica Neue"/>
               </a:defRPr>
             </a:pPr>
@@ -8378,9 +8393,9 @@
                 <a:solidFill>
                   <a:srgbClr val="000000"/>
                 </a:solidFill>
-                <a:latin typeface="+mj-lt"/>
-                <a:ea typeface="+mj-ea"/>
-                <a:cs typeface="+mj-cs"/>
+                <a:latin typeface="+mn-lt"/>
+                <a:ea typeface="+mn-ea"/>
+                <a:cs typeface="+mn-cs"/>
                 <a:sym typeface="Helvetica Neue"/>
               </a:defRPr>
             </a:pPr>
@@ -8412,9 +8427,9 @@
                 <a:solidFill>
                   <a:srgbClr val="000000"/>
                 </a:solidFill>
-                <a:latin typeface="+mj-lt"/>
-                <a:ea typeface="+mj-ea"/>
-                <a:cs typeface="+mj-cs"/>
+                <a:latin typeface="+mn-lt"/>
+                <a:ea typeface="+mn-ea"/>
+                <a:cs typeface="+mn-cs"/>
                 <a:sym typeface="Helvetica Neue"/>
               </a:defRPr>
             </a:pPr>
@@ -8446,9 +8461,9 @@
                 <a:solidFill>
                   <a:srgbClr val="000000"/>
                 </a:solidFill>
-                <a:latin typeface="+mj-lt"/>
-                <a:ea typeface="+mj-ea"/>
-                <a:cs typeface="+mj-cs"/>
+                <a:latin typeface="+mn-lt"/>
+                <a:ea typeface="+mn-ea"/>
+                <a:cs typeface="+mn-cs"/>
                 <a:sym typeface="Helvetica Neue"/>
               </a:defRPr>
             </a:pPr>
@@ -8495,7 +8510,7 @@
         <p:spPr>
           <a:xfrm>
             <a:off x="1206359" y="1079639"/>
-            <a:ext cx="21970442" cy="1432443"/>
+            <a:ext cx="21970442" cy="1432444"/>
           </a:xfrm>
           <a:prstGeom prst="rect">
             <a:avLst/>
@@ -8544,9 +8559,9 @@
                 <a:spcPts val="1400"/>
               </a:spcBef>
               <a:defRPr b="1" sz="5500">
-                <a:latin typeface="+mj-lt"/>
-                <a:ea typeface="+mj-ea"/>
-                <a:cs typeface="+mj-cs"/>
+                <a:latin typeface="+mn-lt"/>
+                <a:ea typeface="+mn-ea"/>
+                <a:cs typeface="+mn-cs"/>
                 <a:sym typeface="Helvetica Neue"/>
               </a:defRPr>
             </a:lvl1pPr>
@@ -8597,7 +8612,7 @@
         <p:spPr>
           <a:xfrm>
             <a:off x="11036520" y="9598320"/>
-            <a:ext cx="2183042" cy="1171442"/>
+            <a:ext cx="2183043" cy="1171443"/>
           </a:xfrm>
           <a:prstGeom prst="rect">
             <a:avLst/>
@@ -8633,10 +8648,10 @@
         </p:nvGrpSpPr>
         <p:grpSpPr>
           <a:xfrm>
-            <a:off x="11142359" y="9683639"/>
-            <a:ext cx="1971004" cy="1000801"/>
-            <a:chOff x="0" y="0"/>
-            <a:chExt cx="1971002" cy="1000800"/>
+            <a:off x="11142357" y="9683638"/>
+            <a:ext cx="1971006" cy="1000804"/>
+            <a:chOff x="-1" y="-1"/>
+            <a:chExt cx="1971005" cy="1000803"/>
           </a:xfrm>
         </p:grpSpPr>
         <p:sp>
@@ -8647,8 +8662,8 @@
           </p:nvSpPr>
           <p:spPr>
             <a:xfrm>
-              <a:off x="-1" y="-1"/>
-              <a:ext cx="1971004" cy="1000802"/>
+              <a:off x="-2" y="-2"/>
+              <a:ext cx="1971007" cy="1000805"/>
             </a:xfrm>
             <a:prstGeom prst="rect">
               <a:avLst/>
@@ -8690,8 +8705,8 @@
           </p:nvSpPr>
           <p:spPr>
             <a:xfrm>
-              <a:off x="-1" y="241178"/>
-              <a:ext cx="1971004" cy="518444"/>
+              <a:off x="-2" y="241178"/>
+              <a:ext cx="1971007" cy="518444"/>
             </a:xfrm>
             <a:prstGeom prst="rect">
               <a:avLst/>
@@ -8742,10 +8757,10 @@
         </p:nvGrpSpPr>
         <p:grpSpPr>
           <a:xfrm>
-            <a:off x="11142359" y="9683639"/>
-            <a:ext cx="1971004" cy="1000801"/>
-            <a:chOff x="0" y="0"/>
-            <a:chExt cx="1971002" cy="1000800"/>
+            <a:off x="11142357" y="9683638"/>
+            <a:ext cx="1971006" cy="1000804"/>
+            <a:chOff x="-1" y="-1"/>
+            <a:chExt cx="1971005" cy="1000803"/>
           </a:xfrm>
         </p:grpSpPr>
         <p:sp>
@@ -8756,8 +8771,8 @@
           </p:nvSpPr>
           <p:spPr>
             <a:xfrm>
-              <a:off x="-1" y="-1"/>
-              <a:ext cx="1971004" cy="1000802"/>
+              <a:off x="-2" y="-2"/>
+              <a:ext cx="1971007" cy="1000805"/>
             </a:xfrm>
             <a:prstGeom prst="rect">
               <a:avLst/>
@@ -8799,8 +8814,8 @@
           </p:nvSpPr>
           <p:spPr>
             <a:xfrm>
-              <a:off x="-1" y="240049"/>
-              <a:ext cx="1971004" cy="520701"/>
+              <a:off x="-2" y="240049"/>
+              <a:ext cx="1971007" cy="520701"/>
             </a:xfrm>
             <a:prstGeom prst="rect">
               <a:avLst/>
@@ -9012,8 +9027,8 @@
     </p:tnLst>
     <p:bldLst>
       <p:bldP build="whole" bldLvl="1" animBg="1" rev="0" advAuto="0" spid="180" grpId="3"/>
+      <p:bldP build="whole" bldLvl="1" animBg="1" rev="0" advAuto="0" spid="174" grpId="1"/>
       <p:bldP build="whole" bldLvl="1" animBg="1" rev="0" advAuto="0" spid="177" grpId="2"/>
-      <p:bldP build="whole" bldLvl="1" animBg="1" rev="0" advAuto="0" spid="174" grpId="1"/>
     </p:bldLst>
   </p:timing>
 </p:sld>
@@ -9047,7 +9062,7 @@
         <p:spPr>
           <a:xfrm>
             <a:off x="1206359" y="1079639"/>
-            <a:ext cx="21970442" cy="1432443"/>
+            <a:ext cx="21970442" cy="1432444"/>
           </a:xfrm>
           <a:prstGeom prst="rect">
             <a:avLst/>
@@ -9096,9 +9111,9 @@
                 <a:spcPts val="1400"/>
               </a:spcBef>
               <a:defRPr b="1" sz="5500">
-                <a:latin typeface="+mj-lt"/>
-                <a:ea typeface="+mj-ea"/>
-                <a:cs typeface="+mj-cs"/>
+                <a:latin typeface="+mn-lt"/>
+                <a:ea typeface="+mn-ea"/>
+                <a:cs typeface="+mn-cs"/>
                 <a:sym typeface="Helvetica Neue"/>
               </a:defRPr>
             </a:lvl1pPr>
@@ -9148,10 +9163,10 @@
         </p:nvGrpSpPr>
         <p:grpSpPr>
           <a:xfrm>
-            <a:off x="6752879" y="9701279"/>
-            <a:ext cx="1971004" cy="1000801"/>
-            <a:chOff x="0" y="0"/>
-            <a:chExt cx="1971002" cy="1000800"/>
+            <a:off x="6752878" y="9701278"/>
+            <a:ext cx="1971006" cy="1000804"/>
+            <a:chOff x="-1" y="-1"/>
+            <a:chExt cx="1971005" cy="1000803"/>
           </a:xfrm>
         </p:grpSpPr>
         <p:sp>
@@ -9162,8 +9177,8 @@
           </p:nvSpPr>
           <p:spPr>
             <a:xfrm>
-              <a:off x="-1" y="-1"/>
-              <a:ext cx="1971004" cy="1000802"/>
+              <a:off x="-2" y="-2"/>
+              <a:ext cx="1971007" cy="1000805"/>
             </a:xfrm>
             <a:prstGeom prst="rect">
               <a:avLst/>
@@ -9205,8 +9220,8 @@
           </p:nvSpPr>
           <p:spPr>
             <a:xfrm>
-              <a:off x="-1" y="241178"/>
-              <a:ext cx="1971004" cy="518444"/>
+              <a:off x="-2" y="241178"/>
+              <a:ext cx="1971007" cy="518444"/>
             </a:xfrm>
             <a:prstGeom prst="rect">
               <a:avLst/>
@@ -9257,10 +9272,10 @@
         </p:nvGrpSpPr>
         <p:grpSpPr>
           <a:xfrm>
-            <a:off x="6752879" y="9701279"/>
-            <a:ext cx="1971004" cy="1000801"/>
-            <a:chOff x="0" y="0"/>
-            <a:chExt cx="1971002" cy="1000800"/>
+            <a:off x="6752878" y="9701278"/>
+            <a:ext cx="1971006" cy="1000804"/>
+            <a:chOff x="-1" y="-1"/>
+            <a:chExt cx="1971005" cy="1000803"/>
           </a:xfrm>
         </p:grpSpPr>
         <p:sp>
@@ -9271,8 +9286,8 @@
           </p:nvSpPr>
           <p:spPr>
             <a:xfrm>
-              <a:off x="-1" y="-1"/>
-              <a:ext cx="1971004" cy="1000802"/>
+              <a:off x="-2" y="-2"/>
+              <a:ext cx="1971007" cy="1000805"/>
             </a:xfrm>
             <a:prstGeom prst="rect">
               <a:avLst/>
@@ -9314,8 +9329,8 @@
           </p:nvSpPr>
           <p:spPr>
             <a:xfrm>
-              <a:off x="-1" y="240049"/>
-              <a:ext cx="1971004" cy="520701"/>
+              <a:off x="-2" y="240049"/>
+              <a:ext cx="1971007" cy="520701"/>
             </a:xfrm>
             <a:prstGeom prst="rect">
               <a:avLst/>
@@ -9366,10 +9381,10 @@
         </p:nvGrpSpPr>
         <p:grpSpPr>
           <a:xfrm>
-            <a:off x="603000" y="11100878"/>
-            <a:ext cx="5661001" cy="1585243"/>
+            <a:off x="602999" y="11100877"/>
+            <a:ext cx="5661004" cy="1585244"/>
             <a:chOff x="0" y="0"/>
-            <a:chExt cx="5661000" cy="1585242"/>
+            <a:chExt cx="5661002" cy="1585242"/>
           </a:xfrm>
         </p:grpSpPr>
         <p:sp>
@@ -9380,8 +9395,8 @@
           </p:nvSpPr>
           <p:spPr>
             <a:xfrm>
-              <a:off x="0" y="157761"/>
-              <a:ext cx="5661001" cy="1269723"/>
+              <a:off x="-1" y="157761"/>
+              <a:ext cx="5661003" cy="1269724"/>
             </a:xfrm>
             <a:prstGeom prst="rect">
               <a:avLst/>
@@ -9423,8 +9438,8 @@
           </p:nvSpPr>
           <p:spPr>
             <a:xfrm>
-              <a:off x="0" y="-1"/>
-              <a:ext cx="5661001" cy="1585244"/>
+              <a:off x="-1" y="-1"/>
+              <a:ext cx="5661003" cy="1585243"/>
             </a:xfrm>
             <a:prstGeom prst="rect">
               <a:avLst/>
@@ -9475,10 +9490,10 @@
         </p:nvGrpSpPr>
         <p:grpSpPr>
           <a:xfrm>
-            <a:off x="6695998" y="11258639"/>
-            <a:ext cx="2664004" cy="1269723"/>
+            <a:off x="6695997" y="11258639"/>
+            <a:ext cx="2664007" cy="1269725"/>
             <a:chOff x="0" y="0"/>
-            <a:chExt cx="2664002" cy="1269722"/>
+            <a:chExt cx="2664005" cy="1269723"/>
           </a:xfrm>
         </p:grpSpPr>
         <p:sp>
@@ -9490,7 +9505,7 @@
           <p:spPr>
             <a:xfrm>
               <a:off x="-1" y="0"/>
-              <a:ext cx="2664004" cy="1269723"/>
+              <a:ext cx="2664007" cy="1269724"/>
             </a:xfrm>
             <a:prstGeom prst="rect">
               <a:avLst/>
@@ -9536,7 +9551,7 @@
           <p:spPr>
             <a:xfrm>
               <a:off x="12699" y="375638"/>
-              <a:ext cx="2638604" cy="518444"/>
+              <a:ext cx="2638607" cy="518444"/>
             </a:xfrm>
             <a:prstGeom prst="rect">
               <a:avLst/>
@@ -9587,10 +9602,10 @@
         </p:nvGrpSpPr>
         <p:grpSpPr>
           <a:xfrm>
-            <a:off x="12023999" y="11258639"/>
-            <a:ext cx="2520004" cy="1269723"/>
-            <a:chOff x="0" y="0"/>
-            <a:chExt cx="2520002" cy="1269722"/>
+            <a:off x="12023997" y="11258639"/>
+            <a:ext cx="2520006" cy="1269725"/>
+            <a:chOff x="-1" y="0"/>
+            <a:chExt cx="2520005" cy="1269723"/>
           </a:xfrm>
         </p:grpSpPr>
         <p:sp>
@@ -9601,8 +9616,8 @@
           </p:nvSpPr>
           <p:spPr>
             <a:xfrm>
-              <a:off x="-1" y="0"/>
-              <a:ext cx="2520004" cy="1269723"/>
+              <a:off x="-2" y="0"/>
+              <a:ext cx="2520007" cy="1269724"/>
             </a:xfrm>
             <a:prstGeom prst="rect">
               <a:avLst/>
@@ -9647,8 +9662,8 @@
           </p:nvSpPr>
           <p:spPr>
             <a:xfrm>
-              <a:off x="12699" y="108938"/>
-              <a:ext cx="2494604" cy="1051843"/>
+              <a:off x="12698" y="108938"/>
+              <a:ext cx="2494607" cy="1051843"/>
             </a:xfrm>
             <a:prstGeom prst="rect">
               <a:avLst/>
@@ -9700,7 +9715,7 @@
         <p:spPr>
           <a:xfrm flipV="1">
             <a:off x="7698960" y="10650959"/>
-            <a:ext cx="2" cy="593642"/>
+            <a:ext cx="3" cy="593643"/>
           </a:xfrm>
           <a:prstGeom prst="line">
             <a:avLst/>
@@ -9729,7 +9744,7 @@
         <p:spPr>
           <a:xfrm flipH="1" flipV="1">
             <a:off x="9889200" y="10630079"/>
-            <a:ext cx="2134802" cy="1105921"/>
+            <a:ext cx="2134803" cy="1105921"/>
           </a:xfrm>
           <a:prstGeom prst="line">
             <a:avLst/>
@@ -9758,7 +9773,7 @@
         <p:spPr>
           <a:xfrm flipV="1">
             <a:off x="14544000" y="10618560"/>
-            <a:ext cx="1919522" cy="1261442"/>
+            <a:ext cx="1919523" cy="1261443"/>
           </a:xfrm>
           <a:prstGeom prst="line">
             <a:avLst/>
@@ -9787,7 +9802,7 @@
         <p:spPr>
           <a:xfrm flipV="1">
             <a:off x="13663800" y="10633319"/>
-            <a:ext cx="619922" cy="619562"/>
+            <a:ext cx="619923" cy="619563"/>
           </a:xfrm>
           <a:prstGeom prst="line">
             <a:avLst/>
@@ -9816,7 +9831,7 @@
         <p:spPr>
           <a:xfrm flipH="1" flipV="1">
             <a:off x="12160800" y="10629358"/>
-            <a:ext cx="627842" cy="627842"/>
+            <a:ext cx="627843" cy="627843"/>
           </a:xfrm>
           <a:prstGeom prst="line">
             <a:avLst/>
@@ -9845,7 +9860,7 @@
         <p:spPr>
           <a:xfrm>
             <a:off x="6646680" y="9615960"/>
-            <a:ext cx="2183042" cy="1171442"/>
+            <a:ext cx="2183043" cy="1171443"/>
           </a:xfrm>
           <a:prstGeom prst="rect">
             <a:avLst/>
@@ -10042,8 +10057,8 @@
     </p:tnLst>
     <p:bldLst>
       <p:bldP build="whole" bldLvl="1" animBg="1" rev="0" advAuto="0" spid="187" grpId="2"/>
+      <p:bldP build="whole" bldLvl="1" animBg="1" rev="0" advAuto="0" spid="205" grpId="1"/>
       <p:bldP build="whole" bldLvl="1" animBg="1" rev="0" advAuto="0" spid="190" grpId="3"/>
-      <p:bldP build="whole" bldLvl="1" animBg="1" rev="0" advAuto="0" spid="205" grpId="1"/>
     </p:bldLst>
   </p:timing>
 </p:sld>
@@ -10077,7 +10092,7 @@
         <p:spPr>
           <a:xfrm>
             <a:off x="1206359" y="1079639"/>
-            <a:ext cx="21970442" cy="1432443"/>
+            <a:ext cx="21970442" cy="1432444"/>
           </a:xfrm>
           <a:prstGeom prst="rect">
             <a:avLst/>
@@ -10126,9 +10141,9 @@
                 <a:spcPts val="1400"/>
               </a:spcBef>
               <a:defRPr b="1" sz="5500">
-                <a:latin typeface="+mj-lt"/>
-                <a:ea typeface="+mj-ea"/>
-                <a:cs typeface="+mj-cs"/>
+                <a:latin typeface="+mn-lt"/>
+                <a:ea typeface="+mn-ea"/>
+                <a:cs typeface="+mn-cs"/>
                 <a:sym typeface="Helvetica Neue"/>
               </a:defRPr>
             </a:lvl1pPr>
@@ -10187,9 +10202,9 @@
                 <a:solidFill>
                   <a:srgbClr val="000000"/>
                 </a:solidFill>
-                <a:latin typeface="+mj-lt"/>
-                <a:ea typeface="+mj-ea"/>
-                <a:cs typeface="+mj-cs"/>
+                <a:latin typeface="+mn-lt"/>
+                <a:ea typeface="+mn-ea"/>
+                <a:cs typeface="+mn-cs"/>
                 <a:sym typeface="Helvetica Neue"/>
               </a:defRPr>
             </a:pPr>
@@ -10221,9 +10236,9 @@
                 <a:solidFill>
                   <a:srgbClr val="000000"/>
                 </a:solidFill>
-                <a:latin typeface="+mj-lt"/>
-                <a:ea typeface="+mj-ea"/>
-                <a:cs typeface="+mj-cs"/>
+                <a:latin typeface="+mn-lt"/>
+                <a:ea typeface="+mn-ea"/>
+                <a:cs typeface="+mn-cs"/>
                 <a:sym typeface="Helvetica Neue"/>
               </a:defRPr>
             </a:pPr>
@@ -10255,9 +10270,9 @@
                 <a:solidFill>
                   <a:srgbClr val="000000"/>
                 </a:solidFill>
-                <a:latin typeface="+mj-lt"/>
-                <a:ea typeface="+mj-ea"/>
-                <a:cs typeface="+mj-cs"/>
+                <a:latin typeface="+mn-lt"/>
+                <a:ea typeface="+mn-ea"/>
+                <a:cs typeface="+mn-cs"/>
                 <a:sym typeface="Helvetica Neue"/>
               </a:defRPr>
             </a:pPr>
@@ -10304,7 +10319,7 @@
         <p:spPr>
           <a:xfrm>
             <a:off x="1206359" y="1079639"/>
-            <a:ext cx="21970442" cy="1432443"/>
+            <a:ext cx="21970442" cy="1432444"/>
           </a:xfrm>
           <a:prstGeom prst="rect">
             <a:avLst/>
@@ -10347,9 +10362,9 @@
           <a:lstStyle>
             <a:lvl1pPr defTabSz="825480">
               <a:defRPr b="1" sz="5500">
-                <a:latin typeface="+mj-lt"/>
-                <a:ea typeface="+mj-ea"/>
-                <a:cs typeface="+mj-cs"/>
+                <a:latin typeface="+mn-lt"/>
+                <a:ea typeface="+mn-ea"/>
+                <a:cs typeface="+mn-cs"/>
                 <a:sym typeface="Helvetica Neue"/>
               </a:defRPr>
             </a:lvl1pPr>
@@ -10408,9 +10423,9 @@
                 <a:solidFill>
                   <a:srgbClr val="000000"/>
                 </a:solidFill>
-                <a:latin typeface="+mj-lt"/>
-                <a:ea typeface="+mj-ea"/>
-                <a:cs typeface="+mj-cs"/>
+                <a:latin typeface="+mn-lt"/>
+                <a:ea typeface="+mn-ea"/>
+                <a:cs typeface="+mn-cs"/>
                 <a:sym typeface="Helvetica Neue"/>
               </a:defRPr>
             </a:pPr>
@@ -10442,9 +10457,9 @@
                 <a:solidFill>
                   <a:srgbClr val="000000"/>
                 </a:solidFill>
-                <a:latin typeface="+mj-lt"/>
-                <a:ea typeface="+mj-ea"/>
-                <a:cs typeface="+mj-cs"/>
+                <a:latin typeface="+mn-lt"/>
+                <a:ea typeface="+mn-ea"/>
+                <a:cs typeface="+mn-cs"/>
                 <a:sym typeface="Helvetica Neue"/>
               </a:defRPr>
             </a:pPr>
@@ -10476,9 +10491,9 @@
                 <a:solidFill>
                   <a:srgbClr val="000000"/>
                 </a:solidFill>
-                <a:latin typeface="+mj-lt"/>
-                <a:ea typeface="+mj-ea"/>
-                <a:cs typeface="+mj-cs"/>
+                <a:latin typeface="+mn-lt"/>
+                <a:ea typeface="+mn-ea"/>
+                <a:cs typeface="+mn-cs"/>
                 <a:sym typeface="Helvetica Neue"/>
               </a:defRPr>
             </a:pPr>
@@ -10493,7 +10508,7 @@
             </a:endParaRPr>
           </a:p>
           <a:p>
-            <a:pPr lvl="3" marL="2243159" indent="-560879" defTabSz="2243159">
+            <a:pPr lvl="3" marL="2243159" indent="-560878" defTabSz="2243159">
               <a:lnSpc>
                 <a:spcPct val="90000"/>
               </a:lnSpc>
@@ -10510,9 +10525,9 @@
                 <a:solidFill>
                   <a:srgbClr val="000000"/>
                 </a:solidFill>
-                <a:latin typeface="+mj-lt"/>
-                <a:ea typeface="+mj-ea"/>
-                <a:cs typeface="+mj-cs"/>
+                <a:latin typeface="+mn-lt"/>
+                <a:ea typeface="+mn-ea"/>
+                <a:cs typeface="+mn-cs"/>
                 <a:sym typeface="Helvetica Neue"/>
               </a:defRPr>
             </a:pPr>
@@ -10527,7 +10542,7 @@
             </a:endParaRPr>
           </a:p>
           <a:p>
-            <a:pPr lvl="3" marL="2243159" indent="-560879" defTabSz="2243159">
+            <a:pPr lvl="3" marL="2243159" indent="-560878" defTabSz="2243159">
               <a:lnSpc>
                 <a:spcPct val="90000"/>
               </a:lnSpc>
@@ -10544,9 +10559,9 @@
                 <a:solidFill>
                   <a:srgbClr val="000000"/>
                 </a:solidFill>
-                <a:latin typeface="+mj-lt"/>
-                <a:ea typeface="+mj-ea"/>
-                <a:cs typeface="+mj-cs"/>
+                <a:latin typeface="+mn-lt"/>
+                <a:ea typeface="+mn-ea"/>
+                <a:cs typeface="+mn-cs"/>
                 <a:sym typeface="Helvetica Neue"/>
               </a:defRPr>
             </a:pPr>
@@ -10561,7 +10576,7 @@
             </a:endParaRPr>
           </a:p>
           <a:p>
-            <a:pPr lvl="3" marL="2243159" indent="-560879" defTabSz="2243159">
+            <a:pPr lvl="3" marL="2243159" indent="-560878" defTabSz="2243159">
               <a:lnSpc>
                 <a:spcPct val="90000"/>
               </a:lnSpc>
@@ -10578,9 +10593,9 @@
                 <a:solidFill>
                   <a:srgbClr val="000000"/>
                 </a:solidFill>
-                <a:latin typeface="+mj-lt"/>
-                <a:ea typeface="+mj-ea"/>
-                <a:cs typeface="+mj-cs"/>
+                <a:latin typeface="+mn-lt"/>
+                <a:ea typeface="+mn-ea"/>
+                <a:cs typeface="+mn-cs"/>
                 <a:sym typeface="Helvetica Neue"/>
               </a:defRPr>
             </a:pPr>
@@ -10627,7 +10642,7 @@
         <p:spPr>
           <a:xfrm>
             <a:off x="1206359" y="1079639"/>
-            <a:ext cx="21970442" cy="1432443"/>
+            <a:ext cx="21970442" cy="1432444"/>
           </a:xfrm>
           <a:prstGeom prst="rect">
             <a:avLst/>
@@ -10670,9 +10685,9 @@
           <a:lstStyle>
             <a:lvl1pPr defTabSz="825480">
               <a:defRPr b="1" sz="5500">
-                <a:latin typeface="+mj-lt"/>
-                <a:ea typeface="+mj-ea"/>
-                <a:cs typeface="+mj-cs"/>
+                <a:latin typeface="+mn-lt"/>
+                <a:ea typeface="+mn-ea"/>
+                <a:cs typeface="+mn-cs"/>
                 <a:sym typeface="Helvetica Neue"/>
               </a:defRPr>
             </a:lvl1pPr>
@@ -10731,9 +10746,9 @@
                 <a:solidFill>
                   <a:srgbClr val="000000"/>
                 </a:solidFill>
-                <a:latin typeface="+mj-lt"/>
-                <a:ea typeface="+mj-ea"/>
-                <a:cs typeface="+mj-cs"/>
+                <a:latin typeface="+mn-lt"/>
+                <a:ea typeface="+mn-ea"/>
+                <a:cs typeface="+mn-cs"/>
                 <a:sym typeface="Helvetica Neue"/>
               </a:defRPr>
             </a:pPr>
@@ -10765,9 +10780,9 @@
                 <a:solidFill>
                   <a:srgbClr val="000000"/>
                 </a:solidFill>
-                <a:latin typeface="+mj-lt"/>
-                <a:ea typeface="+mj-ea"/>
-                <a:cs typeface="+mj-cs"/>
+                <a:latin typeface="+mn-lt"/>
+                <a:ea typeface="+mn-ea"/>
+                <a:cs typeface="+mn-cs"/>
                 <a:sym typeface="Helvetica Neue"/>
               </a:defRPr>
             </a:pPr>
@@ -10799,14 +10814,42 @@
                 <a:solidFill>
                   <a:srgbClr val="000000"/>
                 </a:solidFill>
-                <a:latin typeface="+mj-lt"/>
-                <a:ea typeface="+mj-ea"/>
-                <a:cs typeface="+mj-cs"/>
+                <a:latin typeface="+mn-lt"/>
+                <a:ea typeface="+mn-ea"/>
+                <a:cs typeface="+mn-cs"/>
                 <a:sym typeface="Helvetica Neue"/>
               </a:defRPr>
             </a:pPr>
             <a:r>
               <a:t>K = number of negative samples per test project</a:t>
+            </a:r>
+          </a:p>
+          <a:p>
+            <a:pPr marL="560880" indent="-560880" defTabSz="2243159">
+              <a:lnSpc>
+                <a:spcPct val="90000"/>
+              </a:lnSpc>
+              <a:spcBef>
+                <a:spcPts val="4000"/>
+              </a:spcBef>
+              <a:buClr>
+                <a:srgbClr val="000000"/>
+              </a:buClr>
+              <a:buSzPct val="123000"/>
+              <a:buFont typeface="Symbol"/>
+              <a:buChar char="·"/>
+              <a:defRPr sz="4400">
+                <a:solidFill>
+                  <a:srgbClr val="000000"/>
+                </a:solidFill>
+                <a:latin typeface="+mn-lt"/>
+                <a:ea typeface="+mn-ea"/>
+                <a:cs typeface="+mn-cs"/>
+                <a:sym typeface="Helvetica Neue"/>
+              </a:defRPr>
+            </a:pPr>
+            <a:r>
+              <a:t>200 negative samples per pool</a:t>
             </a:r>
           </a:p>
         </p:txBody>
@@ -10830,7 +10873,7 @@
         <p:spPr>
           <a:xfrm>
             <a:off x="9729358" y="2657160"/>
-            <a:ext cx="13191123" cy="8401320"/>
+            <a:ext cx="13191124" cy="8401320"/>
           </a:xfrm>
           <a:prstGeom prst="rect">
             <a:avLst/>
@@ -10892,14 +10935,14 @@
     </a:clrScheme>
     <a:fontScheme name="21_BasicWhite">
       <a:majorFont>
+        <a:latin typeface="Helvetica"/>
+        <a:ea typeface="Helvetica"/>
+        <a:cs typeface="Helvetica"/>
+      </a:majorFont>
+      <a:minorFont>
         <a:latin typeface="Helvetica Neue"/>
         <a:ea typeface="Helvetica Neue"/>
         <a:cs typeface="Helvetica Neue"/>
-      </a:majorFont>
-      <a:minorFont>
-        <a:latin typeface="Helvetica"/>
-        <a:ea typeface="Helvetica"/>
-        <a:cs typeface="Helvetica"/>
       </a:minorFont>
     </a:fontScheme>
     <a:fmtScheme name="21_BasicWhite">
@@ -11080,9 +11123,9 @@
             </a:solidFill>
             <a:effectLst/>
             <a:uFillTx/>
-            <a:latin typeface="+mn-lt"/>
-            <a:ea typeface="+mn-ea"/>
-            <a:cs typeface="+mn-cs"/>
+            <a:latin typeface="+mj-lt"/>
+            <a:ea typeface="+mj-ea"/>
+            <a:cs typeface="+mj-cs"/>
             <a:sym typeface="Helvetica"/>
           </a:defRPr>
         </a:defPPr>
@@ -11651,9 +11694,9 @@
             </a:solidFill>
             <a:effectLst/>
             <a:uFillTx/>
-            <a:latin typeface="+mn-lt"/>
-            <a:ea typeface="+mn-ea"/>
-            <a:cs typeface="+mn-cs"/>
+            <a:latin typeface="+mj-lt"/>
+            <a:ea typeface="+mj-ea"/>
+            <a:cs typeface="+mj-cs"/>
             <a:sym typeface="Helvetica"/>
           </a:defRPr>
         </a:defPPr>
@@ -11946,14 +11989,14 @@
     </a:clrScheme>
     <a:fontScheme name="21_BasicWhite">
       <a:majorFont>
+        <a:latin typeface="Helvetica"/>
+        <a:ea typeface="Helvetica"/>
+        <a:cs typeface="Helvetica"/>
+      </a:majorFont>
+      <a:minorFont>
         <a:latin typeface="Helvetica Neue"/>
         <a:ea typeface="Helvetica Neue"/>
         <a:cs typeface="Helvetica Neue"/>
-      </a:majorFont>
-      <a:minorFont>
-        <a:latin typeface="Helvetica"/>
-        <a:ea typeface="Helvetica"/>
-        <a:cs typeface="Helvetica"/>
       </a:minorFont>
     </a:fontScheme>
     <a:fmtScheme name="21_BasicWhite">
@@ -12134,9 +12177,9 @@
             </a:solidFill>
             <a:effectLst/>
             <a:uFillTx/>
-            <a:latin typeface="+mn-lt"/>
-            <a:ea typeface="+mn-ea"/>
-            <a:cs typeface="+mn-cs"/>
+            <a:latin typeface="+mj-lt"/>
+            <a:ea typeface="+mj-ea"/>
+            <a:cs typeface="+mj-cs"/>
             <a:sym typeface="Helvetica"/>
           </a:defRPr>
         </a:defPPr>
@@ -12705,9 +12748,9 @@
             </a:solidFill>
             <a:effectLst/>
             <a:uFillTx/>
-            <a:latin typeface="+mn-lt"/>
-            <a:ea typeface="+mn-ea"/>
-            <a:cs typeface="+mn-cs"/>
+            <a:latin typeface="+mj-lt"/>
+            <a:ea typeface="+mj-ea"/>
+            <a:cs typeface="+mj-cs"/>
             <a:sym typeface="Helvetica"/>
           </a:defRPr>
         </a:defPPr>

</xml_diff>

<commit_message>
Slides: add alternative masking slide & replace formulas with latex rendering
</commit_message>
<xml_diff>
--- a/presentation/final_presentation.pptx
+++ b/presentation/final_presentation.pptx
@@ -23,6 +23,7 @@
     <p:sldId id="268" r:id="rId21"/>
     <p:sldId id="269" r:id="rId22"/>
     <p:sldId id="270" r:id="rId23"/>
+    <p:sldId id="271" r:id="rId24"/>
   </p:sldIdLst>
   <p:sldSz cx="24384000" cy="13716000"/>
   <p:notesSz cx="6858000" cy="9144000"/>
@@ -3496,7 +3497,7 @@
       </p:grpSpPr>
       <p:sp>
         <p:nvSpPr>
-          <p:cNvPr id="220" name="PlaceHolder 1"/>
+          <p:cNvPr id="219" name="PlaceHolder 1"/>
           <p:cNvSpPr txBox="1"/>
           <p:nvPr>
             <p:ph type="title"/>
@@ -3528,7 +3529,7 @@
       </p:sp>
       <p:sp>
         <p:nvSpPr>
-          <p:cNvPr id="221" name="PlaceHolder 2"/>
+          <p:cNvPr id="220" name="PlaceHolder 2"/>
           <p:cNvSpPr txBox="1"/>
           <p:nvPr>
             <p:ph type="body" sz="quarter" idx="1"/>
@@ -3565,7 +3566,7 @@
       </p:sp>
       <p:pic>
         <p:nvPicPr>
-          <p:cNvPr id="222" name="Bild" descr="Bild"/>
+          <p:cNvPr id="221" name="Bild" descr="Bild"/>
           <p:cNvPicPr>
             <a:picLocks noChangeAspect="1"/>
           </p:cNvPicPr>
@@ -3594,7 +3595,7 @@
       </p:pic>
       <p:grpSp>
         <p:nvGrpSpPr>
-          <p:cNvPr id="225" name="Very Similar Embedding:…"/>
+          <p:cNvPr id="224" name="Very Similar Embedding:…"/>
           <p:cNvGrpSpPr/>
           <p:nvPr/>
         </p:nvGrpSpPr>
@@ -3608,7 +3609,7 @@
         </p:grpSpPr>
         <p:sp>
           <p:nvSpPr>
-            <p:cNvPr id="223" name="Rechteck"/>
+            <p:cNvPr id="222" name="Rechteck"/>
             <p:cNvSpPr/>
             <p:nvPr/>
           </p:nvSpPr>
@@ -3651,7 +3652,7 @@
         </p:sp>
         <p:sp>
           <p:nvSpPr>
-            <p:cNvPr id="224" name="Very Similar Embedding:…"/>
+            <p:cNvPr id="223" name="Very Similar Embedding:…"/>
             <p:cNvSpPr txBox="1"/>
             <p:nvPr/>
           </p:nvSpPr>
@@ -3753,7 +3754,7 @@
                                       <p:cBhvr>
                                         <p:cTn id="6" fill="hold"/>
                                         <p:tgtEl>
-                                          <p:spTgt spid="225"/>
+                                          <p:spTgt spid="224"/>
                                         </p:tgtEl>
                                         <p:attrNameLst>
                                           <p:attrName>style.visibility</p:attrName>
@@ -3794,7 +3795,7 @@
       </p:par>
     </p:tnLst>
     <p:bldLst>
-      <p:bldP build="whole" bldLvl="1" animBg="1" rev="0" advAuto="0" spid="225" grpId="1"/>
+      <p:bldP build="whole" bldLvl="1" animBg="1" rev="0" advAuto="0" spid="224" grpId="1"/>
     </p:bldLst>
   </p:timing>
 </p:sld>
@@ -3819,7 +3820,7 @@
       </p:grpSpPr>
       <p:sp>
         <p:nvSpPr>
-          <p:cNvPr id="227" name="PlaceHolder 1"/>
+          <p:cNvPr id="226" name="PlaceHolder 1"/>
           <p:cNvSpPr txBox="1"/>
           <p:nvPr>
             <p:ph type="title"/>
@@ -3851,7 +3852,7 @@
       </p:sp>
       <p:sp>
         <p:nvSpPr>
-          <p:cNvPr id="228" name="PlaceHolder 2"/>
+          <p:cNvPr id="227" name="PlaceHolder 2"/>
           <p:cNvSpPr txBox="1"/>
           <p:nvPr>
             <p:ph type="body" sz="quarter" idx="1"/>
@@ -3888,7 +3889,7 @@
       </p:sp>
       <p:pic>
         <p:nvPicPr>
-          <p:cNvPr id="229" name="Bild" descr="Bild"/>
+          <p:cNvPr id="228" name="Bild" descr="Bild"/>
           <p:cNvPicPr>
             <a:picLocks noChangeAspect="1"/>
           </p:cNvPicPr>
@@ -3917,7 +3918,7 @@
       </p:pic>
       <p:sp>
         <p:nvSpPr>
-          <p:cNvPr id="230" name="Linie"/>
+          <p:cNvPr id="229" name="Linie"/>
           <p:cNvSpPr/>
           <p:nvPr/>
         </p:nvSpPr>
@@ -3946,7 +3947,7 @@
       </p:sp>
       <p:sp>
         <p:nvSpPr>
-          <p:cNvPr id="231" name="Linie"/>
+          <p:cNvPr id="230" name="Linie"/>
           <p:cNvSpPr/>
           <p:nvPr/>
         </p:nvSpPr>
@@ -3975,7 +3976,7 @@
       </p:sp>
       <p:sp>
         <p:nvSpPr>
-          <p:cNvPr id="232" name="Slight differences in assembly"/>
+          <p:cNvPr id="231" name="Slight differences in assembly"/>
           <p:cNvSpPr txBox="1"/>
           <p:nvPr/>
         </p:nvSpPr>
@@ -4057,7 +4058,7 @@
                                       <p:cBhvr>
                                         <p:cTn id="6" fill="hold"/>
                                         <p:tgtEl>
-                                          <p:spTgt spid="232"/>
+                                          <p:spTgt spid="231"/>
                                         </p:tgtEl>
                                         <p:attrNameLst>
                                           <p:attrName>style.visibility</p:attrName>
@@ -4101,7 +4102,7 @@
                                       <p:cBhvr>
                                         <p:cTn id="10" fill="hold"/>
                                         <p:tgtEl>
-                                          <p:spTgt spid="230"/>
+                                          <p:spTgt spid="229"/>
                                         </p:tgtEl>
                                         <p:attrNameLst>
                                           <p:attrName>style.visibility</p:attrName>
@@ -4145,7 +4146,7 @@
                                       <p:cBhvr>
                                         <p:cTn id="14" fill="hold"/>
                                         <p:tgtEl>
-                                          <p:spTgt spid="231"/>
+                                          <p:spTgt spid="230"/>
                                         </p:tgtEl>
                                         <p:attrNameLst>
                                           <p:attrName>style.visibility</p:attrName>
@@ -4186,9 +4187,9 @@
       </p:par>
     </p:tnLst>
     <p:bldLst>
-      <p:bldP build="whole" bldLvl="1" animBg="1" rev="0" advAuto="0" spid="232" grpId="1"/>
-      <p:bldP build="whole" bldLvl="1" animBg="1" rev="0" advAuto="0" spid="230" grpId="2"/>
-      <p:bldP build="whole" bldLvl="1" animBg="1" rev="0" advAuto="0" spid="231" grpId="3"/>
+      <p:bldP build="whole" bldLvl="1" animBg="1" rev="0" advAuto="0" spid="229" grpId="2"/>
+      <p:bldP build="whole" bldLvl="1" animBg="1" rev="0" advAuto="0" spid="230" grpId="3"/>
+      <p:bldP build="whole" bldLvl="1" animBg="1" rev="0" advAuto="0" spid="231" grpId="1"/>
     </p:bldLst>
   </p:timing>
 </p:sld>
@@ -4213,7 +4214,7 @@
       </p:grpSpPr>
       <p:sp>
         <p:nvSpPr>
-          <p:cNvPr id="234" name="PlaceHolder 1"/>
+          <p:cNvPr id="233" name="PlaceHolder 1"/>
           <p:cNvSpPr txBox="1"/>
           <p:nvPr>
             <p:ph type="title"/>
@@ -4245,7 +4246,7 @@
       </p:sp>
       <p:sp>
         <p:nvSpPr>
-          <p:cNvPr id="235" name="PlaceHolder 2"/>
+          <p:cNvPr id="234" name="PlaceHolder 2"/>
           <p:cNvSpPr txBox="1"/>
           <p:nvPr>
             <p:ph type="body" sz="quarter" idx="1"/>
@@ -4285,7 +4286,7 @@
       </p:sp>
       <p:sp>
         <p:nvSpPr>
-          <p:cNvPr id="236" name="PlaceHolder 3"/>
+          <p:cNvPr id="235" name="PlaceHolder 3"/>
           <p:cNvSpPr txBox="1"/>
           <p:nvPr/>
         </p:nvSpPr>
@@ -4505,7 +4506,7 @@
       </p:grpSpPr>
       <p:sp>
         <p:nvSpPr>
-          <p:cNvPr id="238" name="PlaceHolder 1"/>
+          <p:cNvPr id="237" name="PlaceHolder 1"/>
           <p:cNvSpPr txBox="1"/>
           <p:nvPr>
             <p:ph type="title"/>
@@ -4537,7 +4538,7 @@
       </p:sp>
       <p:graphicFrame>
         <p:nvGraphicFramePr>
-          <p:cNvPr id="239" name="Tabelle"/>
+          <p:cNvPr id="238" name="Tabelle"/>
           <p:cNvGraphicFramePr/>
           <p:nvPr/>
         </p:nvGraphicFramePr>
@@ -5397,7 +5398,7 @@
       </p:grpSpPr>
       <p:sp>
         <p:nvSpPr>
-          <p:cNvPr id="241" name="PlaceHolder 1"/>
+          <p:cNvPr id="240" name="PlaceHolder 1"/>
           <p:cNvSpPr txBox="1"/>
           <p:nvPr>
             <p:ph type="title"/>
@@ -5429,7 +5430,7 @@
       </p:sp>
       <p:graphicFrame>
         <p:nvGraphicFramePr>
-          <p:cNvPr id="242" name="Tabelle"/>
+          <p:cNvPr id="241" name="Tabelle"/>
           <p:cNvGraphicFramePr/>
           <p:nvPr/>
         </p:nvGraphicFramePr>
@@ -5907,7 +5908,7 @@
                         </a:defRPr>
                       </a:pPr>
                       <a:r>
-                        <a:rPr sz="3200">
+                        <a:rPr b="1" sz="3200">
                           <a:sym typeface="Helvetica Neue"/>
                         </a:rPr>
                         <a:t>0.8886</a:t>
@@ -6356,169 +6357,6 @@
                         <a:rPr sz="3200">
                           <a:sym typeface="Helvetica Neue"/>
                         </a:rPr>
-                        <a:t>60/40</a:t>
-                      </a:r>
-                    </a:p>
-                  </a:txBody>
-                  <a:tcPr marL="50760" marR="50760" marT="50760" marB="50760" anchor="ctr" anchorCtr="0" horzOverflow="overflow">
-                    <a:lnL w="12240">
-                      <a:solidFill>
-                        <a:srgbClr val="000000"/>
-                      </a:solidFill>
-                    </a:lnL>
-                    <a:lnR w="12240">
-                      <a:solidFill>
-                        <a:srgbClr val="000000"/>
-                      </a:solidFill>
-                    </a:lnR>
-                    <a:lnT w="12240">
-                      <a:solidFill>
-                        <a:srgbClr val="000000"/>
-                      </a:solidFill>
-                    </a:lnT>
-                    <a:lnB w="12240">
-                      <a:solidFill>
-                        <a:srgbClr val="000000"/>
-                      </a:solidFill>
-                    </a:lnB>
-                    <a:noFill/>
-                  </a:tcPr>
-                </a:tc>
-                <a:tc>
-                  <a:txBody>
-                    <a:bodyPr/>
-                    <a:lstStyle/>
-                    <a:p>
-                      <a:pPr>
-                        <a:defRPr sz="3200">
-                          <a:solidFill>
-                            <a:srgbClr val="000000"/>
-                          </a:solidFill>
-                          <a:sym typeface="Helvetica Neue"/>
-                        </a:defRPr>
-                      </a:pPr>
-                    </a:p>
-                  </a:txBody>
-                  <a:tcPr marL="50760" marR="50760" marT="50760" marB="50760" anchor="ctr" anchorCtr="0" horzOverflow="overflow">
-                    <a:lnL w="12240">
-                      <a:solidFill>
-                        <a:srgbClr val="000000"/>
-                      </a:solidFill>
-                    </a:lnL>
-                    <a:lnR w="12240">
-                      <a:solidFill>
-                        <a:srgbClr val="000000"/>
-                      </a:solidFill>
-                    </a:lnR>
-                    <a:lnT w="12240">
-                      <a:solidFill>
-                        <a:srgbClr val="000000"/>
-                      </a:solidFill>
-                    </a:lnT>
-                    <a:lnB w="12240">
-                      <a:solidFill>
-                        <a:srgbClr val="000000"/>
-                      </a:solidFill>
-                    </a:lnB>
-                    <a:noFill/>
-                  </a:tcPr>
-                </a:tc>
-                <a:tc>
-                  <a:txBody>
-                    <a:bodyPr/>
-                    <a:lstStyle/>
-                    <a:p>
-                      <a:pPr>
-                        <a:defRPr sz="3200">
-                          <a:solidFill>
-                            <a:srgbClr val="000000"/>
-                          </a:solidFill>
-                          <a:sym typeface="Helvetica Neue"/>
-                        </a:defRPr>
-                      </a:pPr>
-                    </a:p>
-                  </a:txBody>
-                  <a:tcPr marL="50760" marR="50760" marT="50760" marB="50760" anchor="ctr" anchorCtr="0" horzOverflow="overflow">
-                    <a:lnL w="12240">
-                      <a:solidFill>
-                        <a:srgbClr val="000000"/>
-                      </a:solidFill>
-                    </a:lnL>
-                    <a:lnR w="12240">
-                      <a:solidFill>
-                        <a:srgbClr val="000000"/>
-                      </a:solidFill>
-                    </a:lnR>
-                    <a:lnT w="12240">
-                      <a:solidFill>
-                        <a:srgbClr val="000000"/>
-                      </a:solidFill>
-                    </a:lnT>
-                    <a:lnB w="12240">
-                      <a:solidFill>
-                        <a:srgbClr val="000000"/>
-                      </a:solidFill>
-                    </a:lnB>
-                    <a:noFill/>
-                  </a:tcPr>
-                </a:tc>
-                <a:tc>
-                  <a:txBody>
-                    <a:bodyPr/>
-                    <a:lstStyle/>
-                    <a:p>
-                      <a:pPr>
-                        <a:defRPr sz="3200">
-                          <a:solidFill>
-                            <a:srgbClr val="000000"/>
-                          </a:solidFill>
-                          <a:sym typeface="Helvetica Neue"/>
-                        </a:defRPr>
-                      </a:pPr>
-                    </a:p>
-                  </a:txBody>
-                  <a:tcPr marL="50760" marR="50760" marT="50760" marB="50760" anchor="ctr" anchorCtr="0" horzOverflow="overflow">
-                    <a:lnL w="12240">
-                      <a:solidFill>
-                        <a:srgbClr val="000000"/>
-                      </a:solidFill>
-                    </a:lnL>
-                    <a:lnR w="12240">
-                      <a:solidFill>
-                        <a:srgbClr val="000000"/>
-                      </a:solidFill>
-                    </a:lnR>
-                    <a:lnT w="12240">
-                      <a:solidFill>
-                        <a:srgbClr val="000000"/>
-                      </a:solidFill>
-                    </a:lnT>
-                    <a:lnB w="12240">
-                      <a:solidFill>
-                        <a:srgbClr val="000000"/>
-                      </a:solidFill>
-                    </a:lnB>
-                    <a:noFill/>
-                  </a:tcPr>
-                </a:tc>
-              </a:tr>
-              <a:tr h="1289160">
-                <a:tc>
-                  <a:txBody>
-                    <a:bodyPr/>
-                    <a:lstStyle/>
-                    <a:p>
-                      <a:pPr algn="ctr">
-                        <a:defRPr>
-                          <a:solidFill>
-                            <a:srgbClr val="000000"/>
-                          </a:solidFill>
-                        </a:defRPr>
-                      </a:pPr>
-                      <a:r>
-                        <a:rPr sz="3200">
-                          <a:sym typeface="Helvetica Neue"/>
-                        </a:rPr>
                         <a:t>20/80</a:t>
                       </a:r>
                     </a:p>
@@ -6604,7 +6442,7 @@
                         </a:defRPr>
                       </a:pPr>
                       <a:r>
-                        <a:rPr sz="3200">
+                        <a:rPr b="1" sz="3200">
                           <a:sym typeface="Helvetica Neue"/>
                         </a:rPr>
                         <a:t>0.8935</a:t>
@@ -6712,7 +6550,910 @@
       </p:grpSpPr>
       <p:sp>
         <p:nvSpPr>
-          <p:cNvPr id="244" name="PlaceHolder 1"/>
+          <p:cNvPr id="243" name="PlaceHolder 1"/>
+          <p:cNvSpPr txBox="1"/>
+          <p:nvPr>
+            <p:ph type="title"/>
+          </p:nvPr>
+        </p:nvSpPr>
+        <p:spPr>
+          <a:xfrm>
+            <a:off x="1206359" y="1079639"/>
+            <a:ext cx="21970443" cy="1432444"/>
+          </a:xfrm>
+          <a:prstGeom prst="rect">
+            <a:avLst/>
+          </a:prstGeom>
+        </p:spPr>
+        <p:txBody>
+          <a:bodyPr/>
+          <a:lstStyle>
+            <a:lvl1pPr>
+              <a:defRPr spc="-300"/>
+            </a:lvl1pPr>
+          </a:lstStyle>
+          <a:p>
+            <a:pPr/>
+            <a:r>
+              <a:t>Operand Normalized Masking </a:t>
+            </a:r>
+          </a:p>
+        </p:txBody>
+      </p:sp>
+      <p:pic>
+        <p:nvPicPr>
+          <p:cNvPr id="244" name="Bild" descr="Bild"/>
+          <p:cNvPicPr>
+            <a:picLocks noChangeAspect="1"/>
+          </p:cNvPicPr>
+          <p:nvPr/>
+        </p:nvPicPr>
+        <p:blipFill>
+          <a:blip r:embed="rId2">
+            <a:extLst/>
+          </a:blip>
+          <a:stretch>
+            <a:fillRect/>
+          </a:stretch>
+        </p:blipFill>
+        <p:spPr>
+          <a:xfrm>
+            <a:off x="4562514" y="3203343"/>
+            <a:ext cx="15128281" cy="6728041"/>
+          </a:xfrm>
+          <a:prstGeom prst="rect">
+            <a:avLst/>
+          </a:prstGeom>
+          <a:ln w="12700">
+            <a:miter lim="400000"/>
+          </a:ln>
+        </p:spPr>
+      </p:pic>
+      <p:grpSp>
+        <p:nvGrpSpPr>
+          <p:cNvPr id="247" name="&lt;mask&gt;"/>
+          <p:cNvGrpSpPr/>
+          <p:nvPr/>
+        </p:nvGrpSpPr>
+        <p:grpSpPr>
+          <a:xfrm>
+            <a:off x="6687593" y="8983141"/>
+            <a:ext cx="1971006" cy="1000804"/>
+            <a:chOff x="-1" y="-1"/>
+            <a:chExt cx="1971005" cy="1000803"/>
+          </a:xfrm>
+        </p:grpSpPr>
+        <p:sp>
+          <p:nvSpPr>
+            <p:cNvPr id="245" name="Rechteck"/>
+            <p:cNvSpPr/>
+            <p:nvPr/>
+          </p:nvSpPr>
+          <p:spPr>
+            <a:xfrm>
+              <a:off x="-2" y="-2"/>
+              <a:ext cx="1971007" cy="1000805"/>
+            </a:xfrm>
+            <a:prstGeom prst="rect">
+              <a:avLst/>
+            </a:prstGeom>
+            <a:solidFill>
+              <a:srgbClr val="FFFFFF"/>
+            </a:solidFill>
+            <a:ln w="12700" cap="flat">
+              <a:noFill/>
+              <a:miter lim="400000"/>
+            </a:ln>
+            <a:effectLst/>
+          </p:spPr>
+          <p:txBody>
+            <a:bodyPr wrap="square" lIns="0" tIns="0" rIns="0" bIns="0" numCol="1" anchor="ctr">
+              <a:noAutofit/>
+            </a:bodyPr>
+            <a:lstStyle/>
+            <a:p>
+              <a:pPr algn="ctr">
+                <a:defRPr sz="3600">
+                  <a:solidFill>
+                    <a:srgbClr val="000000"/>
+                  </a:solidFill>
+                  <a:latin typeface="Arial"/>
+                  <a:ea typeface="Arial"/>
+                  <a:cs typeface="Arial"/>
+                  <a:sym typeface="Arial"/>
+                </a:defRPr>
+              </a:pPr>
+            </a:p>
+          </p:txBody>
+        </p:sp>
+        <p:sp>
+          <p:nvSpPr>
+            <p:cNvPr id="246" name="&lt;mask&gt;"/>
+            <p:cNvSpPr txBox="1"/>
+            <p:nvPr/>
+          </p:nvSpPr>
+          <p:spPr>
+            <a:xfrm>
+              <a:off x="-2" y="241178"/>
+              <a:ext cx="1971007" cy="518444"/>
+            </a:xfrm>
+            <a:prstGeom prst="rect">
+              <a:avLst/>
+            </a:prstGeom>
+            <a:noFill/>
+            <a:ln w="12700" cap="flat">
+              <a:noFill/>
+              <a:miter lim="400000"/>
+            </a:ln>
+            <a:effectLst/>
+            <a:extLst>
+              <a:ext uri="{C572A759-6A51-4108-AA02-DFA0A04FC94B}">
+                <ma14:wrappingTextBoxFlag xmlns:ma14="http://schemas.microsoft.com/office/mac/drawingml/2011/main" val="1"/>
+              </a:ext>
+            </a:extLst>
+          </p:spPr>
+          <p:txBody>
+            <a:bodyPr wrap="square" lIns="0" tIns="0" rIns="0" bIns="0" numCol="1" anchor="ctr">
+              <a:spAutoFit/>
+            </a:bodyPr>
+            <a:lstStyle>
+              <a:lvl1pPr algn="ctr">
+                <a:defRPr sz="3600">
+                  <a:solidFill>
+                    <a:srgbClr val="000000"/>
+                  </a:solidFill>
+                  <a:latin typeface="Arial"/>
+                  <a:ea typeface="Arial"/>
+                  <a:cs typeface="Arial"/>
+                  <a:sym typeface="Arial"/>
+                </a:defRPr>
+              </a:lvl1pPr>
+            </a:lstStyle>
+            <a:p>
+              <a:pPr/>
+              <a:r>
+                <a:t>&lt;mask&gt;</a:t>
+              </a:r>
+            </a:p>
+          </p:txBody>
+        </p:sp>
+      </p:grpSp>
+      <p:grpSp>
+        <p:nvGrpSpPr>
+          <p:cNvPr id="250" name="lea"/>
+          <p:cNvGrpSpPr/>
+          <p:nvPr/>
+        </p:nvGrpSpPr>
+        <p:grpSpPr>
+          <a:xfrm>
+            <a:off x="6687593" y="8983141"/>
+            <a:ext cx="1971006" cy="1000804"/>
+            <a:chOff x="-1" y="-1"/>
+            <a:chExt cx="1971005" cy="1000803"/>
+          </a:xfrm>
+        </p:grpSpPr>
+        <p:sp>
+          <p:nvSpPr>
+            <p:cNvPr id="248" name="Rechteck"/>
+            <p:cNvSpPr/>
+            <p:nvPr/>
+          </p:nvSpPr>
+          <p:spPr>
+            <a:xfrm>
+              <a:off x="-2" y="-2"/>
+              <a:ext cx="1971007" cy="1000805"/>
+            </a:xfrm>
+            <a:prstGeom prst="rect">
+              <a:avLst/>
+            </a:prstGeom>
+            <a:solidFill>
+              <a:srgbClr val="FFFFFF"/>
+            </a:solidFill>
+            <a:ln w="12700" cap="flat">
+              <a:noFill/>
+              <a:miter lim="400000"/>
+            </a:ln>
+            <a:effectLst/>
+          </p:spPr>
+          <p:txBody>
+            <a:bodyPr wrap="square" lIns="0" tIns="0" rIns="0" bIns="0" numCol="1" anchor="ctr">
+              <a:noAutofit/>
+            </a:bodyPr>
+            <a:lstStyle/>
+            <a:p>
+              <a:pPr algn="ctr">
+                <a:defRPr sz="3600">
+                  <a:solidFill>
+                    <a:srgbClr val="000000"/>
+                  </a:solidFill>
+                  <a:latin typeface="Arial"/>
+                  <a:ea typeface="Arial"/>
+                  <a:cs typeface="Arial"/>
+                  <a:sym typeface="Arial"/>
+                </a:defRPr>
+              </a:pPr>
+            </a:p>
+          </p:txBody>
+        </p:sp>
+        <p:sp>
+          <p:nvSpPr>
+            <p:cNvPr id="249" name="lea"/>
+            <p:cNvSpPr txBox="1"/>
+            <p:nvPr/>
+          </p:nvSpPr>
+          <p:spPr>
+            <a:xfrm>
+              <a:off x="-2" y="240049"/>
+              <a:ext cx="1971007" cy="520701"/>
+            </a:xfrm>
+            <a:prstGeom prst="rect">
+              <a:avLst/>
+            </a:prstGeom>
+            <a:noFill/>
+            <a:ln w="12700" cap="flat">
+              <a:noFill/>
+              <a:miter lim="400000"/>
+            </a:ln>
+            <a:effectLst/>
+            <a:extLst>
+              <a:ext uri="{C572A759-6A51-4108-AA02-DFA0A04FC94B}">
+                <ma14:wrappingTextBoxFlag xmlns:ma14="http://schemas.microsoft.com/office/mac/drawingml/2011/main" val="1"/>
+              </a:ext>
+            </a:extLst>
+          </p:spPr>
+          <p:txBody>
+            <a:bodyPr wrap="square" lIns="0" tIns="0" rIns="0" bIns="0" numCol="1" anchor="ctr">
+              <a:spAutoFit/>
+            </a:bodyPr>
+            <a:lstStyle>
+              <a:lvl1pPr algn="ctr">
+                <a:defRPr sz="3600">
+                  <a:solidFill>
+                    <a:srgbClr val="000000"/>
+                  </a:solidFill>
+                  <a:latin typeface="Menlo Regular"/>
+                  <a:ea typeface="Menlo Regular"/>
+                  <a:cs typeface="Menlo Regular"/>
+                  <a:sym typeface="Menlo Regular"/>
+                </a:defRPr>
+              </a:lvl1pPr>
+            </a:lstStyle>
+            <a:p>
+              <a:pPr/>
+              <a:r>
+                <a:t>lea</a:t>
+              </a:r>
+            </a:p>
+          </p:txBody>
+        </p:sp>
+      </p:grpSp>
+      <p:grpSp>
+        <p:nvGrpSpPr>
+          <p:cNvPr id="253" name="Choose the tokens not randomly but with p:"/>
+          <p:cNvGrpSpPr/>
+          <p:nvPr/>
+        </p:nvGrpSpPr>
+        <p:grpSpPr>
+          <a:xfrm>
+            <a:off x="162325" y="10506494"/>
+            <a:ext cx="5661003" cy="1585244"/>
+            <a:chOff x="0" y="0"/>
+            <a:chExt cx="5661002" cy="1585242"/>
+          </a:xfrm>
+        </p:grpSpPr>
+        <p:sp>
+          <p:nvSpPr>
+            <p:cNvPr id="251" name="Rechteck"/>
+            <p:cNvSpPr/>
+            <p:nvPr/>
+          </p:nvSpPr>
+          <p:spPr>
+            <a:xfrm>
+              <a:off x="-1" y="157761"/>
+              <a:ext cx="5661003" cy="1269724"/>
+            </a:xfrm>
+            <a:prstGeom prst="rect">
+              <a:avLst/>
+            </a:prstGeom>
+            <a:solidFill>
+              <a:srgbClr val="FFFFFF"/>
+            </a:solidFill>
+            <a:ln w="12700" cap="flat">
+              <a:noFill/>
+              <a:miter lim="400000"/>
+            </a:ln>
+            <a:effectLst/>
+          </p:spPr>
+          <p:txBody>
+            <a:bodyPr wrap="square" lIns="0" tIns="0" rIns="0" bIns="0" numCol="1" anchor="ctr">
+              <a:noAutofit/>
+            </a:bodyPr>
+            <a:lstStyle/>
+            <a:p>
+              <a:pPr algn="ctr">
+                <a:defRPr sz="3600">
+                  <a:solidFill>
+                    <a:srgbClr val="000000"/>
+                  </a:solidFill>
+                  <a:latin typeface="Arial"/>
+                  <a:ea typeface="Arial"/>
+                  <a:cs typeface="Arial"/>
+                  <a:sym typeface="Arial"/>
+                </a:defRPr>
+              </a:pPr>
+            </a:p>
+          </p:txBody>
+        </p:sp>
+        <p:sp>
+          <p:nvSpPr>
+            <p:cNvPr id="252" name="Choose the tokens not uniform, but with split_propability*MLM"/>
+            <p:cNvSpPr txBox="1"/>
+            <p:nvPr/>
+          </p:nvSpPr>
+          <p:spPr>
+            <a:xfrm>
+              <a:off x="-1" y="-1"/>
+              <a:ext cx="5661003" cy="1585243"/>
+            </a:xfrm>
+            <a:prstGeom prst="rect">
+              <a:avLst/>
+            </a:prstGeom>
+            <a:noFill/>
+            <a:ln w="12700" cap="flat">
+              <a:noFill/>
+              <a:miter lim="400000"/>
+            </a:ln>
+            <a:effectLst/>
+            <a:extLst>
+              <a:ext uri="{C572A759-6A51-4108-AA02-DFA0A04FC94B}">
+                <ma14:wrappingTextBoxFlag xmlns:ma14="http://schemas.microsoft.com/office/mac/drawingml/2011/main" val="1"/>
+              </a:ext>
+            </a:extLst>
+          </p:spPr>
+          <p:txBody>
+            <a:bodyPr wrap="square" lIns="0" tIns="0" rIns="0" bIns="0" numCol="1" anchor="ctr">
+              <a:spAutoFit/>
+            </a:bodyPr>
+            <a:lstStyle>
+              <a:lvl1pPr algn="ctr">
+                <a:defRPr b="1" sz="3600">
+                  <a:solidFill>
+                    <a:srgbClr val="000000"/>
+                  </a:solidFill>
+                  <a:latin typeface="Arial"/>
+                  <a:ea typeface="Arial"/>
+                  <a:cs typeface="Arial"/>
+                  <a:sym typeface="Arial"/>
+                </a:defRPr>
+              </a:lvl1pPr>
+            </a:lstStyle>
+            <a:p>
+              <a:pPr/>
+              <a:r>
+                <a:t>normalize split_probability for operands</a:t>
+              </a:r>
+            </a:p>
+          </p:txBody>
+        </p:sp>
+      </p:grpSp>
+      <p:sp>
+        <p:nvSpPr>
+          <p:cNvPr id="254" name="p = 0.8"/>
+          <p:cNvSpPr/>
+          <p:nvPr/>
+        </p:nvSpPr>
+        <p:spPr>
+          <a:xfrm>
+            <a:off x="6206359" y="10540502"/>
+            <a:ext cx="4711133" cy="1517228"/>
+          </a:xfrm>
+          <a:prstGeom prst="rect">
+            <a:avLst/>
+          </a:prstGeom>
+          <a:solidFill>
+            <a:srgbClr val="FFFFFF"/>
+          </a:solidFill>
+          <a:ln w="25400">
+            <a:solidFill>
+              <a:schemeClr val="accent1"/>
+            </a:solidFill>
+          </a:ln>
+        </p:spPr>
+        <p:txBody>
+          <a:bodyPr lIns="0" tIns="0" rIns="0" bIns="0" anchor="ctr"/>
+          <a:lstStyle/>
+          <a:p>
+            <a:pPr algn="ctr">
+              <a:defRPr sz="3600">
+                <a:solidFill>
+                  <a:srgbClr val="000000"/>
+                </a:solidFill>
+                <a:latin typeface="Arial"/>
+                <a:ea typeface="Arial"/>
+                <a:cs typeface="Arial"/>
+                <a:sym typeface="Arial"/>
+              </a:defRPr>
+            </a:pPr>
+          </a:p>
+        </p:txBody>
+      </p:sp>
+      <p:sp>
+        <p:nvSpPr>
+          <p:cNvPr id="255" name="p = 0.2"/>
+          <p:cNvSpPr/>
+          <p:nvPr/>
+        </p:nvSpPr>
+        <p:spPr>
+          <a:xfrm>
+            <a:off x="12979587" y="10545544"/>
+            <a:ext cx="7176968" cy="1517227"/>
+          </a:xfrm>
+          <a:prstGeom prst="rect">
+            <a:avLst/>
+          </a:prstGeom>
+          <a:solidFill>
+            <a:srgbClr val="FFFFFF"/>
+          </a:solidFill>
+          <a:ln w="25400">
+            <a:solidFill>
+              <a:schemeClr val="accent1"/>
+            </a:solidFill>
+          </a:ln>
+        </p:spPr>
+        <p:txBody>
+          <a:bodyPr lIns="0" tIns="0" rIns="0" bIns="0" anchor="ctr"/>
+          <a:lstStyle/>
+          <a:p>
+            <a:pPr algn="ctr">
+              <a:defRPr sz="3600">
+                <a:solidFill>
+                  <a:srgbClr val="000000"/>
+                </a:solidFill>
+                <a:latin typeface="Arial"/>
+                <a:ea typeface="Arial"/>
+                <a:cs typeface="Arial"/>
+                <a:sym typeface="Arial"/>
+              </a:defRPr>
+            </a:pPr>
+          </a:p>
+        </p:txBody>
+      </p:sp>
+      <p:sp>
+        <p:nvSpPr>
+          <p:cNvPr id="256" name="Linie"/>
+          <p:cNvSpPr/>
+          <p:nvPr/>
+        </p:nvSpPr>
+        <p:spPr>
+          <a:xfrm flipH="1" flipV="1">
+            <a:off x="9823915" y="9911942"/>
+            <a:ext cx="3183050" cy="648822"/>
+          </a:xfrm>
+          <a:prstGeom prst="line">
+            <a:avLst/>
+          </a:prstGeom>
+          <a:ln w="50800">
+            <a:solidFill>
+              <a:schemeClr val="accent1"/>
+            </a:solidFill>
+            <a:tailEnd type="triangle"/>
+          </a:ln>
+        </p:spPr>
+        <p:txBody>
+          <a:bodyPr lIns="45718" tIns="45718" rIns="45718" bIns="45718"/>
+          <a:lstStyle/>
+          <a:p>
+            <a:pPr/>
+          </a:p>
+        </p:txBody>
+      </p:sp>
+      <p:sp>
+        <p:nvSpPr>
+          <p:cNvPr id="257" name="Linie"/>
+          <p:cNvSpPr/>
+          <p:nvPr/>
+        </p:nvSpPr>
+        <p:spPr>
+          <a:xfrm flipV="1">
+            <a:off x="16030295" y="9900423"/>
+            <a:ext cx="367943" cy="652704"/>
+          </a:xfrm>
+          <a:prstGeom prst="line">
+            <a:avLst/>
+          </a:prstGeom>
+          <a:ln w="50800">
+            <a:solidFill>
+              <a:schemeClr val="accent1"/>
+            </a:solidFill>
+            <a:tailEnd type="triangle"/>
+          </a:ln>
+        </p:spPr>
+        <p:txBody>
+          <a:bodyPr lIns="45718" tIns="45718" rIns="45718" bIns="45718"/>
+          <a:lstStyle/>
+          <a:p>
+            <a:pPr/>
+          </a:p>
+        </p:txBody>
+      </p:sp>
+      <p:sp>
+        <p:nvSpPr>
+          <p:cNvPr id="258" name="Linie"/>
+          <p:cNvSpPr/>
+          <p:nvPr/>
+        </p:nvSpPr>
+        <p:spPr>
+          <a:xfrm flipV="1">
+            <a:off x="14218436" y="9915182"/>
+            <a:ext cx="1" cy="628924"/>
+          </a:xfrm>
+          <a:prstGeom prst="line">
+            <a:avLst/>
+          </a:prstGeom>
+          <a:ln w="50800">
+            <a:solidFill>
+              <a:schemeClr val="accent1"/>
+            </a:solidFill>
+            <a:tailEnd type="triangle"/>
+          </a:ln>
+        </p:spPr>
+        <p:txBody>
+          <a:bodyPr lIns="45718" tIns="45718" rIns="45718" bIns="45718"/>
+          <a:lstStyle/>
+          <a:p>
+            <a:pPr/>
+          </a:p>
+        </p:txBody>
+      </p:sp>
+      <p:sp>
+        <p:nvSpPr>
+          <p:cNvPr id="259" name="Linie"/>
+          <p:cNvSpPr/>
+          <p:nvPr/>
+        </p:nvSpPr>
+        <p:spPr>
+          <a:xfrm flipH="1" flipV="1">
+            <a:off x="12095648" y="9911232"/>
+            <a:ext cx="1133421" cy="629812"/>
+          </a:xfrm>
+          <a:prstGeom prst="line">
+            <a:avLst/>
+          </a:prstGeom>
+          <a:ln w="50800">
+            <a:solidFill>
+              <a:schemeClr val="accent1"/>
+            </a:solidFill>
+            <a:tailEnd type="triangle"/>
+          </a:ln>
+        </p:spPr>
+        <p:txBody>
+          <a:bodyPr lIns="45718" tIns="45718" rIns="45718" bIns="45718"/>
+          <a:lstStyle/>
+          <a:p>
+            <a:pPr/>
+          </a:p>
+        </p:txBody>
+      </p:sp>
+      <p:sp>
+        <p:nvSpPr>
+          <p:cNvPr id="260" name="Rechteck"/>
+          <p:cNvSpPr/>
+          <p:nvPr/>
+        </p:nvSpPr>
+        <p:spPr>
+          <a:xfrm>
+            <a:off x="6581395" y="8897823"/>
+            <a:ext cx="2183043" cy="1171443"/>
+          </a:xfrm>
+          <a:prstGeom prst="rect">
+            <a:avLst/>
+          </a:prstGeom>
+          <a:ln w="88900">
+            <a:solidFill>
+              <a:srgbClr val="000000"/>
+            </a:solidFill>
+            <a:prstDash val="sysDot"/>
+            <a:miter/>
+          </a:ln>
+        </p:spPr>
+        <p:txBody>
+          <a:bodyPr lIns="0" tIns="0" rIns="0" bIns="0"/>
+          <a:lstStyle/>
+          <a:p>
+            <a:pPr>
+              <a:defRPr>
+                <a:latin typeface="Arial"/>
+                <a:ea typeface="Arial"/>
+                <a:cs typeface="Arial"/>
+                <a:sym typeface="Arial"/>
+              </a:defRPr>
+            </a:pPr>
+          </a:p>
+        </p:txBody>
+      </p:sp>
+      <p:pic>
+        <p:nvPicPr>
+          <p:cNvPr id="261" name="p_opcode.png" descr="p_opcode.png"/>
+          <p:cNvPicPr>
+            <a:picLocks noChangeAspect="1"/>
+          </p:cNvPicPr>
+          <p:nvPr/>
+        </p:nvPicPr>
+        <p:blipFill>
+          <a:blip r:embed="rId3">
+            <a:extLst/>
+          </a:blip>
+          <a:stretch>
+            <a:fillRect/>
+          </a:stretch>
+        </p:blipFill>
+        <p:spPr>
+          <a:xfrm>
+            <a:off x="6517716" y="11021865"/>
+            <a:ext cx="4088417" cy="554503"/>
+          </a:xfrm>
+          <a:prstGeom prst="rect">
+            <a:avLst/>
+          </a:prstGeom>
+          <a:ln w="12700">
+            <a:miter lim="400000"/>
+          </a:ln>
+        </p:spPr>
+      </p:pic>
+      <p:sp>
+        <p:nvSpPr>
+          <p:cNvPr id="262" name="Linie"/>
+          <p:cNvSpPr/>
+          <p:nvPr/>
+        </p:nvSpPr>
+        <p:spPr>
+          <a:xfrm flipV="1">
+            <a:off x="7633675" y="9932822"/>
+            <a:ext cx="3" cy="593643"/>
+          </a:xfrm>
+          <a:prstGeom prst="line">
+            <a:avLst/>
+          </a:prstGeom>
+          <a:ln w="63500">
+            <a:solidFill>
+              <a:schemeClr val="accent1"/>
+            </a:solidFill>
+            <a:tailEnd type="triangle"/>
+          </a:ln>
+        </p:spPr>
+        <p:txBody>
+          <a:bodyPr lIns="45718" tIns="45718" rIns="45718" bIns="45718"/>
+          <a:lstStyle/>
+          <a:p>
+            <a:pPr/>
+          </a:p>
+        </p:txBody>
+      </p:sp>
+      <p:pic>
+        <p:nvPicPr>
+          <p:cNvPr id="263" name="p_operand_alt.png" descr="p_operand_alt.png"/>
+          <p:cNvPicPr>
+            <a:picLocks noChangeAspect="1"/>
+          </p:cNvPicPr>
+          <p:nvPr/>
+        </p:nvPicPr>
+        <p:blipFill>
+          <a:blip r:embed="rId4">
+            <a:extLst/>
+          </a:blip>
+          <a:stretch>
+            <a:fillRect/>
+          </a:stretch>
+        </p:blipFill>
+        <p:spPr>
+          <a:xfrm>
+            <a:off x="13123585" y="10858708"/>
+            <a:ext cx="6888972" cy="880816"/>
+          </a:xfrm>
+          <a:prstGeom prst="rect">
+            <a:avLst/>
+          </a:prstGeom>
+          <a:ln w="12700">
+            <a:miter lim="400000"/>
+          </a:ln>
+        </p:spPr>
+      </p:pic>
+    </p:spTree>
+  </p:cSld>
+  <p:clrMapOvr>
+    <a:masterClrMapping/>
+  </p:clrMapOvr>
+  <p:transition xmlns:p14="http://schemas.microsoft.com/office/powerpoint/2010/main" spd="med" advClick="1"/>
+  <p:timing>
+    <p:tnLst>
+      <p:par>
+        <p:cTn id="1" nodeType="tmRoot" restart="never" dur="indefinite" fill="hold">
+          <p:childTnLst>
+            <p:seq concurrent="1" prevAc="none" nextAc="seek">
+              <p:cTn id="2" nodeType="mainSeq" dur="indefinite" fill="hold">
+                <p:childTnLst>
+                  <p:par>
+                    <p:cTn id="3" fill="hold">
+                      <p:stCondLst>
+                        <p:cond delay="indefinite"/>
+                      </p:stCondLst>
+                      <p:childTnLst>
+                        <p:par>
+                          <p:cTn id="4" fill="hold">
+                            <p:stCondLst>
+                              <p:cond delay="0"/>
+                            </p:stCondLst>
+                            <p:childTnLst>
+                              <p:par>
+                                <p:cTn id="5" presetClass="entr" nodeType="clickEffect" presetSubtype="0" presetID="1" grpId="1" fill="hold">
+                                  <p:stCondLst>
+                                    <p:cond delay="0"/>
+                                  </p:stCondLst>
+                                  <p:iterate type="el" backwards="0">
+                                    <p:tmAbs val="0"/>
+                                  </p:iterate>
+                                  <p:childTnLst>
+                                    <p:set>
+                                      <p:cBhvr>
+                                        <p:cTn id="6" fill="hold"/>
+                                        <p:tgtEl>
+                                          <p:spTgt spid="260"/>
+                                        </p:tgtEl>
+                                        <p:attrNameLst>
+                                          <p:attrName>style.visibility</p:attrName>
+                                        </p:attrNameLst>
+                                      </p:cBhvr>
+                                      <p:to>
+                                        <p:strVal val="visible"/>
+                                      </p:to>
+                                    </p:set>
+                                  </p:childTnLst>
+                                </p:cTn>
+                              </p:par>
+                            </p:childTnLst>
+                          </p:cTn>
+                        </p:par>
+                      </p:childTnLst>
+                    </p:cTn>
+                  </p:par>
+                  <p:par>
+                    <p:cTn id="7" fill="hold">
+                      <p:stCondLst>
+                        <p:cond delay="indefinite"/>
+                      </p:stCondLst>
+                      <p:childTnLst>
+                        <p:par>
+                          <p:cTn id="8" fill="hold">
+                            <p:stCondLst>
+                              <p:cond delay="0"/>
+                            </p:stCondLst>
+                            <p:childTnLst>
+                              <p:par>
+                                <p:cTn id="9" presetClass="entr" nodeType="clickEffect" presetSubtype="0" presetID="1" grpId="2" fill="hold">
+                                  <p:stCondLst>
+                                    <p:cond delay="0"/>
+                                  </p:stCondLst>
+                                  <p:iterate type="el" backwards="0">
+                                    <p:tmAbs val="0"/>
+                                  </p:iterate>
+                                  <p:childTnLst>
+                                    <p:set>
+                                      <p:cBhvr>
+                                        <p:cTn id="10" fill="hold"/>
+                                        <p:tgtEl>
+                                          <p:spTgt spid="247"/>
+                                        </p:tgtEl>
+                                        <p:attrNameLst>
+                                          <p:attrName>style.visibility</p:attrName>
+                                        </p:attrNameLst>
+                                      </p:cBhvr>
+                                      <p:to>
+                                        <p:strVal val="visible"/>
+                                      </p:to>
+                                    </p:set>
+                                  </p:childTnLst>
+                                </p:cTn>
+                              </p:par>
+                            </p:childTnLst>
+                          </p:cTn>
+                        </p:par>
+                      </p:childTnLst>
+                    </p:cTn>
+                  </p:par>
+                  <p:par>
+                    <p:cTn id="11" fill="hold">
+                      <p:stCondLst>
+                        <p:cond delay="indefinite"/>
+                      </p:stCondLst>
+                      <p:childTnLst>
+                        <p:par>
+                          <p:cTn id="12" fill="hold">
+                            <p:stCondLst>
+                              <p:cond delay="0"/>
+                            </p:stCondLst>
+                            <p:childTnLst>
+                              <p:par>
+                                <p:cTn id="13" presetClass="entr" nodeType="clickEffect" presetSubtype="0" presetID="1" grpId="3" fill="hold">
+                                  <p:stCondLst>
+                                    <p:cond delay="0"/>
+                                  </p:stCondLst>
+                                  <p:iterate type="el" backwards="0">
+                                    <p:tmAbs val="0"/>
+                                  </p:iterate>
+                                  <p:childTnLst>
+                                    <p:set>
+                                      <p:cBhvr>
+                                        <p:cTn id="14" fill="hold"/>
+                                        <p:tgtEl>
+                                          <p:spTgt spid="250"/>
+                                        </p:tgtEl>
+                                        <p:attrNameLst>
+                                          <p:attrName>style.visibility</p:attrName>
+                                        </p:attrNameLst>
+                                      </p:cBhvr>
+                                      <p:to>
+                                        <p:strVal val="visible"/>
+                                      </p:to>
+                                    </p:set>
+                                  </p:childTnLst>
+                                </p:cTn>
+                              </p:par>
+                            </p:childTnLst>
+                          </p:cTn>
+                        </p:par>
+                      </p:childTnLst>
+                    </p:cTn>
+                  </p:par>
+                </p:childTnLst>
+              </p:cTn>
+              <p:prevCondLst>
+                <p:cond evt="onPrev">
+                  <p:tgtEl>
+                    <p:sldTgt/>
+                  </p:tgtEl>
+                </p:cond>
+              </p:prevCondLst>
+              <p:nextCondLst>
+                <p:cond evt="onNext">
+                  <p:tgtEl>
+                    <p:sldTgt/>
+                  </p:tgtEl>
+                </p:cond>
+              </p:nextCondLst>
+            </p:seq>
+          </p:childTnLst>
+        </p:cTn>
+      </p:par>
+    </p:tnLst>
+    <p:bldLst>
+      <p:bldP build="whole" bldLvl="1" animBg="1" rev="0" advAuto="0" spid="247" grpId="2"/>
+      <p:bldP build="whole" bldLvl="1" animBg="1" rev="0" advAuto="0" spid="250" grpId="3"/>
+      <p:bldP build="whole" bldLvl="1" animBg="1" rev="0" advAuto="0" spid="260" grpId="1"/>
+    </p:bldLst>
+  </p:timing>
+</p:sld>
+</file>
+
+<file path=ppt/slides/slide16.xml><?xml version="1.0" encoding="utf-8"?>
+<p:sld xmlns:a="http://schemas.openxmlformats.org/drawingml/2006/main" xmlns:r="http://schemas.openxmlformats.org/officeDocument/2006/relationships" xmlns:p="http://schemas.openxmlformats.org/presentationml/2006/main" xmlns:m="http://schemas.openxmlformats.org/officeDocument/2006/math" xmlns:a14="http://schemas.microsoft.com/office/drawing/2010/main" showMasterSp="1" showMasterPhAnim="1">
+  <p:cSld>
+    <p:spTree>
+      <p:nvGrpSpPr>
+        <p:cNvPr id="1" name=""/>
+        <p:cNvGrpSpPr/>
+        <p:nvPr/>
+      </p:nvGrpSpPr>
+      <p:grpSpPr>
+        <a:xfrm>
+          <a:off x="0" y="0"/>
+          <a:ext cx="0" cy="0"/>
+          <a:chOff x="0" y="0"/>
+          <a:chExt cx="0" cy="0"/>
+        </a:xfrm>
+      </p:grpSpPr>
+      <p:sp>
+        <p:nvSpPr>
+          <p:cNvPr id="265" name="PlaceHolder 1"/>
           <p:cNvSpPr txBox="1"/>
           <p:nvPr>
             <p:ph type="title"/>
@@ -6744,7 +7485,7 @@
       </p:sp>
       <p:graphicFrame>
         <p:nvGraphicFramePr>
-          <p:cNvPr id="245" name="Tabelle"/>
+          <p:cNvPr id="266" name="Tabelle"/>
           <p:cNvGraphicFramePr/>
           <p:nvPr/>
         </p:nvGraphicFramePr>
@@ -9026,9 +9767,9 @@
       </p:par>
     </p:tnLst>
     <p:bldLst>
+      <p:bldP build="whole" bldLvl="1" animBg="1" rev="0" advAuto="0" spid="177" grpId="2"/>
       <p:bldP build="whole" bldLvl="1" animBg="1" rev="0" advAuto="0" spid="180" grpId="3"/>
       <p:bldP build="whole" bldLvl="1" animBg="1" rev="0" advAuto="0" spid="174" grpId="1"/>
-      <p:bldP build="whole" bldLvl="1" animBg="1" rev="0" advAuto="0" spid="177" grpId="2"/>
     </p:bldLst>
   </p:timing>
 </p:sld>
@@ -9381,8 +10122,8 @@
         </p:nvGrpSpPr>
         <p:grpSpPr>
           <a:xfrm>
-            <a:off x="602999" y="11100877"/>
-            <a:ext cx="5661004" cy="1585244"/>
+            <a:off x="227610" y="11224631"/>
+            <a:ext cx="5661003" cy="1585243"/>
             <a:chOff x="0" y="0"/>
             <a:chExt cx="5661002" cy="1585242"/>
           </a:xfrm>
@@ -9476,36 +10217,77 @@
             <a:p>
               <a:pPr/>
               <a:r>
-                <a:t>Choose the tokens not uniform, but with split_propability*MLM</a:t>
+                <a:t>Choose the tokens not uniform, but with split_probability*MLM</a:t>
               </a:r>
             </a:p>
           </p:txBody>
         </p:sp>
       </p:grpSp>
+      <p:sp>
+        <p:nvSpPr>
+          <p:cNvPr id="194" name="p = 0.8"/>
+          <p:cNvSpPr/>
+          <p:nvPr/>
+        </p:nvSpPr>
+        <p:spPr>
+          <a:xfrm>
+            <a:off x="6271643" y="11258639"/>
+            <a:ext cx="4711134" cy="1517227"/>
+          </a:xfrm>
+          <a:prstGeom prst="rect">
+            <a:avLst/>
+          </a:prstGeom>
+          <a:solidFill>
+            <a:srgbClr val="FFFFFF"/>
+          </a:solidFill>
+          <a:ln w="25400">
+            <a:solidFill>
+              <a:schemeClr val="accent1"/>
+            </a:solidFill>
+          </a:ln>
+        </p:spPr>
+        <p:txBody>
+          <a:bodyPr lIns="0" tIns="0" rIns="0" bIns="0" anchor="ctr"/>
+          <a:lstStyle/>
+          <a:p>
+            <a:pPr algn="ctr">
+              <a:defRPr sz="3600">
+                <a:solidFill>
+                  <a:srgbClr val="000000"/>
+                </a:solidFill>
+                <a:latin typeface="Arial"/>
+                <a:ea typeface="Arial"/>
+                <a:cs typeface="Arial"/>
+                <a:sym typeface="Arial"/>
+              </a:defRPr>
+            </a:pPr>
+          </a:p>
+        </p:txBody>
+      </p:sp>
       <p:grpSp>
         <p:nvGrpSpPr>
-          <p:cNvPr id="196" name="p = 0.8"/>
+          <p:cNvPr id="197" name="p = 0.2"/>
           <p:cNvGrpSpPr/>
           <p:nvPr/>
         </p:nvGrpSpPr>
         <p:grpSpPr>
           <a:xfrm>
-            <a:off x="6695997" y="11258639"/>
-            <a:ext cx="2664007" cy="1269725"/>
+            <a:off x="13044872" y="11263680"/>
+            <a:ext cx="5814013" cy="1517228"/>
             <a:chOff x="0" y="0"/>
-            <a:chExt cx="2664005" cy="1269723"/>
+            <a:chExt cx="5814012" cy="1517226"/>
           </a:xfrm>
         </p:grpSpPr>
         <p:sp>
           <p:nvSpPr>
-            <p:cNvPr id="194" name="Rechteck"/>
+            <p:cNvPr id="195" name="Rechteck"/>
             <p:cNvSpPr/>
             <p:nvPr/>
           </p:nvSpPr>
           <p:spPr>
             <a:xfrm>
-              <a:off x="-1" y="0"/>
-              <a:ext cx="2664007" cy="1269724"/>
+              <a:off x="0" y="0"/>
+              <a:ext cx="5814013" cy="1517227"/>
             </a:xfrm>
             <a:prstGeom prst="rect">
               <a:avLst/>
@@ -9542,170 +10324,96 @@
             </a:p>
           </p:txBody>
         </p:sp>
-        <p:sp>
-          <p:nvSpPr>
-            <p:cNvPr id="195" name="p = 0.8*0.15"/>
-            <p:cNvSpPr txBox="1"/>
+        <p:pic>
+          <p:nvPicPr>
+            <p:cNvPr id="196" name="p_operand_first.png" descr="p_operand_first.png"/>
+            <p:cNvPicPr>
+              <a:picLocks noChangeAspect="1"/>
+            </p:cNvPicPr>
             <p:nvPr/>
-          </p:nvSpPr>
+          </p:nvPicPr>
+          <p:blipFill>
+            <a:blip r:embed="rId3">
+              <a:extLst/>
+            </a:blip>
+            <a:stretch>
+              <a:fillRect/>
+            </a:stretch>
+          </p:blipFill>
           <p:spPr>
             <a:xfrm>
-              <a:off x="12699" y="375638"/>
-              <a:ext cx="2638607" cy="518444"/>
+              <a:off x="149777" y="459636"/>
+              <a:ext cx="5514459" cy="597954"/>
             </a:xfrm>
             <a:prstGeom prst="rect">
               <a:avLst/>
             </a:prstGeom>
-            <a:noFill/>
             <a:ln w="12700" cap="flat">
               <a:noFill/>
               <a:miter lim="400000"/>
             </a:ln>
             <a:effectLst/>
-            <a:extLst>
-              <a:ext uri="{C572A759-6A51-4108-AA02-DFA0A04FC94B}">
-                <ma14:wrappingTextBoxFlag xmlns:ma14="http://schemas.microsoft.com/office/mac/drawingml/2011/main" val="1"/>
-              </a:ext>
-            </a:extLst>
           </p:spPr>
-          <p:txBody>
-            <a:bodyPr wrap="square" lIns="0" tIns="0" rIns="0" bIns="0" numCol="1" anchor="ctr">
-              <a:spAutoFit/>
-            </a:bodyPr>
-            <a:lstStyle>
-              <a:lvl1pPr algn="ctr">
-                <a:defRPr b="1" sz="3600">
-                  <a:solidFill>
-                    <a:srgbClr val="000000"/>
-                  </a:solidFill>
-                  <a:latin typeface="Arial"/>
-                  <a:ea typeface="Arial"/>
-                  <a:cs typeface="Arial"/>
-                  <a:sym typeface="Arial"/>
-                </a:defRPr>
-              </a:lvl1pPr>
-            </a:lstStyle>
-            <a:p>
-              <a:pPr/>
-              <a:r>
-                <a:t>p = 0.8*0.15</a:t>
-              </a:r>
-            </a:p>
-          </p:txBody>
-        </p:sp>
+        </p:pic>
       </p:grpSp>
-      <p:grpSp>
-        <p:nvGrpSpPr>
-          <p:cNvPr id="199" name="p = 0.2"/>
-          <p:cNvGrpSpPr/>
+      <p:sp>
+        <p:nvSpPr>
+          <p:cNvPr id="198" name="Linie"/>
+          <p:cNvSpPr/>
           <p:nvPr/>
-        </p:nvGrpSpPr>
-        <p:grpSpPr>
-          <a:xfrm>
-            <a:off x="12023997" y="11258639"/>
-            <a:ext cx="2520006" cy="1269725"/>
-            <a:chOff x="-1" y="0"/>
-            <a:chExt cx="2520005" cy="1269723"/>
+        </p:nvSpPr>
+        <p:spPr>
+          <a:xfrm flipH="1" flipV="1">
+            <a:off x="9889200" y="10630079"/>
+            <a:ext cx="3183050" cy="648822"/>
           </a:xfrm>
-        </p:grpSpPr>
-        <p:sp>
-          <p:nvSpPr>
-            <p:cNvPr id="197" name="Rechteck"/>
-            <p:cNvSpPr/>
-            <p:nvPr/>
-          </p:nvSpPr>
-          <p:spPr>
-            <a:xfrm>
-              <a:off x="-2" y="0"/>
-              <a:ext cx="2520007" cy="1269724"/>
-            </a:xfrm>
-            <a:prstGeom prst="rect">
-              <a:avLst/>
-            </a:prstGeom>
+          <a:prstGeom prst="line">
+            <a:avLst/>
+          </a:prstGeom>
+          <a:ln w="50800">
             <a:solidFill>
-              <a:srgbClr val="FFFFFF"/>
+              <a:schemeClr val="accent1"/>
             </a:solidFill>
-            <a:ln w="25400" cap="flat">
-              <a:solidFill>
-                <a:schemeClr val="accent1"/>
-              </a:solidFill>
-              <a:prstDash val="solid"/>
-              <a:round/>
-            </a:ln>
-            <a:effectLst/>
-          </p:spPr>
-          <p:txBody>
-            <a:bodyPr wrap="square" lIns="0" tIns="0" rIns="0" bIns="0" numCol="1" anchor="ctr">
-              <a:noAutofit/>
-            </a:bodyPr>
-            <a:lstStyle/>
-            <a:p>
-              <a:pPr algn="ctr">
-                <a:defRPr sz="3600">
-                  <a:solidFill>
-                    <a:srgbClr val="000000"/>
-                  </a:solidFill>
-                  <a:latin typeface="Arial"/>
-                  <a:ea typeface="Arial"/>
-                  <a:cs typeface="Arial"/>
-                  <a:sym typeface="Arial"/>
-                </a:defRPr>
-              </a:pPr>
-            </a:p>
-          </p:txBody>
-        </p:sp>
-        <p:sp>
-          <p:nvSpPr>
-            <p:cNvPr id="198" name="p = 0.2*0.15"/>
-            <p:cNvSpPr txBox="1"/>
-            <p:nvPr/>
-          </p:nvSpPr>
-          <p:spPr>
-            <a:xfrm>
-              <a:off x="12698" y="108938"/>
-              <a:ext cx="2494607" cy="1051843"/>
-            </a:xfrm>
-            <a:prstGeom prst="rect">
-              <a:avLst/>
-            </a:prstGeom>
-            <a:noFill/>
-            <a:ln w="12700" cap="flat">
-              <a:noFill/>
-              <a:miter lim="400000"/>
-            </a:ln>
-            <a:effectLst/>
-            <a:extLst>
-              <a:ext uri="{C572A759-6A51-4108-AA02-DFA0A04FC94B}">
-                <ma14:wrappingTextBoxFlag xmlns:ma14="http://schemas.microsoft.com/office/mac/drawingml/2011/main" val="1"/>
-              </a:ext>
-            </a:extLst>
-          </p:spPr>
-          <p:txBody>
-            <a:bodyPr wrap="square" lIns="0" tIns="0" rIns="0" bIns="0" numCol="1" anchor="ctr">
-              <a:spAutoFit/>
-            </a:bodyPr>
-            <a:lstStyle>
-              <a:lvl1pPr algn="ctr">
-                <a:defRPr b="1" sz="3600">
-                  <a:solidFill>
-                    <a:srgbClr val="000000"/>
-                  </a:solidFill>
-                  <a:latin typeface="Arial"/>
-                  <a:ea typeface="Arial"/>
-                  <a:cs typeface="Arial"/>
-                  <a:sym typeface="Arial"/>
-                </a:defRPr>
-              </a:lvl1pPr>
-            </a:lstStyle>
-            <a:p>
-              <a:pPr/>
-              <a:r>
-                <a:t>p = 0.2*0.15</a:t>
-              </a:r>
-            </a:p>
-          </p:txBody>
-        </p:sp>
-      </p:grpSp>
+            <a:tailEnd type="triangle"/>
+          </a:ln>
+        </p:spPr>
+        <p:txBody>
+          <a:bodyPr lIns="45718" tIns="45718" rIns="45718" bIns="45718"/>
+          <a:lstStyle/>
+          <a:p>
+            <a:pPr/>
+          </a:p>
+        </p:txBody>
+      </p:sp>
+      <p:sp>
+        <p:nvSpPr>
+          <p:cNvPr id="199" name="Linie"/>
+          <p:cNvSpPr/>
+          <p:nvPr/>
+        </p:nvSpPr>
+        <p:spPr>
+          <a:xfrm flipV="1">
+            <a:off x="16095581" y="10618560"/>
+            <a:ext cx="367942" cy="652704"/>
+          </a:xfrm>
+          <a:prstGeom prst="line">
+            <a:avLst/>
+          </a:prstGeom>
+          <a:ln w="50800">
+            <a:solidFill>
+              <a:schemeClr val="accent1"/>
+            </a:solidFill>
+            <a:tailEnd type="triangle"/>
+          </a:ln>
+        </p:spPr>
+        <p:txBody>
+          <a:bodyPr lIns="45718" tIns="45718" rIns="45718" bIns="45718"/>
+          <a:lstStyle/>
+          <a:p>
+            <a:pPr/>
+          </a:p>
+        </p:txBody>
+      </p:sp>
       <p:sp>
         <p:nvSpPr>
           <p:cNvPr id="200" name="Linie"/>
@@ -9714,13 +10422,13 @@
         </p:nvSpPr>
         <p:spPr>
           <a:xfrm flipV="1">
-            <a:off x="7698960" y="10650959"/>
-            <a:ext cx="3" cy="593643"/>
+            <a:off x="14283722" y="10633319"/>
+            <a:ext cx="1" cy="628923"/>
           </a:xfrm>
           <a:prstGeom prst="line">
             <a:avLst/>
           </a:prstGeom>
-          <a:ln w="63500">
+          <a:ln w="50800">
             <a:solidFill>
               <a:schemeClr val="accent1"/>
             </a:solidFill>
@@ -9743,13 +10451,13 @@
         </p:nvSpPr>
         <p:spPr>
           <a:xfrm flipH="1" flipV="1">
-            <a:off x="9889200" y="10630079"/>
-            <a:ext cx="2134803" cy="1105921"/>
+            <a:off x="12160934" y="10629369"/>
+            <a:ext cx="1133420" cy="629812"/>
           </a:xfrm>
           <a:prstGeom prst="line">
             <a:avLst/>
           </a:prstGeom>
-          <a:ln w="25400">
+          <a:ln w="50800">
             <a:solidFill>
               <a:schemeClr val="accent1"/>
             </a:solidFill>
@@ -9766,94 +10474,7 @@
       </p:sp>
       <p:sp>
         <p:nvSpPr>
-          <p:cNvPr id="202" name="Linie"/>
-          <p:cNvSpPr/>
-          <p:nvPr/>
-        </p:nvSpPr>
-        <p:spPr>
-          <a:xfrm flipV="1">
-            <a:off x="14544000" y="10618560"/>
-            <a:ext cx="1919523" cy="1261443"/>
-          </a:xfrm>
-          <a:prstGeom prst="line">
-            <a:avLst/>
-          </a:prstGeom>
-          <a:ln w="25400">
-            <a:solidFill>
-              <a:schemeClr val="accent1"/>
-            </a:solidFill>
-            <a:tailEnd type="triangle"/>
-          </a:ln>
-        </p:spPr>
-        <p:txBody>
-          <a:bodyPr lIns="45718" tIns="45718" rIns="45718" bIns="45718"/>
-          <a:lstStyle/>
-          <a:p>
-            <a:pPr/>
-          </a:p>
-        </p:txBody>
-      </p:sp>
-      <p:sp>
-        <p:nvSpPr>
-          <p:cNvPr id="203" name="Linie"/>
-          <p:cNvSpPr/>
-          <p:nvPr/>
-        </p:nvSpPr>
-        <p:spPr>
-          <a:xfrm flipV="1">
-            <a:off x="13663800" y="10633319"/>
-            <a:ext cx="619923" cy="619563"/>
-          </a:xfrm>
-          <a:prstGeom prst="line">
-            <a:avLst/>
-          </a:prstGeom>
-          <a:ln w="25400">
-            <a:solidFill>
-              <a:schemeClr val="accent1"/>
-            </a:solidFill>
-            <a:tailEnd type="triangle"/>
-          </a:ln>
-        </p:spPr>
-        <p:txBody>
-          <a:bodyPr lIns="45718" tIns="45718" rIns="45718" bIns="45718"/>
-          <a:lstStyle/>
-          <a:p>
-            <a:pPr/>
-          </a:p>
-        </p:txBody>
-      </p:sp>
-      <p:sp>
-        <p:nvSpPr>
-          <p:cNvPr id="204" name="Linie"/>
-          <p:cNvSpPr/>
-          <p:nvPr/>
-        </p:nvSpPr>
-        <p:spPr>
-          <a:xfrm flipH="1" flipV="1">
-            <a:off x="12160800" y="10629358"/>
-            <a:ext cx="627843" cy="627843"/>
-          </a:xfrm>
-          <a:prstGeom prst="line">
-            <a:avLst/>
-          </a:prstGeom>
-          <a:ln w="25400">
-            <a:solidFill>
-              <a:schemeClr val="accent1"/>
-            </a:solidFill>
-            <a:tailEnd type="triangle"/>
-          </a:ln>
-        </p:spPr>
-        <p:txBody>
-          <a:bodyPr lIns="45718" tIns="45718" rIns="45718" bIns="45718"/>
-          <a:lstStyle/>
-          <a:p>
-            <a:pPr/>
-          </a:p>
-        </p:txBody>
-      </p:sp>
-      <p:sp>
-        <p:nvSpPr>
-          <p:cNvPr id="205" name="Rechteck"/>
+          <p:cNvPr id="202" name="Rechteck"/>
           <p:cNvSpPr/>
           <p:nvPr/>
         </p:nvSpPr>
@@ -9885,6 +10506,64 @@
                 <a:sym typeface="Arial"/>
               </a:defRPr>
             </a:pPr>
+          </a:p>
+        </p:txBody>
+      </p:sp>
+      <p:pic>
+        <p:nvPicPr>
+          <p:cNvPr id="203" name="p_opcode.png" descr="p_opcode.png"/>
+          <p:cNvPicPr>
+            <a:picLocks noChangeAspect="1"/>
+          </p:cNvPicPr>
+          <p:nvPr/>
+        </p:nvPicPr>
+        <p:blipFill>
+          <a:blip r:embed="rId4">
+            <a:extLst/>
+          </a:blip>
+          <a:stretch>
+            <a:fillRect/>
+          </a:stretch>
+        </p:blipFill>
+        <p:spPr>
+          <a:xfrm>
+            <a:off x="6583002" y="11740001"/>
+            <a:ext cx="4088416" cy="554503"/>
+          </a:xfrm>
+          <a:prstGeom prst="rect">
+            <a:avLst/>
+          </a:prstGeom>
+          <a:ln w="12700">
+            <a:miter lim="400000"/>
+          </a:ln>
+        </p:spPr>
+      </p:pic>
+      <p:sp>
+        <p:nvSpPr>
+          <p:cNvPr id="204" name="Linie"/>
+          <p:cNvSpPr/>
+          <p:nvPr/>
+        </p:nvSpPr>
+        <p:spPr>
+          <a:xfrm flipV="1">
+            <a:off x="7698960" y="10650959"/>
+            <a:ext cx="3" cy="593643"/>
+          </a:xfrm>
+          <a:prstGeom prst="line">
+            <a:avLst/>
+          </a:prstGeom>
+          <a:ln w="63500">
+            <a:solidFill>
+              <a:schemeClr val="accent1"/>
+            </a:solidFill>
+            <a:tailEnd type="triangle"/>
+          </a:ln>
+        </p:spPr>
+        <p:txBody>
+          <a:bodyPr lIns="45718" tIns="45718" rIns="45718" bIns="45718"/>
+          <a:lstStyle/>
+          <a:p>
+            <a:pPr/>
           </a:p>
         </p:txBody>
       </p:sp>
@@ -9927,7 +10606,7 @@
                                       <p:cBhvr>
                                         <p:cTn id="6" fill="hold"/>
                                         <p:tgtEl>
-                                          <p:spTgt spid="205"/>
+                                          <p:spTgt spid="202"/>
                                         </p:tgtEl>
                                         <p:attrNameLst>
                                           <p:attrName>style.visibility</p:attrName>
@@ -10056,9 +10735,9 @@
       </p:par>
     </p:tnLst>
     <p:bldLst>
+      <p:bldP build="whole" bldLvl="1" animBg="1" rev="0" advAuto="0" spid="190" grpId="3"/>
+      <p:bldP build="whole" bldLvl="1" animBg="1" rev="0" advAuto="0" spid="202" grpId="1"/>
       <p:bldP build="whole" bldLvl="1" animBg="1" rev="0" advAuto="0" spid="187" grpId="2"/>
-      <p:bldP build="whole" bldLvl="1" animBg="1" rev="0" advAuto="0" spid="205" grpId="1"/>
-      <p:bldP build="whole" bldLvl="1" animBg="1" rev="0" advAuto="0" spid="190" grpId="3"/>
     </p:bldLst>
   </p:timing>
 </p:sld>
@@ -10083,7 +10762,7 @@
       </p:grpSpPr>
       <p:sp>
         <p:nvSpPr>
-          <p:cNvPr id="207" name="PlaceHolder 1"/>
+          <p:cNvPr id="206" name="PlaceHolder 1"/>
           <p:cNvSpPr txBox="1"/>
           <p:nvPr>
             <p:ph type="title"/>
@@ -10115,7 +10794,7 @@
       </p:sp>
       <p:sp>
         <p:nvSpPr>
-          <p:cNvPr id="208" name="PlaceHolder 2"/>
+          <p:cNvPr id="207" name="PlaceHolder 2"/>
           <p:cNvSpPr txBox="1"/>
           <p:nvPr>
             <p:ph type="body" sz="quarter" idx="1"/>
@@ -10158,7 +10837,7 @@
       </p:sp>
       <p:sp>
         <p:nvSpPr>
-          <p:cNvPr id="209" name="PlaceHolder 3"/>
+          <p:cNvPr id="208" name="PlaceHolder 3"/>
           <p:cNvSpPr txBox="1"/>
           <p:nvPr/>
         </p:nvSpPr>
@@ -10310,7 +10989,7 @@
       </p:grpSpPr>
       <p:sp>
         <p:nvSpPr>
-          <p:cNvPr id="211" name="PlaceHolder 1"/>
+          <p:cNvPr id="210" name="PlaceHolder 1"/>
           <p:cNvSpPr txBox="1"/>
           <p:nvPr>
             <p:ph type="title"/>
@@ -10342,7 +11021,7 @@
       </p:sp>
       <p:sp>
         <p:nvSpPr>
-          <p:cNvPr id="212" name="PlaceHolder 2"/>
+          <p:cNvPr id="211" name="PlaceHolder 2"/>
           <p:cNvSpPr txBox="1"/>
           <p:nvPr>
             <p:ph type="body" sz="quarter" idx="1"/>
@@ -10379,7 +11058,7 @@
       </p:sp>
       <p:sp>
         <p:nvSpPr>
-          <p:cNvPr id="213" name="PlaceHolder 3"/>
+          <p:cNvPr id="212" name="PlaceHolder 3"/>
           <p:cNvSpPr txBox="1"/>
           <p:nvPr/>
         </p:nvSpPr>
@@ -10633,7 +11312,7 @@
       </p:grpSpPr>
       <p:sp>
         <p:nvSpPr>
-          <p:cNvPr id="215" name="PlaceHolder 1"/>
+          <p:cNvPr id="214" name="PlaceHolder 1"/>
           <p:cNvSpPr txBox="1"/>
           <p:nvPr>
             <p:ph type="title"/>
@@ -10665,7 +11344,7 @@
       </p:sp>
       <p:sp>
         <p:nvSpPr>
-          <p:cNvPr id="216" name="PlaceHolder 2"/>
+          <p:cNvPr id="215" name="PlaceHolder 2"/>
           <p:cNvSpPr txBox="1"/>
           <p:nvPr>
             <p:ph type="body" sz="quarter" idx="1"/>
@@ -10702,7 +11381,7 @@
       </p:sp>
       <p:sp>
         <p:nvSpPr>
-          <p:cNvPr id="217" name="PlaceHolder 3"/>
+          <p:cNvPr id="216" name="PlaceHolder 3"/>
           <p:cNvSpPr txBox="1"/>
           <p:nvPr/>
         </p:nvSpPr>
@@ -10856,7 +11535,7 @@
       </p:sp>
       <p:pic>
         <p:nvPicPr>
-          <p:cNvPr id="218" name="Bild" descr="Bild"/>
+          <p:cNvPr id="217" name="Bild" descr="Bild"/>
           <p:cNvPicPr>
             <a:picLocks noChangeAspect="1"/>
           </p:cNvPicPr>

</xml_diff>

<commit_message>
update slides data info
</commit_message>
<xml_diff>
--- a/presentation/final_presentation.pptx
+++ b/presentation/final_presentation.pptx
@@ -4188,9 +4188,9 @@
       </p:par>
     </p:tnLst>
     <p:bldLst>
+      <p:bldP build="whole" bldLvl="1" animBg="1" rev="0" advAuto="0" spid="230" grpId="3"/>
       <p:bldP build="whole" bldLvl="1" animBg="1" rev="0" advAuto="0" spid="229" grpId="2"/>
       <p:bldP build="whole" bldLvl="1" animBg="1" rev="0" advAuto="0" spid="231" grpId="1"/>
-      <p:bldP build="whole" bldLvl="1" animBg="1" rev="0" advAuto="0" spid="230" grpId="3"/>
     </p:bldLst>
   </p:timing>
 </p:sld>
@@ -5274,7 +5274,7 @@
                         <a:rPr b="1" sz="3200">
                           <a:sym typeface="Helvetica Neue"/>
                         </a:rPr>
-                        <a:t>Binary Data Architecture</a:t>
+                        <a:t>Binary Data</a:t>
                       </a:r>
                     </a:p>
                   </a:txBody>
@@ -5318,7 +5318,7 @@
                         <a:rPr sz="3200">
                           <a:sym typeface="Helvetica Neue"/>
                         </a:rPr>
-                        <a:t>X64</a:t>
+                        <a:t>X64 - all optimizations &amp; compilers</a:t>
                       </a:r>
                     </a:p>
                   </a:txBody>
@@ -8760,8 +8760,8 @@
       </p:par>
     </p:tnLst>
     <p:bldLst>
+      <p:bldP build="whole" bldLvl="1" animBg="1" rev="0" advAuto="0" spid="160" grpId="1"/>
       <p:bldP build="whole" bldLvl="1" animBg="1" rev="0" advAuto="0" spid="163" grpId="2"/>
-      <p:bldP build="whole" bldLvl="1" animBg="1" rev="0" advAuto="0" spid="160" grpId="1"/>
     </p:bldLst>
   </p:timing>
 </p:sld>
@@ -9518,9 +9518,9 @@
       </p:par>
     </p:tnLst>
     <p:bldLst>
+      <p:bldP build="whole" bldLvl="1" animBg="1" rev="0" advAuto="0" spid="174" grpId="1"/>
       <p:bldP build="whole" bldLvl="1" animBg="1" rev="0" advAuto="0" spid="177" grpId="2"/>
       <p:bldP build="whole" bldLvl="1" animBg="1" rev="0" advAuto="0" spid="180" grpId="3"/>
-      <p:bldP build="whole" bldLvl="1" animBg="1" rev="0" advAuto="0" spid="174" grpId="1"/>
     </p:bldLst>
   </p:timing>
 </p:sld>
@@ -10486,9 +10486,9 @@
       </p:par>
     </p:tnLst>
     <p:bldLst>
+      <p:bldP build="whole" bldLvl="1" animBg="1" rev="0" advAuto="0" spid="202" grpId="1"/>
+      <p:bldP build="whole" bldLvl="1" animBg="1" rev="0" advAuto="0" spid="190" grpId="3"/>
       <p:bldP build="whole" bldLvl="1" animBg="1" rev="0" advAuto="0" spid="187" grpId="2"/>
-      <p:bldP build="whole" bldLvl="1" animBg="1" rev="0" advAuto="0" spid="190" grpId="3"/>
-      <p:bldP build="whole" bldLvl="1" animBg="1" rev="0" advAuto="0" spid="202" grpId="1"/>
     </p:bldLst>
   </p:timing>
 </p:sld>

</xml_diff>